<commit_message>
add Parser into slide
</commit_message>
<xml_diff>
--- a/Seminar/Stanford_CoreNLP.pptx
+++ b/Seminar/Stanford_CoreNLP.pptx
@@ -5,7 +5,7 @@
     <p:sldMasterId id="2147483660" r:id="rId1"/>
   </p:sldMasterIdLst>
   <p:notesMasterIdLst>
-    <p:notesMasterId r:id="rId24"/>
+    <p:notesMasterId r:id="rId29"/>
   </p:notesMasterIdLst>
   <p:sldIdLst>
     <p:sldId id="256" r:id="rId2"/>
@@ -13,7 +13,7 @@
     <p:sldId id="257" r:id="rId4"/>
     <p:sldId id="263" r:id="rId5"/>
     <p:sldId id="261" r:id="rId6"/>
-    <p:sldId id="259" r:id="rId7"/>
+    <p:sldId id="282" r:id="rId7"/>
     <p:sldId id="258" r:id="rId8"/>
     <p:sldId id="268" r:id="rId9"/>
     <p:sldId id="273" r:id="rId10"/>
@@ -30,6 +30,11 @@
     <p:sldId id="279" r:id="rId21"/>
     <p:sldId id="280" r:id="rId22"/>
     <p:sldId id="281" r:id="rId23"/>
+    <p:sldId id="283" r:id="rId24"/>
+    <p:sldId id="284" r:id="rId25"/>
+    <p:sldId id="285" r:id="rId26"/>
+    <p:sldId id="286" r:id="rId27"/>
+    <p:sldId id="287" r:id="rId28"/>
   </p:sldIdLst>
   <p:sldSz cx="12192000" cy="6858000"/>
   <p:notesSz cx="6858000" cy="9144000"/>
@@ -137,10 +142,6 @@
     </p:ext>
   </p:extLst>
 </p:presentation>
-</file>
-
-<file path=ppt/revisionInfo.xml><?xml version="1.0" encoding="utf-8"?>
-<p1510:revInfo xmlns:a="http://schemas.openxmlformats.org/drawingml/2006/main" xmlns:r="http://schemas.openxmlformats.org/officeDocument/2006/relationships" xmlns:p1510="http://schemas.microsoft.com/office/powerpoint/2015/10/main"/>
 </file>
 
 <file path=ppt/diagrams/colors1.xml><?xml version="1.0" encoding="utf-8"?>
@@ -4107,6 +4108,90 @@
 </p:notes>
 </file>
 
+<file path=ppt/notesSlides/notesSlide9.xml><?xml version="1.0" encoding="utf-8"?>
+<p:notes xmlns:a="http://schemas.openxmlformats.org/drawingml/2006/main" xmlns:r="http://schemas.openxmlformats.org/officeDocument/2006/relationships" xmlns:p="http://schemas.openxmlformats.org/presentationml/2006/main">
+  <p:cSld>
+    <p:spTree>
+      <p:nvGrpSpPr>
+        <p:cNvPr id="1" name=""/>
+        <p:cNvGrpSpPr/>
+        <p:nvPr/>
+      </p:nvGrpSpPr>
+      <p:grpSpPr>
+        <a:xfrm>
+          <a:off x="0" y="0"/>
+          <a:ext cx="0" cy="0"/>
+          <a:chOff x="0" y="0"/>
+          <a:chExt cx="0" cy="0"/>
+        </a:xfrm>
+      </p:grpSpPr>
+      <p:sp>
+        <p:nvSpPr>
+          <p:cNvPr id="2" name="Slide Image Placeholder 1"/>
+          <p:cNvSpPr>
+            <a:spLocks noGrp="1" noRot="1" noChangeAspect="1"/>
+          </p:cNvSpPr>
+          <p:nvPr>
+            <p:ph type="sldImg"/>
+          </p:nvPr>
+        </p:nvSpPr>
+        <p:spPr/>
+      </p:sp>
+      <p:sp>
+        <p:nvSpPr>
+          <p:cNvPr id="3" name="Notes Placeholder 2"/>
+          <p:cNvSpPr>
+            <a:spLocks noGrp="1"/>
+          </p:cNvSpPr>
+          <p:nvPr>
+            <p:ph type="body" idx="1"/>
+          </p:nvPr>
+        </p:nvSpPr>
+        <p:spPr/>
+        <p:txBody>
+          <a:bodyPr/>
+          <a:lstStyle/>
+          <a:p>
+            <a:endParaRPr lang="en-US"/>
+          </a:p>
+        </p:txBody>
+      </p:sp>
+      <p:sp>
+        <p:nvSpPr>
+          <p:cNvPr id="4" name="Slide Number Placeholder 3"/>
+          <p:cNvSpPr>
+            <a:spLocks noGrp="1"/>
+          </p:cNvSpPr>
+          <p:nvPr>
+            <p:ph type="sldNum" sz="quarter" idx="10"/>
+          </p:nvPr>
+        </p:nvSpPr>
+        <p:spPr/>
+        <p:txBody>
+          <a:bodyPr/>
+          <a:lstStyle/>
+          <a:p>
+            <a:fld id="{78BBFBE1-F28B-4D2E-997C-B307AD86A0C8}" type="slidenum">
+              <a:rPr lang="en-US" smtClean="0"/>
+              <a:t>25</a:t>
+            </a:fld>
+            <a:endParaRPr lang="en-US"/>
+          </a:p>
+        </p:txBody>
+      </p:sp>
+    </p:spTree>
+    <p:extLst>
+      <p:ext uri="{BB962C8B-B14F-4D97-AF65-F5344CB8AC3E}">
+        <p14:creationId xmlns:p14="http://schemas.microsoft.com/office/powerpoint/2010/main" val="698861264"/>
+      </p:ext>
+    </p:extLst>
+  </p:cSld>
+  <p:clrMapOvr>
+    <a:masterClrMapping/>
+  </p:clrMapOvr>
+</p:notes>
+</file>
+
 <file path=ppt/slideLayouts/slideLayout1.xml><?xml version="1.0" encoding="utf-8"?>
 <p:sldLayout xmlns:a="http://schemas.openxmlformats.org/drawingml/2006/main" xmlns:r="http://schemas.openxmlformats.org/officeDocument/2006/relationships" xmlns:p="http://schemas.openxmlformats.org/presentationml/2006/main" showMasterSp="0" type="title" preserve="1">
   <p:cSld name="Title Slide">
@@ -19157,7 +19242,7 @@
         </p:spPr>
         <p:txBody>
           <a:bodyPr vert="horz" lIns="91440" tIns="45720" rIns="91440" bIns="45720" rtlCol="0" anchor="ctr">
-            <a:normAutofit fontScale="92500"/>
+            <a:normAutofit lnSpcReduction="10000"/>
           </a:bodyPr>
           <a:lstStyle>
             <a:lvl1pPr marL="285750" indent="-285750" algn="l" defTabSz="457200" rtl="0" eaLnBrk="1" latinLnBrk="0" hangingPunct="1">
@@ -19505,7 +19590,7 @@
         </p:spPr>
         <p:txBody>
           <a:bodyPr vert="horz" lIns="91440" tIns="45720" rIns="91440" bIns="45720" rtlCol="0" anchor="ctr">
-            <a:normAutofit fontScale="92500"/>
+            <a:normAutofit lnSpcReduction="10000"/>
           </a:bodyPr>
           <a:lstStyle>
             <a:lvl1pPr marL="285750" indent="-285750" algn="l" defTabSz="457200" rtl="0" eaLnBrk="1" latinLnBrk="0" hangingPunct="1">
@@ -21540,6 +21625,1097 @@
 </p:sld>
 </file>
 
+<file path=ppt/slides/slide23.xml><?xml version="1.0" encoding="utf-8"?>
+<p:sld xmlns:a="http://schemas.openxmlformats.org/drawingml/2006/main" xmlns:r="http://schemas.openxmlformats.org/officeDocument/2006/relationships" xmlns:p="http://schemas.openxmlformats.org/presentationml/2006/main">
+  <p:cSld>
+    <p:spTree>
+      <p:nvGrpSpPr>
+        <p:cNvPr id="1" name=""/>
+        <p:cNvGrpSpPr/>
+        <p:nvPr/>
+      </p:nvGrpSpPr>
+      <p:grpSpPr>
+        <a:xfrm>
+          <a:off x="0" y="0"/>
+          <a:ext cx="0" cy="0"/>
+          <a:chOff x="0" y="0"/>
+          <a:chExt cx="0" cy="0"/>
+        </a:xfrm>
+      </p:grpSpPr>
+      <p:sp>
+        <p:nvSpPr>
+          <p:cNvPr id="2" name="Title 1">
+            <a:extLst>
+              <a:ext uri="{FF2B5EF4-FFF2-40B4-BE49-F238E27FC236}">
+                <a16:creationId xmlns:a16="http://schemas.microsoft.com/office/drawing/2014/main" id="{922C7F22-C285-44BA-86CB-3A96AFB77B23}"/>
+              </a:ext>
+            </a:extLst>
+          </p:cNvPr>
+          <p:cNvSpPr>
+            <a:spLocks noGrp="1"/>
+          </p:cNvSpPr>
+          <p:nvPr>
+            <p:ph type="title"/>
+          </p:nvPr>
+        </p:nvSpPr>
+        <p:spPr>
+          <a:xfrm>
+            <a:off x="1484310" y="361335"/>
+            <a:ext cx="2920180" cy="862781"/>
+          </a:xfrm>
+        </p:spPr>
+        <p:txBody>
+          <a:bodyPr>
+            <a:normAutofit/>
+          </a:bodyPr>
+          <a:lstStyle/>
+          <a:p>
+            <a:r>
+              <a:rPr lang="en-US" b="1">
+                <a:solidFill>
+                  <a:srgbClr val="0000FF"/>
+                </a:solidFill>
+                <a:latin typeface="Times New Roman" panose="02020603050405020304" pitchFamily="18" charset="0"/>
+                <a:cs typeface="Times New Roman" panose="02020603050405020304" pitchFamily="18" charset="0"/>
+              </a:rPr>
+              <a:t>The Parser</a:t>
+            </a:r>
+          </a:p>
+        </p:txBody>
+      </p:sp>
+      <p:sp>
+        <p:nvSpPr>
+          <p:cNvPr id="3" name="Content Placeholder 2">
+            <a:extLst>
+              <a:ext uri="{FF2B5EF4-FFF2-40B4-BE49-F238E27FC236}">
+                <a16:creationId xmlns:a16="http://schemas.microsoft.com/office/drawing/2014/main" id="{94E56254-3B5D-48D0-AFA2-29BB3098CE10}"/>
+              </a:ext>
+            </a:extLst>
+          </p:cNvPr>
+          <p:cNvSpPr>
+            <a:spLocks noGrp="1"/>
+          </p:cNvSpPr>
+          <p:nvPr>
+            <p:ph idx="1"/>
+          </p:nvPr>
+        </p:nvSpPr>
+        <p:spPr>
+          <a:xfrm>
+            <a:off x="1602297" y="2106561"/>
+            <a:ext cx="10018713" cy="3124201"/>
+          </a:xfrm>
+        </p:spPr>
+        <p:txBody>
+          <a:bodyPr>
+            <a:normAutofit/>
+          </a:bodyPr>
+          <a:lstStyle/>
+          <a:p>
+            <a:pPr>
+              <a:spcAft>
+                <a:spcPts val="1800"/>
+              </a:spcAft>
+            </a:pPr>
+            <a:r>
+              <a:rPr lang="en-US" sz="2600">
+                <a:latin typeface="Times New Roman" panose="02020603050405020304" pitchFamily="18" charset="0"/>
+                <a:cs typeface="Times New Roman" panose="02020603050405020304" pitchFamily="18" charset="0"/>
+              </a:rPr>
+              <a:t>Phân tích cấu trúc của câu nh</a:t>
+            </a:r>
+            <a:r>
+              <a:rPr lang="vi-VN" sz="2600">
+                <a:latin typeface="Times New Roman" panose="02020603050405020304" pitchFamily="18" charset="0"/>
+                <a:cs typeface="Times New Roman" panose="02020603050405020304" pitchFamily="18" charset="0"/>
+              </a:rPr>
+              <a:t>ư</a:t>
+            </a:r>
+            <a:r>
+              <a:rPr lang="en-US" sz="2600">
+                <a:latin typeface="Times New Roman" panose="02020603050405020304" pitchFamily="18" charset="0"/>
+                <a:cs typeface="Times New Roman" panose="02020603050405020304" pitchFamily="18" charset="0"/>
+              </a:rPr>
+              <a:t> những từ nào đi cùng nhau, từ nào là chủ ngữ, từ nào là vị ngữ,… </a:t>
+            </a:r>
+          </a:p>
+          <a:p>
+            <a:pPr>
+              <a:spcAft>
+                <a:spcPts val="1800"/>
+              </a:spcAft>
+            </a:pPr>
+            <a:r>
+              <a:rPr lang="en-US" sz="2600">
+                <a:latin typeface="Times New Roman" panose="02020603050405020304" pitchFamily="18" charset="0"/>
+                <a:cs typeface="Times New Roman" panose="02020603050405020304" pitchFamily="18" charset="0"/>
+              </a:rPr>
+              <a:t>Có 2 loại parser:</a:t>
+            </a:r>
+          </a:p>
+          <a:p>
+            <a:pPr marL="914400" lvl="2" indent="0">
+              <a:spcAft>
+                <a:spcPts val="1800"/>
+              </a:spcAft>
+              <a:buNone/>
+            </a:pPr>
+            <a:r>
+              <a:rPr lang="en-US" sz="2600">
+                <a:latin typeface="Times New Roman" panose="02020603050405020304" pitchFamily="18" charset="0"/>
+                <a:cs typeface="Times New Roman" panose="02020603050405020304" pitchFamily="18" charset="0"/>
+              </a:rPr>
+              <a:t>1. 	C</a:t>
+            </a:r>
+            <a:r>
+              <a:rPr lang="vi-VN" sz="2600">
+                <a:latin typeface="Times New Roman" panose="02020603050405020304" pitchFamily="18" charset="0"/>
+                <a:cs typeface="Times New Roman" panose="02020603050405020304" pitchFamily="18" charset="0"/>
+              </a:rPr>
+              <a:t>onstituency </a:t>
+            </a:r>
+            <a:r>
+              <a:rPr lang="en-US" sz="2600">
+                <a:latin typeface="Times New Roman" panose="02020603050405020304" pitchFamily="18" charset="0"/>
+                <a:cs typeface="Times New Roman" panose="02020603050405020304" pitchFamily="18" charset="0"/>
+              </a:rPr>
+              <a:t>P</a:t>
+            </a:r>
+            <a:r>
+              <a:rPr lang="vi-VN" sz="2600">
+                <a:latin typeface="Times New Roman" panose="02020603050405020304" pitchFamily="18" charset="0"/>
+                <a:cs typeface="Times New Roman" panose="02020603050405020304" pitchFamily="18" charset="0"/>
+              </a:rPr>
+              <a:t>arse</a:t>
+            </a:r>
+            <a:endParaRPr lang="en-US" sz="2600">
+              <a:latin typeface="Times New Roman" panose="02020603050405020304" pitchFamily="18" charset="0"/>
+              <a:cs typeface="Times New Roman" panose="02020603050405020304" pitchFamily="18" charset="0"/>
+            </a:endParaRPr>
+          </a:p>
+          <a:p>
+            <a:pPr marL="909638" lvl="1" indent="0">
+              <a:spcAft>
+                <a:spcPts val="1800"/>
+              </a:spcAft>
+              <a:buNone/>
+            </a:pPr>
+            <a:r>
+              <a:rPr lang="en-US" sz="2600">
+                <a:latin typeface="Times New Roman" panose="02020603050405020304" pitchFamily="18" charset="0"/>
+                <a:cs typeface="Times New Roman" panose="02020603050405020304" pitchFamily="18" charset="0"/>
+              </a:rPr>
+              <a:t>2.	D</a:t>
+            </a:r>
+            <a:r>
+              <a:rPr lang="vi-VN" sz="2600">
+                <a:latin typeface="Times New Roman" panose="02020603050405020304" pitchFamily="18" charset="0"/>
+                <a:cs typeface="Times New Roman" panose="02020603050405020304" pitchFamily="18" charset="0"/>
+              </a:rPr>
+              <a:t>ependency </a:t>
+            </a:r>
+            <a:r>
+              <a:rPr lang="en-US" sz="2600">
+                <a:latin typeface="Times New Roman" panose="02020603050405020304" pitchFamily="18" charset="0"/>
+                <a:cs typeface="Times New Roman" panose="02020603050405020304" pitchFamily="18" charset="0"/>
+              </a:rPr>
+              <a:t>P</a:t>
+            </a:r>
+            <a:r>
+              <a:rPr lang="vi-VN" sz="2600">
+                <a:latin typeface="Times New Roman" panose="02020603050405020304" pitchFamily="18" charset="0"/>
+                <a:cs typeface="Times New Roman" panose="02020603050405020304" pitchFamily="18" charset="0"/>
+              </a:rPr>
+              <a:t>arse</a:t>
+            </a:r>
+            <a:endParaRPr lang="en-US" sz="2600">
+              <a:latin typeface="Times New Roman" panose="02020603050405020304" pitchFamily="18" charset="0"/>
+              <a:cs typeface="Times New Roman" panose="02020603050405020304" pitchFamily="18" charset="0"/>
+            </a:endParaRPr>
+          </a:p>
+        </p:txBody>
+      </p:sp>
+    </p:spTree>
+    <p:extLst>
+      <p:ext uri="{BB962C8B-B14F-4D97-AF65-F5344CB8AC3E}">
+        <p14:creationId xmlns:p14="http://schemas.microsoft.com/office/powerpoint/2010/main" val="3673919625"/>
+      </p:ext>
+    </p:extLst>
+  </p:cSld>
+  <p:clrMapOvr>
+    <a:masterClrMapping/>
+  </p:clrMapOvr>
+</p:sld>
+</file>
+
+<file path=ppt/slides/slide24.xml><?xml version="1.0" encoding="utf-8"?>
+<p:sld xmlns:a="http://schemas.openxmlformats.org/drawingml/2006/main" xmlns:r="http://schemas.openxmlformats.org/officeDocument/2006/relationships" xmlns:p="http://schemas.openxmlformats.org/presentationml/2006/main">
+  <p:cSld>
+    <p:spTree>
+      <p:nvGrpSpPr>
+        <p:cNvPr id="1" name=""/>
+        <p:cNvGrpSpPr/>
+        <p:nvPr/>
+      </p:nvGrpSpPr>
+      <p:grpSpPr>
+        <a:xfrm>
+          <a:off x="0" y="0"/>
+          <a:ext cx="0" cy="0"/>
+          <a:chOff x="0" y="0"/>
+          <a:chExt cx="0" cy="0"/>
+        </a:xfrm>
+      </p:grpSpPr>
+      <p:pic>
+        <p:nvPicPr>
+          <p:cNvPr id="4" name="Picture 3">
+            <a:extLst>
+              <a:ext uri="{FF2B5EF4-FFF2-40B4-BE49-F238E27FC236}">
+                <a16:creationId xmlns:a16="http://schemas.microsoft.com/office/drawing/2014/main" id="{B759218E-A635-433B-B71D-157249449D93}"/>
+              </a:ext>
+            </a:extLst>
+          </p:cNvPr>
+          <p:cNvPicPr/>
+          <p:nvPr/>
+        </p:nvPicPr>
+        <p:blipFill>
+          <a:blip r:embed="rId2"/>
+          <a:stretch>
+            <a:fillRect/>
+          </a:stretch>
+        </p:blipFill>
+        <p:spPr>
+          <a:xfrm>
+            <a:off x="7168308" y="1235916"/>
+            <a:ext cx="4596221" cy="4117749"/>
+          </a:xfrm>
+          <a:prstGeom prst="rect">
+            <a:avLst/>
+          </a:prstGeom>
+        </p:spPr>
+      </p:pic>
+      <p:sp>
+        <p:nvSpPr>
+          <p:cNvPr id="2" name="Title 1">
+            <a:extLst>
+              <a:ext uri="{FF2B5EF4-FFF2-40B4-BE49-F238E27FC236}">
+                <a16:creationId xmlns:a16="http://schemas.microsoft.com/office/drawing/2014/main" id="{11CFEAA0-FD65-467A-908A-1D9B480CAC39}"/>
+              </a:ext>
+            </a:extLst>
+          </p:cNvPr>
+          <p:cNvSpPr>
+            <a:spLocks noGrp="1"/>
+          </p:cNvSpPr>
+          <p:nvPr>
+            <p:ph type="title"/>
+          </p:nvPr>
+        </p:nvSpPr>
+        <p:spPr>
+          <a:xfrm>
+            <a:off x="1751591" y="455180"/>
+            <a:ext cx="4037984" cy="640759"/>
+          </a:xfrm>
+        </p:spPr>
+        <p:txBody>
+          <a:bodyPr vert="horz" lIns="91440" tIns="45720" rIns="91440" bIns="45720" rtlCol="0" anchor="b">
+            <a:normAutofit fontScale="90000"/>
+          </a:bodyPr>
+          <a:lstStyle/>
+          <a:p>
+            <a:pPr algn="r"/>
+            <a:r>
+              <a:rPr lang="en-US" b="1">
+                <a:solidFill>
+                  <a:srgbClr val="0000FF"/>
+                </a:solidFill>
+                <a:latin typeface="Times New Roman" panose="02020603050405020304" pitchFamily="18" charset="0"/>
+                <a:cs typeface="Times New Roman" panose="02020603050405020304" pitchFamily="18" charset="0"/>
+              </a:rPr>
+              <a:t>Constituency Parse</a:t>
+            </a:r>
+          </a:p>
+        </p:txBody>
+      </p:sp>
+      <p:sp>
+        <p:nvSpPr>
+          <p:cNvPr id="3" name="Content Placeholder 2">
+            <a:extLst>
+              <a:ext uri="{FF2B5EF4-FFF2-40B4-BE49-F238E27FC236}">
+                <a16:creationId xmlns:a16="http://schemas.microsoft.com/office/drawing/2014/main" id="{B2A15174-E921-43A0-9EFE-5FF1CABA6A2B}"/>
+              </a:ext>
+            </a:extLst>
+          </p:cNvPr>
+          <p:cNvSpPr>
+            <a:spLocks noGrp="1"/>
+          </p:cNvSpPr>
+          <p:nvPr>
+            <p:ph idx="1"/>
+          </p:nvPr>
+        </p:nvSpPr>
+        <p:spPr>
+          <a:xfrm>
+            <a:off x="1584968" y="2515805"/>
+            <a:ext cx="4913364" cy="1826389"/>
+          </a:xfrm>
+        </p:spPr>
+        <p:txBody>
+          <a:bodyPr vert="horz" lIns="91440" tIns="45720" rIns="91440" bIns="45720" rtlCol="0" anchor="t">
+            <a:noAutofit/>
+          </a:bodyPr>
+          <a:lstStyle/>
+          <a:p>
+            <a:pPr marL="0" indent="0">
+              <a:buNone/>
+            </a:pPr>
+            <a:r>
+              <a:rPr lang="en-US" sz="2600">
+                <a:latin typeface="Times New Roman" panose="02020603050405020304" pitchFamily="18" charset="0"/>
+                <a:cs typeface="Times New Roman" panose="02020603050405020304" pitchFamily="18" charset="0"/>
+              </a:rPr>
+              <a:t>Tách câu thành từng phần (cụm từ) sau đó tiếp tục tách thành từng phần nhỏ hơn.</a:t>
+            </a:r>
+          </a:p>
+        </p:txBody>
+      </p:sp>
+    </p:spTree>
+    <p:extLst>
+      <p:ext uri="{BB962C8B-B14F-4D97-AF65-F5344CB8AC3E}">
+        <p14:creationId xmlns:p14="http://schemas.microsoft.com/office/powerpoint/2010/main" val="3026246626"/>
+      </p:ext>
+    </p:extLst>
+  </p:cSld>
+  <p:clrMapOvr>
+    <a:masterClrMapping/>
+  </p:clrMapOvr>
+</p:sld>
+</file>
+
+<file path=ppt/slides/slide25.xml><?xml version="1.0" encoding="utf-8"?>
+<p:sld xmlns:a="http://schemas.openxmlformats.org/drawingml/2006/main" xmlns:r="http://schemas.openxmlformats.org/officeDocument/2006/relationships" xmlns:p="http://schemas.openxmlformats.org/presentationml/2006/main">
+  <p:cSld>
+    <p:spTree>
+      <p:nvGrpSpPr>
+        <p:cNvPr id="1" name=""/>
+        <p:cNvGrpSpPr/>
+        <p:nvPr/>
+      </p:nvGrpSpPr>
+      <p:grpSpPr>
+        <a:xfrm>
+          <a:off x="0" y="0"/>
+          <a:ext cx="0" cy="0"/>
+          <a:chOff x="0" y="0"/>
+          <a:chExt cx="0" cy="0"/>
+        </a:xfrm>
+      </p:grpSpPr>
+      <p:sp>
+        <p:nvSpPr>
+          <p:cNvPr id="2" name="Title 1">
+            <a:extLst>
+              <a:ext uri="{FF2B5EF4-FFF2-40B4-BE49-F238E27FC236}">
+                <a16:creationId xmlns:a16="http://schemas.microsoft.com/office/drawing/2014/main" id="{6BB17E34-0395-432B-8A49-ED2D42FFBCB7}"/>
+              </a:ext>
+            </a:extLst>
+          </p:cNvPr>
+          <p:cNvSpPr>
+            <a:spLocks noGrp="1"/>
+          </p:cNvSpPr>
+          <p:nvPr>
+            <p:ph type="title"/>
+          </p:nvPr>
+        </p:nvSpPr>
+        <p:spPr>
+          <a:xfrm>
+            <a:off x="1351574" y="429162"/>
+            <a:ext cx="1834078" cy="877529"/>
+          </a:xfrm>
+        </p:spPr>
+        <p:txBody>
+          <a:bodyPr>
+            <a:normAutofit/>
+          </a:bodyPr>
+          <a:lstStyle/>
+          <a:p>
+            <a:r>
+              <a:rPr lang="en-US" b="1">
+                <a:solidFill>
+                  <a:srgbClr val="0000FF"/>
+                </a:solidFill>
+                <a:latin typeface="Times New Roman" panose="02020603050405020304" pitchFamily="18" charset="0"/>
+                <a:cs typeface="Times New Roman" panose="02020603050405020304" pitchFamily="18" charset="0"/>
+              </a:rPr>
+              <a:t>Ví dụ</a:t>
+            </a:r>
+          </a:p>
+        </p:txBody>
+      </p:sp>
+      <p:sp>
+        <p:nvSpPr>
+          <p:cNvPr id="3" name="Content Placeholder 2">
+            <a:extLst>
+              <a:ext uri="{FF2B5EF4-FFF2-40B4-BE49-F238E27FC236}">
+                <a16:creationId xmlns:a16="http://schemas.microsoft.com/office/drawing/2014/main" id="{61369707-3410-42ED-9E72-D16FA03D07D4}"/>
+              </a:ext>
+            </a:extLst>
+          </p:cNvPr>
+          <p:cNvSpPr>
+            <a:spLocks noGrp="1"/>
+          </p:cNvSpPr>
+          <p:nvPr>
+            <p:ph idx="1"/>
+          </p:nvPr>
+        </p:nvSpPr>
+        <p:spPr>
+          <a:xfrm>
+            <a:off x="1351574" y="1607575"/>
+            <a:ext cx="5329446" cy="1542202"/>
+          </a:xfrm>
+        </p:spPr>
+        <p:txBody>
+          <a:bodyPr>
+            <a:noAutofit/>
+          </a:bodyPr>
+          <a:lstStyle/>
+          <a:p>
+            <a:pPr marL="0" indent="0">
+              <a:buNone/>
+            </a:pPr>
+            <a:r>
+              <a:rPr lang="en-US" sz="2600" b="1">
+                <a:latin typeface="Times New Roman" panose="02020603050405020304" pitchFamily="18" charset="0"/>
+                <a:cs typeface="Times New Roman" panose="02020603050405020304" pitchFamily="18" charset="0"/>
+              </a:rPr>
+              <a:t>Input:</a:t>
+            </a:r>
+          </a:p>
+          <a:p>
+            <a:pPr marL="0" indent="0">
+              <a:buNone/>
+            </a:pPr>
+            <a:r>
+              <a:rPr lang="en-US" sz="2600">
+                <a:latin typeface="Times New Roman" panose="02020603050405020304" pitchFamily="18" charset="0"/>
+                <a:cs typeface="Times New Roman" panose="02020603050405020304" pitchFamily="18" charset="0"/>
+              </a:rPr>
+              <a:t>“This is an example of dependency grammar”</a:t>
+            </a:r>
+          </a:p>
+        </p:txBody>
+      </p:sp>
+      <p:pic>
+        <p:nvPicPr>
+          <p:cNvPr id="4" name="Picture 3">
+            <a:extLst>
+              <a:ext uri="{FF2B5EF4-FFF2-40B4-BE49-F238E27FC236}">
+                <a16:creationId xmlns:a16="http://schemas.microsoft.com/office/drawing/2014/main" id="{EEF02EBA-4598-4F29-A57F-246FEC1A900A}"/>
+              </a:ext>
+            </a:extLst>
+          </p:cNvPr>
+          <p:cNvPicPr/>
+          <p:nvPr/>
+        </p:nvPicPr>
+        <p:blipFill>
+          <a:blip r:embed="rId3">
+            <a:extLst>
+              <a:ext uri="{28A0092B-C50C-407E-A947-70E740481C1C}">
+                <a14:useLocalDpi xmlns:a14="http://schemas.microsoft.com/office/drawing/2010/main" val="0"/>
+              </a:ext>
+            </a:extLst>
+          </a:blip>
+          <a:stretch>
+            <a:fillRect/>
+          </a:stretch>
+        </p:blipFill>
+        <p:spPr>
+          <a:xfrm>
+            <a:off x="6448596" y="1272010"/>
+            <a:ext cx="5597869" cy="2016880"/>
+          </a:xfrm>
+          <a:prstGeom prst="rect">
+            <a:avLst/>
+          </a:prstGeom>
+        </p:spPr>
+      </p:pic>
+      <p:sp>
+        <p:nvSpPr>
+          <p:cNvPr id="5" name="TextBox 4">
+            <a:extLst>
+              <a:ext uri="{FF2B5EF4-FFF2-40B4-BE49-F238E27FC236}">
+                <a16:creationId xmlns:a16="http://schemas.microsoft.com/office/drawing/2014/main" id="{FC15F14F-7B50-4E4C-89D4-BFC0A467C3ED}"/>
+              </a:ext>
+            </a:extLst>
+          </p:cNvPr>
+          <p:cNvSpPr txBox="1"/>
+          <p:nvPr/>
+        </p:nvSpPr>
+        <p:spPr>
+          <a:xfrm>
+            <a:off x="1356310" y="3737722"/>
+            <a:ext cx="10061039" cy="2492990"/>
+          </a:xfrm>
+          <a:prstGeom prst="rect">
+            <a:avLst/>
+          </a:prstGeom>
+          <a:noFill/>
+        </p:spPr>
+        <p:txBody>
+          <a:bodyPr wrap="square" rtlCol="0">
+            <a:spAutoFit/>
+          </a:bodyPr>
+          <a:lstStyle/>
+          <a:p>
+            <a:r>
+              <a:rPr lang="en-US" sz="2600" b="1">
+                <a:latin typeface="Times New Roman" panose="02020603050405020304" pitchFamily="18" charset="0"/>
+                <a:cs typeface="Times New Roman" panose="02020603050405020304" pitchFamily="18" charset="0"/>
+              </a:rPr>
+              <a:t>Output: </a:t>
+            </a:r>
+          </a:p>
+          <a:p>
+            <a:r>
+              <a:rPr lang="en-US" sz="2600">
+                <a:latin typeface="Times New Roman" panose="02020603050405020304" pitchFamily="18" charset="0"/>
+                <a:cs typeface="Times New Roman" panose="02020603050405020304" pitchFamily="18" charset="0"/>
+              </a:rPr>
+              <a:t>	- S là “sentence”, nút gốc của cây</a:t>
+            </a:r>
+          </a:p>
+          <a:p>
+            <a:r>
+              <a:rPr lang="en-US" sz="2600">
+                <a:latin typeface="Times New Roman" panose="02020603050405020304" pitchFamily="18" charset="0"/>
+                <a:cs typeface="Times New Roman" panose="02020603050405020304" pitchFamily="18" charset="0"/>
+              </a:rPr>
+              <a:t>	- Các từ “NP”, “VP”, “PP” chỉ loại của cụm từ, trong đó “NP” là cụm 	  danh từ, “VP” là cụm động từ, “PP” là cụm giới từ</a:t>
+            </a:r>
+          </a:p>
+          <a:p>
+            <a:r>
+              <a:rPr lang="en-US" sz="2600">
+                <a:latin typeface="Times New Roman" panose="02020603050405020304" pitchFamily="18" charset="0"/>
+                <a:cs typeface="Times New Roman" panose="02020603050405020304" pitchFamily="18" charset="0"/>
+              </a:rPr>
+              <a:t>	- Các từ “DT”, VBZ”, “IN”, “JJ”, “NN” là nhãn của từ trong Penn 		  TreeBank</a:t>
+            </a:r>
+          </a:p>
+        </p:txBody>
+      </p:sp>
+    </p:spTree>
+    <p:extLst>
+      <p:ext uri="{BB962C8B-B14F-4D97-AF65-F5344CB8AC3E}">
+        <p14:creationId xmlns:p14="http://schemas.microsoft.com/office/powerpoint/2010/main" val="2732727971"/>
+      </p:ext>
+    </p:extLst>
+  </p:cSld>
+  <p:clrMapOvr>
+    <a:masterClrMapping/>
+  </p:clrMapOvr>
+</p:sld>
+</file>
+
+<file path=ppt/slides/slide26.xml><?xml version="1.0" encoding="utf-8"?>
+<p:sld xmlns:a="http://schemas.openxmlformats.org/drawingml/2006/main" xmlns:r="http://schemas.openxmlformats.org/officeDocument/2006/relationships" xmlns:p="http://schemas.openxmlformats.org/presentationml/2006/main">
+  <p:cSld>
+    <p:spTree>
+      <p:nvGrpSpPr>
+        <p:cNvPr id="1" name=""/>
+        <p:cNvGrpSpPr/>
+        <p:nvPr/>
+      </p:nvGrpSpPr>
+      <p:grpSpPr>
+        <a:xfrm>
+          <a:off x="0" y="0"/>
+          <a:ext cx="0" cy="0"/>
+          <a:chOff x="0" y="0"/>
+          <a:chExt cx="0" cy="0"/>
+        </a:xfrm>
+      </p:grpSpPr>
+      <p:sp>
+        <p:nvSpPr>
+          <p:cNvPr id="2" name="Title 1">
+            <a:extLst>
+              <a:ext uri="{FF2B5EF4-FFF2-40B4-BE49-F238E27FC236}">
+                <a16:creationId xmlns:a16="http://schemas.microsoft.com/office/drawing/2014/main" id="{946C940A-EECC-4E71-B937-72798D5C63C0}"/>
+              </a:ext>
+            </a:extLst>
+          </p:cNvPr>
+          <p:cNvSpPr>
+            <a:spLocks noGrp="1"/>
+          </p:cNvSpPr>
+          <p:nvPr>
+            <p:ph type="title"/>
+          </p:nvPr>
+        </p:nvSpPr>
+        <p:spPr>
+          <a:xfrm>
+            <a:off x="1381947" y="230454"/>
+            <a:ext cx="4660491" cy="1020098"/>
+          </a:xfrm>
+        </p:spPr>
+        <p:txBody>
+          <a:bodyPr/>
+          <a:lstStyle/>
+          <a:p>
+            <a:r>
+              <a:rPr lang="en-US" b="1">
+                <a:solidFill>
+                  <a:srgbClr val="0000FF"/>
+                </a:solidFill>
+                <a:latin typeface="Times New Roman" panose="02020603050405020304" pitchFamily="18" charset="0"/>
+                <a:cs typeface="Times New Roman" panose="02020603050405020304" pitchFamily="18" charset="0"/>
+              </a:rPr>
+              <a:t>D</a:t>
+            </a:r>
+            <a:r>
+              <a:rPr lang="vi-VN" b="1">
+                <a:solidFill>
+                  <a:srgbClr val="0000FF"/>
+                </a:solidFill>
+                <a:latin typeface="Times New Roman" panose="02020603050405020304" pitchFamily="18" charset="0"/>
+                <a:cs typeface="Times New Roman" panose="02020603050405020304" pitchFamily="18" charset="0"/>
+              </a:rPr>
+              <a:t>ependency </a:t>
+            </a:r>
+            <a:r>
+              <a:rPr lang="en-US" b="1">
+                <a:solidFill>
+                  <a:srgbClr val="0000FF"/>
+                </a:solidFill>
+                <a:latin typeface="Times New Roman" panose="02020603050405020304" pitchFamily="18" charset="0"/>
+                <a:cs typeface="Times New Roman" panose="02020603050405020304" pitchFamily="18" charset="0"/>
+              </a:rPr>
+              <a:t>P</a:t>
+            </a:r>
+            <a:r>
+              <a:rPr lang="vi-VN" b="1">
+                <a:solidFill>
+                  <a:srgbClr val="0000FF"/>
+                </a:solidFill>
+                <a:latin typeface="Times New Roman" panose="02020603050405020304" pitchFamily="18" charset="0"/>
+                <a:cs typeface="Times New Roman" panose="02020603050405020304" pitchFamily="18" charset="0"/>
+              </a:rPr>
+              <a:t>arse</a:t>
+            </a:r>
+            <a:endParaRPr lang="en-US" b="1">
+              <a:solidFill>
+                <a:srgbClr val="0000FF"/>
+              </a:solidFill>
+              <a:latin typeface="Times New Roman" panose="02020603050405020304" pitchFamily="18" charset="0"/>
+              <a:cs typeface="Times New Roman" panose="02020603050405020304" pitchFamily="18" charset="0"/>
+            </a:endParaRPr>
+          </a:p>
+        </p:txBody>
+      </p:sp>
+      <p:sp>
+        <p:nvSpPr>
+          <p:cNvPr id="3" name="Content Placeholder 2">
+            <a:extLst>
+              <a:ext uri="{FF2B5EF4-FFF2-40B4-BE49-F238E27FC236}">
+                <a16:creationId xmlns:a16="http://schemas.microsoft.com/office/drawing/2014/main" id="{8EFF4B83-A453-45FF-98DF-A8540DA65EFB}"/>
+              </a:ext>
+            </a:extLst>
+          </p:cNvPr>
+          <p:cNvSpPr>
+            <a:spLocks noGrp="1"/>
+          </p:cNvSpPr>
+          <p:nvPr>
+            <p:ph idx="1"/>
+          </p:nvPr>
+        </p:nvSpPr>
+        <p:spPr>
+          <a:xfrm>
+            <a:off x="1786305" y="1433448"/>
+            <a:ext cx="5314695" cy="646331"/>
+          </a:xfrm>
+        </p:spPr>
+        <p:txBody>
+          <a:bodyPr>
+            <a:normAutofit/>
+          </a:bodyPr>
+          <a:lstStyle/>
+          <a:p>
+            <a:pPr marL="0" indent="0">
+              <a:buNone/>
+            </a:pPr>
+            <a:r>
+              <a:rPr lang="en-US" sz="2600">
+                <a:latin typeface="Times New Roman" panose="02020603050405020304" pitchFamily="18" charset="0"/>
+                <a:cs typeface="Times New Roman" panose="02020603050405020304" pitchFamily="18" charset="0"/>
+              </a:rPr>
+              <a:t>Vẽ đ</a:t>
+            </a:r>
+            <a:r>
+              <a:rPr lang="vi-VN" sz="2600">
+                <a:latin typeface="Times New Roman" panose="02020603050405020304" pitchFamily="18" charset="0"/>
+                <a:cs typeface="Times New Roman" panose="02020603050405020304" pitchFamily="18" charset="0"/>
+              </a:rPr>
+              <a:t>ư</a:t>
+            </a:r>
+            <a:r>
+              <a:rPr lang="en-US" sz="2600">
+                <a:latin typeface="Times New Roman" panose="02020603050405020304" pitchFamily="18" charset="0"/>
+                <a:cs typeface="Times New Roman" panose="02020603050405020304" pitchFamily="18" charset="0"/>
+              </a:rPr>
+              <a:t>ờng liên hệ giữa các từ</a:t>
+            </a:r>
+          </a:p>
+        </p:txBody>
+      </p:sp>
+      <p:pic>
+        <p:nvPicPr>
+          <p:cNvPr id="5" name="Picture 4">
+            <a:extLst>
+              <a:ext uri="{FF2B5EF4-FFF2-40B4-BE49-F238E27FC236}">
+                <a16:creationId xmlns:a16="http://schemas.microsoft.com/office/drawing/2014/main" id="{867AA35C-1B43-4B0F-A5DA-EFFFB4C2183F}"/>
+              </a:ext>
+            </a:extLst>
+          </p:cNvPr>
+          <p:cNvPicPr>
+            <a:picLocks noChangeAspect="1"/>
+          </p:cNvPicPr>
+          <p:nvPr/>
+        </p:nvPicPr>
+        <p:blipFill>
+          <a:blip r:embed="rId2"/>
+          <a:stretch>
+            <a:fillRect/>
+          </a:stretch>
+        </p:blipFill>
+        <p:spPr>
+          <a:xfrm>
+            <a:off x="2954878" y="2410159"/>
+            <a:ext cx="7299449" cy="1526457"/>
+          </a:xfrm>
+          <a:prstGeom prst="rect">
+            <a:avLst/>
+          </a:prstGeom>
+        </p:spPr>
+      </p:pic>
+      <p:sp>
+        <p:nvSpPr>
+          <p:cNvPr id="6" name="TextBox 5">
+            <a:extLst>
+              <a:ext uri="{FF2B5EF4-FFF2-40B4-BE49-F238E27FC236}">
+                <a16:creationId xmlns:a16="http://schemas.microsoft.com/office/drawing/2014/main" id="{D64297A2-3015-4C30-881E-C8ACA8A9C596}"/>
+              </a:ext>
+            </a:extLst>
+          </p:cNvPr>
+          <p:cNvSpPr txBox="1"/>
+          <p:nvPr/>
+        </p:nvSpPr>
+        <p:spPr>
+          <a:xfrm>
+            <a:off x="1165124" y="4589506"/>
+            <a:ext cx="11356258" cy="1061829"/>
+          </a:xfrm>
+          <a:prstGeom prst="rect">
+            <a:avLst/>
+          </a:prstGeom>
+          <a:noFill/>
+        </p:spPr>
+        <p:txBody>
+          <a:bodyPr wrap="square" rtlCol="0">
+            <a:spAutoFit/>
+          </a:bodyPr>
+          <a:lstStyle/>
+          <a:p>
+            <a:pPr>
+              <a:spcAft>
+                <a:spcPts val="1800"/>
+              </a:spcAft>
+            </a:pPr>
+            <a:r>
+              <a:rPr lang="en-US" sz="2400">
+                <a:latin typeface="Times New Roman" panose="02020603050405020304" pitchFamily="18" charset="0"/>
+                <a:cs typeface="Times New Roman" panose="02020603050405020304" pitchFamily="18" charset="0"/>
+              </a:rPr>
+              <a:t>Mũi tên chỉ từ “example” đến “this” nghĩa là từ “this” làm ảnh h</a:t>
+            </a:r>
+            <a:r>
+              <a:rPr lang="vi-VN" sz="2400">
+                <a:latin typeface="Times New Roman" panose="02020603050405020304" pitchFamily="18" charset="0"/>
+                <a:cs typeface="Times New Roman" panose="02020603050405020304" pitchFamily="18" charset="0"/>
+              </a:rPr>
+              <a:t>ư</a:t>
+            </a:r>
+            <a:r>
+              <a:rPr lang="en-US" sz="2400">
+                <a:latin typeface="Times New Roman" panose="02020603050405020304" pitchFamily="18" charset="0"/>
+                <a:cs typeface="Times New Roman" panose="02020603050405020304" pitchFamily="18" charset="0"/>
+              </a:rPr>
+              <a:t>ởng đến từ “axample”. </a:t>
+            </a:r>
+          </a:p>
+          <a:p>
+            <a:pPr>
+              <a:spcAft>
+                <a:spcPts val="1800"/>
+              </a:spcAft>
+            </a:pPr>
+            <a:r>
+              <a:rPr lang="en-US" sz="2400">
+                <a:latin typeface="Times New Roman" panose="02020603050405020304" pitchFamily="18" charset="0"/>
+                <a:cs typeface="Times New Roman" panose="02020603050405020304" pitchFamily="18" charset="0"/>
+              </a:rPr>
+              <a:t>“nsubj” chỉ loại mối liên hệ giữa từ “example” và “this”</a:t>
+            </a:r>
+          </a:p>
+        </p:txBody>
+      </p:sp>
+    </p:spTree>
+    <p:extLst>
+      <p:ext uri="{BB962C8B-B14F-4D97-AF65-F5344CB8AC3E}">
+        <p14:creationId xmlns:p14="http://schemas.microsoft.com/office/powerpoint/2010/main" val="1196714314"/>
+      </p:ext>
+    </p:extLst>
+  </p:cSld>
+  <p:clrMapOvr>
+    <a:masterClrMapping/>
+  </p:clrMapOvr>
+</p:sld>
+</file>
+
+<file path=ppt/slides/slide27.xml><?xml version="1.0" encoding="utf-8"?>
+<p:sld xmlns:a="http://schemas.openxmlformats.org/drawingml/2006/main" xmlns:r="http://schemas.openxmlformats.org/officeDocument/2006/relationships" xmlns:p="http://schemas.openxmlformats.org/presentationml/2006/main">
+  <p:cSld>
+    <p:spTree>
+      <p:nvGrpSpPr>
+        <p:cNvPr id="1" name=""/>
+        <p:cNvGrpSpPr/>
+        <p:nvPr/>
+      </p:nvGrpSpPr>
+      <p:grpSpPr>
+        <a:xfrm>
+          <a:off x="0" y="0"/>
+          <a:ext cx="0" cy="0"/>
+          <a:chOff x="0" y="0"/>
+          <a:chExt cx="0" cy="0"/>
+        </a:xfrm>
+      </p:grpSpPr>
+      <p:sp>
+        <p:nvSpPr>
+          <p:cNvPr id="2" name="Title 1">
+            <a:extLst>
+              <a:ext uri="{FF2B5EF4-FFF2-40B4-BE49-F238E27FC236}">
+                <a16:creationId xmlns:a16="http://schemas.microsoft.com/office/drawing/2014/main" id="{9987F1D9-F897-4BF6-A4A9-65B472BF70C2}"/>
+              </a:ext>
+            </a:extLst>
+          </p:cNvPr>
+          <p:cNvSpPr>
+            <a:spLocks noGrp="1"/>
+          </p:cNvSpPr>
+          <p:nvPr>
+            <p:ph type="title"/>
+          </p:nvPr>
+        </p:nvSpPr>
+        <p:spPr>
+          <a:xfrm>
+            <a:off x="1499059" y="357802"/>
+            <a:ext cx="1622324" cy="848032"/>
+          </a:xfrm>
+        </p:spPr>
+        <p:txBody>
+          <a:bodyPr>
+            <a:normAutofit/>
+          </a:bodyPr>
+          <a:lstStyle/>
+          <a:p>
+            <a:r>
+              <a:rPr lang="en-US" b="1">
+                <a:solidFill>
+                  <a:srgbClr val="0000FF"/>
+                </a:solidFill>
+                <a:latin typeface="Times New Roman" panose="02020603050405020304" pitchFamily="18" charset="0"/>
+                <a:cs typeface="Times New Roman" panose="02020603050405020304" pitchFamily="18" charset="0"/>
+              </a:rPr>
+              <a:t>Ví dụ</a:t>
+            </a:r>
+          </a:p>
+        </p:txBody>
+      </p:sp>
+      <p:sp>
+        <p:nvSpPr>
+          <p:cNvPr id="3" name="Content Placeholder 2">
+            <a:extLst>
+              <a:ext uri="{FF2B5EF4-FFF2-40B4-BE49-F238E27FC236}">
+                <a16:creationId xmlns:a16="http://schemas.microsoft.com/office/drawing/2014/main" id="{C99B1C64-EFF2-4305-9402-932FE886757F}"/>
+              </a:ext>
+            </a:extLst>
+          </p:cNvPr>
+          <p:cNvSpPr>
+            <a:spLocks noGrp="1"/>
+          </p:cNvSpPr>
+          <p:nvPr>
+            <p:ph idx="1"/>
+          </p:nvPr>
+        </p:nvSpPr>
+        <p:spPr>
+          <a:xfrm>
+            <a:off x="1499059" y="1415844"/>
+            <a:ext cx="4827999" cy="1622323"/>
+          </a:xfrm>
+        </p:spPr>
+        <p:txBody>
+          <a:bodyPr>
+            <a:noAutofit/>
+          </a:bodyPr>
+          <a:lstStyle/>
+          <a:p>
+            <a:pPr marL="0" indent="0">
+              <a:buNone/>
+            </a:pPr>
+            <a:r>
+              <a:rPr lang="en-US" sz="2600" b="1">
+                <a:latin typeface="Times New Roman" panose="02020603050405020304" pitchFamily="18" charset="0"/>
+                <a:cs typeface="Times New Roman" panose="02020603050405020304" pitchFamily="18" charset="0"/>
+              </a:rPr>
+              <a:t>Input:</a:t>
+            </a:r>
+          </a:p>
+          <a:p>
+            <a:pPr marL="0" indent="0">
+              <a:buNone/>
+            </a:pPr>
+            <a:r>
+              <a:rPr lang="en-US" sz="2600">
+                <a:latin typeface="Times New Roman" panose="02020603050405020304" pitchFamily="18" charset="0"/>
+                <a:cs typeface="Times New Roman" panose="02020603050405020304" pitchFamily="18" charset="0"/>
+              </a:rPr>
+              <a:t>“This is an example of dependency grammar”</a:t>
+            </a:r>
+          </a:p>
+        </p:txBody>
+      </p:sp>
+      <p:pic>
+        <p:nvPicPr>
+          <p:cNvPr id="4" name="Picture 3">
+            <a:extLst>
+              <a:ext uri="{FF2B5EF4-FFF2-40B4-BE49-F238E27FC236}">
+                <a16:creationId xmlns:a16="http://schemas.microsoft.com/office/drawing/2014/main" id="{A8638AC6-5CAE-409E-BDA6-723F66EA9761}"/>
+              </a:ext>
+            </a:extLst>
+          </p:cNvPr>
+          <p:cNvPicPr/>
+          <p:nvPr/>
+        </p:nvPicPr>
+        <p:blipFill>
+          <a:blip r:embed="rId2">
+            <a:extLst>
+              <a:ext uri="{28A0092B-C50C-407E-A947-70E740481C1C}">
+                <a14:useLocalDpi xmlns:a14="http://schemas.microsoft.com/office/drawing/2010/main" val="0"/>
+              </a:ext>
+            </a:extLst>
+          </a:blip>
+          <a:stretch>
+            <a:fillRect/>
+          </a:stretch>
+        </p:blipFill>
+        <p:spPr>
+          <a:xfrm>
+            <a:off x="6758957" y="1205834"/>
+            <a:ext cx="4831105" cy="2466514"/>
+          </a:xfrm>
+          <a:prstGeom prst="rect">
+            <a:avLst/>
+          </a:prstGeom>
+        </p:spPr>
+      </p:pic>
+      <p:sp>
+        <p:nvSpPr>
+          <p:cNvPr id="6" name="TextBox 5">
+            <a:extLst>
+              <a:ext uri="{FF2B5EF4-FFF2-40B4-BE49-F238E27FC236}">
+                <a16:creationId xmlns:a16="http://schemas.microsoft.com/office/drawing/2014/main" id="{D6747176-CB55-4B08-A2E1-909DDC32B7A2}"/>
+              </a:ext>
+            </a:extLst>
+          </p:cNvPr>
+          <p:cNvSpPr txBox="1"/>
+          <p:nvPr/>
+        </p:nvSpPr>
+        <p:spPr>
+          <a:xfrm>
+            <a:off x="1499059" y="3882358"/>
+            <a:ext cx="10519796" cy="2154436"/>
+          </a:xfrm>
+          <a:prstGeom prst="rect">
+            <a:avLst/>
+          </a:prstGeom>
+          <a:noFill/>
+        </p:spPr>
+        <p:txBody>
+          <a:bodyPr wrap="square" rtlCol="0">
+            <a:spAutoFit/>
+          </a:bodyPr>
+          <a:lstStyle/>
+          <a:p>
+            <a:pPr>
+              <a:spcAft>
+                <a:spcPts val="1800"/>
+              </a:spcAft>
+            </a:pPr>
+            <a:r>
+              <a:rPr lang="en-US" sz="2600" b="1">
+                <a:latin typeface="Times New Roman" panose="02020603050405020304" pitchFamily="18" charset="0"/>
+                <a:cs typeface="Times New Roman" panose="02020603050405020304" pitchFamily="18" charset="0"/>
+              </a:rPr>
+              <a:t>Output:</a:t>
+            </a:r>
+          </a:p>
+          <a:p>
+            <a:pPr>
+              <a:spcAft>
+                <a:spcPts val="1800"/>
+              </a:spcAft>
+            </a:pPr>
+            <a:r>
+              <a:rPr lang="en-US" sz="2600">
+                <a:latin typeface="Times New Roman" panose="02020603050405020304" pitchFamily="18" charset="0"/>
+                <a:cs typeface="Times New Roman" panose="02020603050405020304" pitchFamily="18" charset="0"/>
+              </a:rPr>
+              <a:t>	Dòng 1 cho thấy từ “this” làm ảnh h</a:t>
+            </a:r>
+            <a:r>
+              <a:rPr lang="vi-VN" sz="2600">
+                <a:latin typeface="Times New Roman" panose="02020603050405020304" pitchFamily="18" charset="0"/>
+                <a:cs typeface="Times New Roman" panose="02020603050405020304" pitchFamily="18" charset="0"/>
+              </a:rPr>
+              <a:t>ư</a:t>
+            </a:r>
+            <a:r>
+              <a:rPr lang="en-US" sz="2600">
+                <a:latin typeface="Times New Roman" panose="02020603050405020304" pitchFamily="18" charset="0"/>
+                <a:cs typeface="Times New Roman" panose="02020603050405020304" pitchFamily="18" charset="0"/>
+              </a:rPr>
+              <a:t>ởng đến “example” và 2 từ này có mối liên hệ là “nsubj”,</a:t>
+            </a:r>
+          </a:p>
+          <a:p>
+            <a:pPr>
+              <a:spcAft>
+                <a:spcPts val="1800"/>
+              </a:spcAft>
+            </a:pPr>
+            <a:r>
+              <a:rPr lang="en-US" sz="2600">
+                <a:latin typeface="Times New Roman" panose="02020603050405020304" pitchFamily="18" charset="0"/>
+                <a:cs typeface="Times New Roman" panose="02020603050405020304" pitchFamily="18" charset="0"/>
+              </a:rPr>
+              <a:t>	4 và 1 là vị trí trong câu của “example” và “this”</a:t>
+            </a:r>
+          </a:p>
+        </p:txBody>
+      </p:sp>
+    </p:spTree>
+    <p:extLst>
+      <p:ext uri="{BB962C8B-B14F-4D97-AF65-F5344CB8AC3E}">
+        <p14:creationId xmlns:p14="http://schemas.microsoft.com/office/powerpoint/2010/main" val="3668074390"/>
+      </p:ext>
+    </p:extLst>
+  </p:cSld>
+  <p:clrMapOvr>
+    <a:masterClrMapping/>
+  </p:clrMapOvr>
+</p:sld>
+</file>
+
 <file path=ppt/slides/slide3.xml><?xml version="1.0" encoding="utf-8"?>
 <p:sld xmlns:a="http://schemas.openxmlformats.org/drawingml/2006/main" xmlns:r="http://schemas.openxmlformats.org/officeDocument/2006/relationships" xmlns:p="http://schemas.openxmlformats.org/presentationml/2006/main">
   <p:cSld>
@@ -23240,14 +24416,6 @@
 <file path=ppt/slides/slide6.xml><?xml version="1.0" encoding="utf-8"?>
 <p:sld xmlns:a="http://schemas.openxmlformats.org/drawingml/2006/main" xmlns:r="http://schemas.openxmlformats.org/officeDocument/2006/relationships" xmlns:p="http://schemas.openxmlformats.org/presentationml/2006/main">
   <p:cSld>
-    <p:bg>
-      <p:bgPr>
-        <a:solidFill>
-          <a:schemeClr val="bg1"/>
-        </a:solidFill>
-        <a:effectLst/>
-      </p:bgPr>
-    </p:bg>
     <p:spTree>
       <p:nvGrpSpPr>
         <p:cNvPr id="1" name=""/>
@@ -23267,7 +24435,7 @@
           <p:cNvPr id="2" name="Title 1">
             <a:extLst>
               <a:ext uri="{FF2B5EF4-FFF2-40B4-BE49-F238E27FC236}">
-                <a16:creationId xmlns:a16="http://schemas.microsoft.com/office/drawing/2014/main" id="{3375D0FA-01BF-416F-B395-3B8402B7C557}"/>
+                <a16:creationId xmlns:a16="http://schemas.microsoft.com/office/drawing/2014/main" id="{96FDB508-9710-454A-B982-041493308FE9}"/>
               </a:ext>
             </a:extLst>
           </p:cNvPr>
@@ -23280,17 +24448,14 @@
         </p:nvSpPr>
         <p:spPr>
           <a:xfrm>
-            <a:off x="1528556" y="29650"/>
-            <a:ext cx="8126888" cy="1302773"/>
+            <a:off x="1312606" y="317092"/>
+            <a:ext cx="9350478" cy="892276"/>
           </a:xfrm>
         </p:spPr>
         <p:txBody>
-          <a:bodyPr>
-            <a:normAutofit fontScale="90000"/>
-          </a:bodyPr>
+          <a:bodyPr/>
           <a:lstStyle/>
           <a:p>
-            <a:pPr algn="l"/>
             <a:r>
               <a:rPr lang="en-US" b="1">
                 <a:solidFill>
@@ -23301,6 +24466,7 @@
               </a:rPr>
               <a:t>Sử dụng Stanford CoreNLP trong .NET</a:t>
             </a:r>
+            <a:endParaRPr lang="en-US"/>
           </a:p>
         </p:txBody>
       </p:sp>
@@ -23309,7 +24475,7 @@
           <p:cNvPr id="3" name="Content Placeholder 2">
             <a:extLst>
               <a:ext uri="{FF2B5EF4-FFF2-40B4-BE49-F238E27FC236}">
-                <a16:creationId xmlns:a16="http://schemas.microsoft.com/office/drawing/2014/main" id="{63A8A89F-E945-4563-94B0-32D957447F15}"/>
+                <a16:creationId xmlns:a16="http://schemas.microsoft.com/office/drawing/2014/main" id="{54C26093-D17C-41D2-B1A3-7F696E6B41E7}"/>
               </a:ext>
             </a:extLst>
           </p:cNvPr>
@@ -23322,14 +24488,12 @@
         </p:nvSpPr>
         <p:spPr>
           <a:xfrm>
-            <a:off x="1528556" y="1332423"/>
-            <a:ext cx="10389641" cy="1952787"/>
+            <a:off x="1528916" y="1037302"/>
+            <a:ext cx="10210800" cy="2391698"/>
           </a:xfrm>
         </p:spPr>
         <p:txBody>
-          <a:bodyPr>
-            <a:noAutofit/>
-          </a:bodyPr>
+          <a:bodyPr/>
           <a:lstStyle/>
           <a:p>
             <a:pPr>
@@ -23338,273 +24502,35 @@
               </a:spcAft>
             </a:pPr>
             <a:r>
-              <a:rPr lang="en-US" dirty="0">
+              <a:rPr lang="en-US">
                 <a:latin typeface="Times New Roman" panose="02020603050405020304" pitchFamily="18" charset="0"/>
                 <a:cs typeface="Times New Roman" panose="02020603050405020304" pitchFamily="18" charset="0"/>
               </a:rPr>
               <a:t>Stanford đ</a:t>
             </a:r>
             <a:r>
-              <a:rPr lang="vi-VN" dirty="0">
+              <a:rPr lang="vi-VN">
                 <a:latin typeface="Times New Roman" panose="02020603050405020304" pitchFamily="18" charset="0"/>
                 <a:cs typeface="Times New Roman" panose="02020603050405020304" pitchFamily="18" charset="0"/>
               </a:rPr>
               <a:t>ư</a:t>
             </a:r>
             <a:r>
-              <a:rPr lang="en-US" dirty="0" err="1">
-                <a:latin typeface="Times New Roman" panose="02020603050405020304" pitchFamily="18" charset="0"/>
-                <a:cs typeface="Times New Roman" panose="02020603050405020304" pitchFamily="18" charset="0"/>
-              </a:rPr>
-              <a:t>ợc</a:t>
-            </a:r>
-            <a:r>
-              <a:rPr lang="en-US" dirty="0">
-                <a:latin typeface="Times New Roman" panose="02020603050405020304" pitchFamily="18" charset="0"/>
-                <a:cs typeface="Times New Roman" panose="02020603050405020304" pitchFamily="18" charset="0"/>
-              </a:rPr>
-              <a:t> </a:t>
-            </a:r>
-            <a:r>
-              <a:rPr lang="en-US" dirty="0" err="1">
-                <a:latin typeface="Times New Roman" panose="02020603050405020304" pitchFamily="18" charset="0"/>
-                <a:cs typeface="Times New Roman" panose="02020603050405020304" pitchFamily="18" charset="0"/>
-              </a:rPr>
-              <a:t>viết</a:t>
-            </a:r>
-            <a:r>
-              <a:rPr lang="en-US" dirty="0">
-                <a:latin typeface="Times New Roman" panose="02020603050405020304" pitchFamily="18" charset="0"/>
-                <a:cs typeface="Times New Roman" panose="02020603050405020304" pitchFamily="18" charset="0"/>
-              </a:rPr>
-              <a:t> </a:t>
-            </a:r>
-            <a:r>
-              <a:rPr lang="en-US" dirty="0" err="1">
-                <a:latin typeface="Times New Roman" panose="02020603050405020304" pitchFamily="18" charset="0"/>
-                <a:cs typeface="Times New Roman" panose="02020603050405020304" pitchFamily="18" charset="0"/>
-              </a:rPr>
-              <a:t>bằng</a:t>
-            </a:r>
-            <a:r>
-              <a:rPr lang="en-US" dirty="0">
-                <a:latin typeface="Times New Roman" panose="02020603050405020304" pitchFamily="18" charset="0"/>
-                <a:cs typeface="Times New Roman" panose="02020603050405020304" pitchFamily="18" charset="0"/>
-              </a:rPr>
-              <a:t> Java. </a:t>
-            </a:r>
-            <a:r>
-              <a:rPr lang="en-US" dirty="0" err="1">
-                <a:latin typeface="Times New Roman" panose="02020603050405020304" pitchFamily="18" charset="0"/>
-                <a:cs typeface="Times New Roman" panose="02020603050405020304" pitchFamily="18" charset="0"/>
-              </a:rPr>
-              <a:t>Tuy</a:t>
-            </a:r>
-            <a:r>
-              <a:rPr lang="en-US" dirty="0">
-                <a:latin typeface="Times New Roman" panose="02020603050405020304" pitchFamily="18" charset="0"/>
-                <a:cs typeface="Times New Roman" panose="02020603050405020304" pitchFamily="18" charset="0"/>
-              </a:rPr>
-              <a:t> </a:t>
-            </a:r>
-            <a:r>
-              <a:rPr lang="en-US" dirty="0" err="1">
-                <a:latin typeface="Times New Roman" panose="02020603050405020304" pitchFamily="18" charset="0"/>
-                <a:cs typeface="Times New Roman" panose="02020603050405020304" pitchFamily="18" charset="0"/>
-              </a:rPr>
-              <a:t>nhiên</a:t>
-            </a:r>
-            <a:r>
-              <a:rPr lang="en-US" dirty="0">
-                <a:latin typeface="Times New Roman" panose="02020603050405020304" pitchFamily="18" charset="0"/>
-                <a:cs typeface="Times New Roman" panose="02020603050405020304" pitchFamily="18" charset="0"/>
-              </a:rPr>
-              <a:t> </a:t>
-            </a:r>
-            <a:r>
-              <a:rPr lang="en-US" dirty="0" err="1">
-                <a:latin typeface="Times New Roman" panose="02020603050405020304" pitchFamily="18" charset="0"/>
-                <a:cs typeface="Times New Roman" panose="02020603050405020304" pitchFamily="18" charset="0"/>
-              </a:rPr>
-              <a:t>bạn</a:t>
-            </a:r>
-            <a:r>
-              <a:rPr lang="en-US" dirty="0">
-                <a:latin typeface="Times New Roman" panose="02020603050405020304" pitchFamily="18" charset="0"/>
-                <a:cs typeface="Times New Roman" panose="02020603050405020304" pitchFamily="18" charset="0"/>
-              </a:rPr>
-              <a:t> </a:t>
-            </a:r>
-            <a:r>
-              <a:rPr lang="en-US" dirty="0" err="1">
-                <a:latin typeface="Times New Roman" panose="02020603050405020304" pitchFamily="18" charset="0"/>
-                <a:cs typeface="Times New Roman" panose="02020603050405020304" pitchFamily="18" charset="0"/>
-              </a:rPr>
-              <a:t>cũng</a:t>
-            </a:r>
-            <a:r>
-              <a:rPr lang="en-US" dirty="0">
-                <a:latin typeface="Times New Roman" panose="02020603050405020304" pitchFamily="18" charset="0"/>
-                <a:cs typeface="Times New Roman" panose="02020603050405020304" pitchFamily="18" charset="0"/>
-              </a:rPr>
-              <a:t> </a:t>
-            </a:r>
-            <a:r>
-              <a:rPr lang="en-US" dirty="0" err="1">
-                <a:latin typeface="Times New Roman" panose="02020603050405020304" pitchFamily="18" charset="0"/>
-                <a:cs typeface="Times New Roman" panose="02020603050405020304" pitchFamily="18" charset="0"/>
-              </a:rPr>
-              <a:t>có</a:t>
-            </a:r>
-            <a:r>
-              <a:rPr lang="en-US" dirty="0">
-                <a:latin typeface="Times New Roman" panose="02020603050405020304" pitchFamily="18" charset="0"/>
-                <a:cs typeface="Times New Roman" panose="02020603050405020304" pitchFamily="18" charset="0"/>
-              </a:rPr>
-              <a:t> </a:t>
-            </a:r>
-            <a:r>
-              <a:rPr lang="en-US" dirty="0" err="1">
-                <a:latin typeface="Times New Roman" panose="02020603050405020304" pitchFamily="18" charset="0"/>
-                <a:cs typeface="Times New Roman" panose="02020603050405020304" pitchFamily="18" charset="0"/>
-              </a:rPr>
-              <a:t>thể</a:t>
-            </a:r>
-            <a:r>
-              <a:rPr lang="en-US" dirty="0">
-                <a:latin typeface="Times New Roman" panose="02020603050405020304" pitchFamily="18" charset="0"/>
-                <a:cs typeface="Times New Roman" panose="02020603050405020304" pitchFamily="18" charset="0"/>
-              </a:rPr>
-              <a:t> </a:t>
-            </a:r>
-            <a:r>
-              <a:rPr lang="en-US" dirty="0" err="1">
-                <a:latin typeface="Times New Roman" panose="02020603050405020304" pitchFamily="18" charset="0"/>
-                <a:cs typeface="Times New Roman" panose="02020603050405020304" pitchFamily="18" charset="0"/>
-              </a:rPr>
-              <a:t>sử</a:t>
-            </a:r>
-            <a:r>
-              <a:rPr lang="en-US" dirty="0">
-                <a:latin typeface="Times New Roman" panose="02020603050405020304" pitchFamily="18" charset="0"/>
-                <a:cs typeface="Times New Roman" panose="02020603050405020304" pitchFamily="18" charset="0"/>
-              </a:rPr>
-              <a:t> </a:t>
-            </a:r>
-            <a:r>
-              <a:rPr lang="en-US" dirty="0" err="1">
-                <a:latin typeface="Times New Roman" panose="02020603050405020304" pitchFamily="18" charset="0"/>
-                <a:cs typeface="Times New Roman" panose="02020603050405020304" pitchFamily="18" charset="0"/>
-              </a:rPr>
-              <a:t>dụng</a:t>
-            </a:r>
-            <a:r>
-              <a:rPr lang="en-US" dirty="0">
-                <a:latin typeface="Times New Roman" panose="02020603050405020304" pitchFamily="18" charset="0"/>
-                <a:cs typeface="Times New Roman" panose="02020603050405020304" pitchFamily="18" charset="0"/>
-              </a:rPr>
-              <a:t> Stanford </a:t>
-            </a:r>
-            <a:r>
-              <a:rPr lang="en-US" dirty="0" err="1">
-                <a:latin typeface="Times New Roman" panose="02020603050405020304" pitchFamily="18" charset="0"/>
-                <a:cs typeface="Times New Roman" panose="02020603050405020304" pitchFamily="18" charset="0"/>
-              </a:rPr>
-              <a:t>CoreNLP</a:t>
-            </a:r>
-            <a:r>
-              <a:rPr lang="en-US" dirty="0">
-                <a:latin typeface="Times New Roman" panose="02020603050405020304" pitchFamily="18" charset="0"/>
-                <a:cs typeface="Times New Roman" panose="02020603050405020304" pitchFamily="18" charset="0"/>
-              </a:rPr>
-              <a:t> </a:t>
-            </a:r>
-            <a:r>
-              <a:rPr lang="en-US" dirty="0" err="1">
-                <a:latin typeface="Times New Roman" panose="02020603050405020304" pitchFamily="18" charset="0"/>
-                <a:cs typeface="Times New Roman" panose="02020603050405020304" pitchFamily="18" charset="0"/>
-              </a:rPr>
-              <a:t>bằng</a:t>
-            </a:r>
-            <a:r>
-              <a:rPr lang="en-US" dirty="0">
-                <a:latin typeface="Times New Roman" panose="02020603050405020304" pitchFamily="18" charset="0"/>
-                <a:cs typeface="Times New Roman" panose="02020603050405020304" pitchFamily="18" charset="0"/>
-              </a:rPr>
-              <a:t> </a:t>
-            </a:r>
-            <a:r>
-              <a:rPr lang="en-US" dirty="0" err="1">
-                <a:latin typeface="Times New Roman" panose="02020603050405020304" pitchFamily="18" charset="0"/>
-                <a:cs typeface="Times New Roman" panose="02020603050405020304" pitchFamily="18" charset="0"/>
-              </a:rPr>
-              <a:t>những</a:t>
-            </a:r>
-            <a:r>
-              <a:rPr lang="en-US" dirty="0">
-                <a:latin typeface="Times New Roman" panose="02020603050405020304" pitchFamily="18" charset="0"/>
-                <a:cs typeface="Times New Roman" panose="02020603050405020304" pitchFamily="18" charset="0"/>
-              </a:rPr>
-              <a:t> </a:t>
-            </a:r>
-            <a:r>
-              <a:rPr lang="en-US" dirty="0" err="1">
-                <a:latin typeface="Times New Roman" panose="02020603050405020304" pitchFamily="18" charset="0"/>
-                <a:cs typeface="Times New Roman" panose="02020603050405020304" pitchFamily="18" charset="0"/>
-              </a:rPr>
-              <a:t>ngôn</a:t>
-            </a:r>
-            <a:r>
-              <a:rPr lang="en-US" dirty="0">
-                <a:latin typeface="Times New Roman" panose="02020603050405020304" pitchFamily="18" charset="0"/>
-                <a:cs typeface="Times New Roman" panose="02020603050405020304" pitchFamily="18" charset="0"/>
-              </a:rPr>
-              <a:t> </a:t>
-            </a:r>
-            <a:r>
-              <a:rPr lang="en-US" dirty="0" err="1">
-                <a:latin typeface="Times New Roman" panose="02020603050405020304" pitchFamily="18" charset="0"/>
-                <a:cs typeface="Times New Roman" panose="02020603050405020304" pitchFamily="18" charset="0"/>
-              </a:rPr>
-              <a:t>ngữ</a:t>
-            </a:r>
-            <a:r>
-              <a:rPr lang="en-US" dirty="0">
-                <a:latin typeface="Times New Roman" panose="02020603050405020304" pitchFamily="18" charset="0"/>
-                <a:cs typeface="Times New Roman" panose="02020603050405020304" pitchFamily="18" charset="0"/>
-              </a:rPr>
-              <a:t> </a:t>
-            </a:r>
-            <a:r>
-              <a:rPr lang="en-US" dirty="0" err="1">
-                <a:latin typeface="Times New Roman" panose="02020603050405020304" pitchFamily="18" charset="0"/>
-                <a:cs typeface="Times New Roman" panose="02020603050405020304" pitchFamily="18" charset="0"/>
-              </a:rPr>
-              <a:t>khác</a:t>
-            </a:r>
-            <a:r>
-              <a:rPr lang="en-US" dirty="0">
-                <a:latin typeface="Times New Roman" panose="02020603050405020304" pitchFamily="18" charset="0"/>
-                <a:cs typeface="Times New Roman" panose="02020603050405020304" pitchFamily="18" charset="0"/>
-              </a:rPr>
-              <a:t> </a:t>
-            </a:r>
-            <a:r>
-              <a:rPr lang="en-US" dirty="0" err="1">
-                <a:latin typeface="Times New Roman" panose="02020603050405020304" pitchFamily="18" charset="0"/>
-                <a:cs typeface="Times New Roman" panose="02020603050405020304" pitchFamily="18" charset="0"/>
-              </a:rPr>
-              <a:t>nh</a:t>
-            </a:r>
-            <a:r>
-              <a:rPr lang="vi-VN" dirty="0">
+              <a:rPr lang="en-US">
+                <a:latin typeface="Times New Roman" panose="02020603050405020304" pitchFamily="18" charset="0"/>
+                <a:cs typeface="Times New Roman" panose="02020603050405020304" pitchFamily="18" charset="0"/>
+              </a:rPr>
+              <a:t>ợc viết bằng Java. Tuy nhiên bạn cũng có thể sử dụng Stanford CoreNLP bằng những ngôn ngữ khác nh</a:t>
+            </a:r>
+            <a:r>
+              <a:rPr lang="vi-VN">
                 <a:latin typeface="Times New Roman" panose="02020603050405020304" pitchFamily="18" charset="0"/>
                 <a:cs typeface="Times New Roman" panose="02020603050405020304" pitchFamily="18" charset="0"/>
               </a:rPr>
               <a:t>ư</a:t>
             </a:r>
             <a:r>
-              <a:rPr lang="en-US" dirty="0">
+              <a:rPr lang="en-US">
                 <a:latin typeface="Times New Roman" panose="02020603050405020304" pitchFamily="18" charset="0"/>
                 <a:cs typeface="Times New Roman" panose="02020603050405020304" pitchFamily="18" charset="0"/>
               </a:rPr>
@@ -23618,147 +24544,35 @@
               </a:spcAft>
             </a:pPr>
             <a:r>
-              <a:rPr lang="en-US" dirty="0" err="1">
-                <a:latin typeface="Times New Roman" panose="02020603050405020304" pitchFamily="18" charset="0"/>
-                <a:cs typeface="Times New Roman" panose="02020603050405020304" pitchFamily="18" charset="0"/>
-              </a:rPr>
-              <a:t>Trong</a:t>
-            </a:r>
-            <a:r>
-              <a:rPr lang="en-US" dirty="0">
-                <a:latin typeface="Times New Roman" panose="02020603050405020304" pitchFamily="18" charset="0"/>
-                <a:cs typeface="Times New Roman" panose="02020603050405020304" pitchFamily="18" charset="0"/>
-              </a:rPr>
-              <a:t> .NET </a:t>
-            </a:r>
-            <a:r>
-              <a:rPr lang="en-US" dirty="0" err="1">
-                <a:latin typeface="Times New Roman" panose="02020603050405020304" pitchFamily="18" charset="0"/>
-                <a:cs typeface="Times New Roman" panose="02020603050405020304" pitchFamily="18" charset="0"/>
-              </a:rPr>
-              <a:t>bạn</a:t>
-            </a:r>
-            <a:r>
-              <a:rPr lang="en-US" dirty="0">
-                <a:latin typeface="Times New Roman" panose="02020603050405020304" pitchFamily="18" charset="0"/>
-                <a:cs typeface="Times New Roman" panose="02020603050405020304" pitchFamily="18" charset="0"/>
-              </a:rPr>
-              <a:t> </a:t>
-            </a:r>
-            <a:r>
-              <a:rPr lang="en-US" dirty="0" err="1">
-                <a:latin typeface="Times New Roman" panose="02020603050405020304" pitchFamily="18" charset="0"/>
-                <a:cs typeface="Times New Roman" panose="02020603050405020304" pitchFamily="18" charset="0"/>
-              </a:rPr>
-              <a:t>có</a:t>
-            </a:r>
-            <a:r>
-              <a:rPr lang="en-US" dirty="0">
-                <a:latin typeface="Times New Roman" panose="02020603050405020304" pitchFamily="18" charset="0"/>
-                <a:cs typeface="Times New Roman" panose="02020603050405020304" pitchFamily="18" charset="0"/>
-              </a:rPr>
-              <a:t> </a:t>
-            </a:r>
-            <a:r>
-              <a:rPr lang="en-US" dirty="0" err="1">
-                <a:latin typeface="Times New Roman" panose="02020603050405020304" pitchFamily="18" charset="0"/>
-                <a:cs typeface="Times New Roman" panose="02020603050405020304" pitchFamily="18" charset="0"/>
-              </a:rPr>
-              <a:t>thể</a:t>
-            </a:r>
-            <a:r>
-              <a:rPr lang="en-US" dirty="0">
-                <a:latin typeface="Times New Roman" panose="02020603050405020304" pitchFamily="18" charset="0"/>
-                <a:cs typeface="Times New Roman" panose="02020603050405020304" pitchFamily="18" charset="0"/>
-              </a:rPr>
-              <a:t> </a:t>
-            </a:r>
-            <a:r>
-              <a:rPr lang="en-US" dirty="0" err="1">
-                <a:latin typeface="Times New Roman" panose="02020603050405020304" pitchFamily="18" charset="0"/>
-                <a:cs typeface="Times New Roman" panose="02020603050405020304" pitchFamily="18" charset="0"/>
-              </a:rPr>
-              <a:t>cài</a:t>
-            </a:r>
-            <a:r>
-              <a:rPr lang="en-US" dirty="0">
-                <a:latin typeface="Times New Roman" panose="02020603050405020304" pitchFamily="18" charset="0"/>
-                <a:cs typeface="Times New Roman" panose="02020603050405020304" pitchFamily="18" charset="0"/>
-              </a:rPr>
-              <a:t> </a:t>
-            </a:r>
-            <a:r>
-              <a:rPr lang="en-US" dirty="0" err="1">
-                <a:latin typeface="Times New Roman" panose="02020603050405020304" pitchFamily="18" charset="0"/>
-                <a:cs typeface="Times New Roman" panose="02020603050405020304" pitchFamily="18" charset="0"/>
-              </a:rPr>
-              <a:t>đặt</a:t>
-            </a:r>
-            <a:r>
-              <a:rPr lang="en-US" dirty="0">
-                <a:latin typeface="Times New Roman" panose="02020603050405020304" pitchFamily="18" charset="0"/>
-                <a:cs typeface="Times New Roman" panose="02020603050405020304" pitchFamily="18" charset="0"/>
-              </a:rPr>
-              <a:t> </a:t>
-            </a:r>
-            <a:r>
-              <a:rPr lang="en-US" dirty="0" err="1">
-                <a:latin typeface="Times New Roman" panose="02020603050405020304" pitchFamily="18" charset="0"/>
-                <a:cs typeface="Times New Roman" panose="02020603050405020304" pitchFamily="18" charset="0"/>
-              </a:rPr>
-              <a:t>th</a:t>
-            </a:r>
-            <a:r>
-              <a:rPr lang="vi-VN" dirty="0">
+              <a:rPr lang="en-US">
+                <a:latin typeface="Times New Roman" panose="02020603050405020304" pitchFamily="18" charset="0"/>
+                <a:cs typeface="Times New Roman" panose="02020603050405020304" pitchFamily="18" charset="0"/>
+              </a:rPr>
+              <a:t>Trong .NET bạn có thể cài đặt th</a:t>
+            </a:r>
+            <a:r>
+              <a:rPr lang="vi-VN">
                 <a:latin typeface="Times New Roman" panose="02020603050405020304" pitchFamily="18" charset="0"/>
                 <a:cs typeface="Times New Roman" panose="02020603050405020304" pitchFamily="18" charset="0"/>
               </a:rPr>
               <a:t>ư</a:t>
             </a:r>
             <a:r>
-              <a:rPr lang="en-US" dirty="0">
-                <a:latin typeface="Times New Roman" panose="02020603050405020304" pitchFamily="18" charset="0"/>
-                <a:cs typeface="Times New Roman" panose="02020603050405020304" pitchFamily="18" charset="0"/>
-              </a:rPr>
-              <a:t> </a:t>
-            </a:r>
-            <a:r>
-              <a:rPr lang="en-US" dirty="0" err="1">
-                <a:latin typeface="Times New Roman" panose="02020603050405020304" pitchFamily="18" charset="0"/>
-                <a:cs typeface="Times New Roman" panose="02020603050405020304" pitchFamily="18" charset="0"/>
-              </a:rPr>
-              <a:t>viện</a:t>
-            </a:r>
-            <a:r>
-              <a:rPr lang="en-US" dirty="0">
-                <a:latin typeface="Times New Roman" panose="02020603050405020304" pitchFamily="18" charset="0"/>
-                <a:cs typeface="Times New Roman" panose="02020603050405020304" pitchFamily="18" charset="0"/>
-              </a:rPr>
-              <a:t> Stanford </a:t>
-            </a:r>
-            <a:r>
-              <a:rPr lang="en-US" dirty="0" err="1">
-                <a:latin typeface="Times New Roman" panose="02020603050405020304" pitchFamily="18" charset="0"/>
-                <a:cs typeface="Times New Roman" panose="02020603050405020304" pitchFamily="18" charset="0"/>
-              </a:rPr>
-              <a:t>CoreNLP</a:t>
-            </a:r>
-            <a:r>
-              <a:rPr lang="en-US" dirty="0">
-                <a:latin typeface="Times New Roman" panose="02020603050405020304" pitchFamily="18" charset="0"/>
-                <a:cs typeface="Times New Roman" panose="02020603050405020304" pitchFamily="18" charset="0"/>
-              </a:rPr>
-              <a:t> qua NuGet packages</a:t>
+              <a:rPr lang="en-US">
+                <a:latin typeface="Times New Roman" panose="02020603050405020304" pitchFamily="18" charset="0"/>
+                <a:cs typeface="Times New Roman" panose="02020603050405020304" pitchFamily="18" charset="0"/>
+              </a:rPr>
+              <a:t> viện Stanford CoreNLP qua NuGet packages</a:t>
             </a:r>
           </a:p>
         </p:txBody>
       </p:sp>
       <p:pic>
         <p:nvPicPr>
-          <p:cNvPr id="8" name="Picture 7" descr="A screenshot of a social media post&#10;&#10;Description generated with very high confidence">
+          <p:cNvPr id="4" name="Picture 3" descr="A screenshot of a social media post&#10;&#10;Description generated with very high confidence">
             <a:extLst>
               <a:ext uri="{FF2B5EF4-FFF2-40B4-BE49-F238E27FC236}">
-                <a16:creationId xmlns:a16="http://schemas.microsoft.com/office/drawing/2014/main" id="{9FBA958E-F809-4515-BCBD-CF0F241EA837}"/>
+                <a16:creationId xmlns:a16="http://schemas.microsoft.com/office/drawing/2014/main" id="{3714EA45-0EA7-4FE0-84FE-6294A25E2C48}"/>
               </a:ext>
             </a:extLst>
           </p:cNvPr>
@@ -23775,7 +24589,7 @@
         </p:blipFill>
         <p:spPr>
           <a:xfrm>
-            <a:off x="1796149" y="3429000"/>
+            <a:off x="1941152" y="3429000"/>
             <a:ext cx="9606477" cy="2712033"/>
           </a:xfrm>
           <a:prstGeom prst="rect">
@@ -23786,7 +24600,7 @@
     </p:spTree>
     <p:extLst>
       <p:ext uri="{BB962C8B-B14F-4D97-AF65-F5344CB8AC3E}">
-        <p14:creationId xmlns:p14="http://schemas.microsoft.com/office/powerpoint/2010/main" val="1871652294"/>
+        <p14:creationId xmlns:p14="http://schemas.microsoft.com/office/powerpoint/2010/main" val="2316484128"/>
       </p:ext>
     </p:extLst>
   </p:cSld>

</xml_diff>

<commit_message>
upadte tokenizer slide - add code demo
</commit_message>
<xml_diff>
--- a/Seminar/Stanford_CoreNLP.pptx
+++ b/Seminar/Stanford_CoreNLP.pptx
@@ -5,7 +5,7 @@
     <p:sldMasterId id="2147483660" r:id="rId1"/>
   </p:sldMasterIdLst>
   <p:notesMasterIdLst>
-    <p:notesMasterId r:id="rId29"/>
+    <p:notesMasterId r:id="rId30"/>
   </p:notesMasterIdLst>
   <p:sldIdLst>
     <p:sldId id="256" r:id="rId2"/>
@@ -17,24 +17,25 @@
     <p:sldId id="258" r:id="rId8"/>
     <p:sldId id="268" r:id="rId9"/>
     <p:sldId id="273" r:id="rId10"/>
-    <p:sldId id="274" r:id="rId11"/>
-    <p:sldId id="272" r:id="rId12"/>
-    <p:sldId id="264" r:id="rId13"/>
-    <p:sldId id="265" r:id="rId14"/>
-    <p:sldId id="266" r:id="rId15"/>
-    <p:sldId id="267" r:id="rId16"/>
-    <p:sldId id="283" r:id="rId17"/>
-    <p:sldId id="284" r:id="rId18"/>
-    <p:sldId id="285" r:id="rId19"/>
-    <p:sldId id="286" r:id="rId20"/>
-    <p:sldId id="287" r:id="rId21"/>
-    <p:sldId id="275" r:id="rId22"/>
-    <p:sldId id="276" r:id="rId23"/>
-    <p:sldId id="277" r:id="rId24"/>
-    <p:sldId id="278" r:id="rId25"/>
-    <p:sldId id="279" r:id="rId26"/>
-    <p:sldId id="280" r:id="rId27"/>
-    <p:sldId id="281" r:id="rId28"/>
+    <p:sldId id="272" r:id="rId11"/>
+    <p:sldId id="288" r:id="rId12"/>
+    <p:sldId id="290" r:id="rId13"/>
+    <p:sldId id="264" r:id="rId14"/>
+    <p:sldId id="265" r:id="rId15"/>
+    <p:sldId id="266" r:id="rId16"/>
+    <p:sldId id="267" r:id="rId17"/>
+    <p:sldId id="283" r:id="rId18"/>
+    <p:sldId id="284" r:id="rId19"/>
+    <p:sldId id="285" r:id="rId20"/>
+    <p:sldId id="286" r:id="rId21"/>
+    <p:sldId id="287" r:id="rId22"/>
+    <p:sldId id="275" r:id="rId23"/>
+    <p:sldId id="276" r:id="rId24"/>
+    <p:sldId id="277" r:id="rId25"/>
+    <p:sldId id="278" r:id="rId26"/>
+    <p:sldId id="279" r:id="rId27"/>
+    <p:sldId id="280" r:id="rId28"/>
+    <p:sldId id="281" r:id="rId29"/>
   </p:sldIdLst>
   <p:sldSz cx="12192000" cy="6858000"/>
   <p:notesSz cx="6858000" cy="9144000"/>
@@ -142,6 +143,10 @@
     </p:ext>
   </p:extLst>
 </p:presentation>
+</file>
+
+<file path=ppt/revisionInfo.xml><?xml version="1.0" encoding="utf-8"?>
+<p1510:revInfo xmlns:a="http://schemas.openxmlformats.org/drawingml/2006/main" xmlns:r="http://schemas.openxmlformats.org/officeDocument/2006/relationships" xmlns:p1510="http://schemas.microsoft.com/office/powerpoint/2015/10/main"/>
 </file>
 
 <file path=ppt/diagrams/colors1.xml><?xml version="1.0" encoding="utf-8"?>
@@ -1272,16 +1277,12 @@
         <a:lstStyle/>
         <a:p>
           <a:r>
-            <a:rPr lang="en-US" sz="2600">
+            <a:rPr lang="en-US" sz="2600" dirty="0">
               <a:latin typeface="Times New Roman" panose="02020603050405020304" pitchFamily="18" charset="0"/>
               <a:cs typeface="Times New Roman" panose="02020603050405020304" pitchFamily="18" charset="0"/>
             </a:rPr>
             <a:t>The parser</a:t>
           </a:r>
-          <a:endParaRPr lang="en-US" sz="2600" dirty="0">
-            <a:latin typeface="Times New Roman" panose="02020603050405020304" pitchFamily="18" charset="0"/>
-            <a:cs typeface="Times New Roman" panose="02020603050405020304" pitchFamily="18" charset="0"/>
-          </a:endParaRPr>
         </a:p>
       </dgm:t>
     </dgm:pt>
@@ -1844,16 +1845,12 @@
             <a:buChar char="•"/>
           </a:pPr>
           <a:r>
-            <a:rPr lang="en-US" sz="2600" kern="1200">
+            <a:rPr lang="en-US" sz="2600" kern="1200" dirty="0">
               <a:latin typeface="Times New Roman" panose="02020603050405020304" pitchFamily="18" charset="0"/>
               <a:cs typeface="Times New Roman" panose="02020603050405020304" pitchFamily="18" charset="0"/>
             </a:rPr>
             <a:t>The parser</a:t>
           </a:r>
-          <a:endParaRPr lang="en-US" sz="2600" kern="1200" dirty="0">
-            <a:latin typeface="Times New Roman" panose="02020603050405020304" pitchFamily="18" charset="0"/>
-            <a:cs typeface="Times New Roman" panose="02020603050405020304" pitchFamily="18" charset="0"/>
-          </a:endParaRPr>
         </a:p>
         <a:p>
           <a:pPr marL="228600" lvl="1" indent="-228600" algn="l" defTabSz="1155700">
@@ -3753,7 +3750,7 @@
           <a:p>
             <a:fld id="{78BBFBE1-F28B-4D2E-997C-B307AD86A0C8}" type="slidenum">
               <a:rPr lang="en-US" smtClean="0"/>
-              <a:t>12</a:t>
+              <a:t>13</a:t>
             </a:fld>
             <a:endParaRPr lang="en-US"/>
           </a:p>
@@ -3837,7 +3834,7 @@
           <a:p>
             <a:fld id="{78BBFBE1-F28B-4D2E-997C-B307AD86A0C8}" type="slidenum">
               <a:rPr lang="en-US" smtClean="0"/>
-              <a:t>13</a:t>
+              <a:t>14</a:t>
             </a:fld>
             <a:endParaRPr lang="en-US"/>
           </a:p>
@@ -3921,7 +3918,7 @@
           <a:p>
             <a:fld id="{78BBFBE1-F28B-4D2E-997C-B307AD86A0C8}" type="slidenum">
               <a:rPr lang="en-US" smtClean="0"/>
-              <a:t>14</a:t>
+              <a:t>15</a:t>
             </a:fld>
             <a:endParaRPr lang="en-US"/>
           </a:p>
@@ -4005,7 +4002,7 @@
           <a:p>
             <a:fld id="{78BBFBE1-F28B-4D2E-997C-B307AD86A0C8}" type="slidenum">
               <a:rPr lang="en-US" smtClean="0"/>
-              <a:t>15</a:t>
+              <a:t>16</a:t>
             </a:fld>
             <a:endParaRPr lang="en-US"/>
           </a:p>
@@ -4089,7 +4086,7 @@
           <a:p>
             <a:fld id="{78BBFBE1-F28B-4D2E-997C-B307AD86A0C8}" type="slidenum">
               <a:rPr lang="en-US" smtClean="0"/>
-              <a:t>18</a:t>
+              <a:t>19</a:t>
             </a:fld>
             <a:endParaRPr lang="en-US"/>
           </a:p>
@@ -4173,7 +4170,7 @@
           <a:p>
             <a:fld id="{415931D0-8F45-45FA-A05E-D11DF5C9AD02}" type="slidenum">
               <a:rPr lang="en-US" smtClean="0"/>
-              <a:t>24</a:t>
+              <a:t>25</a:t>
             </a:fld>
             <a:endParaRPr lang="en-US"/>
           </a:p>
@@ -10352,7 +10349,7 @@
           <p:cNvPr id="3" name="Content Placeholder 2">
             <a:extLst>
               <a:ext uri="{FF2B5EF4-FFF2-40B4-BE49-F238E27FC236}">
-                <a16:creationId xmlns:a16="http://schemas.microsoft.com/office/drawing/2014/main" id="{77CB0060-EA5E-40CD-87BE-643EDBDB86B0}"/>
+                <a16:creationId xmlns:a16="http://schemas.microsoft.com/office/drawing/2014/main" id="{46319F7C-AEAD-471F-947F-60F56F29266F}"/>
               </a:ext>
             </a:extLst>
           </p:cNvPr>
@@ -10365,393 +10362,368 @@
         </p:nvSpPr>
         <p:spPr>
           <a:xfrm>
-            <a:off x="1484310" y="2573383"/>
-            <a:ext cx="10018713" cy="3596640"/>
+            <a:off x="1280161" y="2438399"/>
+            <a:ext cx="10222863" cy="3352801"/>
           </a:xfrm>
         </p:spPr>
         <p:txBody>
           <a:bodyPr>
-            <a:noAutofit/>
+            <a:normAutofit/>
           </a:bodyPr>
           <a:lstStyle/>
           <a:p>
-            <a:pPr lvl="1">
-              <a:buFont typeface="Arial" panose="020B0604020202020204" pitchFamily="34" charset="0"/>
-              <a:buChar char="•"/>
-            </a:pPr>
-            <a:r>
-              <a:rPr lang="en-US" sz="2400" dirty="0" err="1">
+            <a:r>
+              <a:rPr lang="en-US" dirty="0" err="1">
                 <a:latin typeface="Times New Roman" panose="02020603050405020304" pitchFamily="18" charset="0"/>
                 <a:cs typeface="Times New Roman" panose="02020603050405020304" pitchFamily="18" charset="0"/>
               </a:rPr>
               <a:t>Tiếng</a:t>
             </a:r>
             <a:r>
-              <a:rPr lang="en-US" sz="2400" dirty="0">
+              <a:rPr lang="en-US" dirty="0">
                 <a:latin typeface="Times New Roman" panose="02020603050405020304" pitchFamily="18" charset="0"/>
                 <a:cs typeface="Times New Roman" panose="02020603050405020304" pitchFamily="18" charset="0"/>
               </a:rPr>
               <a:t> Anh </a:t>
             </a:r>
             <a:r>
-              <a:rPr lang="en-US" sz="2400" dirty="0" err="1">
+              <a:rPr lang="en-US" dirty="0" err="1">
                 <a:latin typeface="Times New Roman" panose="02020603050405020304" pitchFamily="18" charset="0"/>
                 <a:cs typeface="Times New Roman" panose="02020603050405020304" pitchFamily="18" charset="0"/>
               </a:rPr>
               <a:t>sử</a:t>
             </a:r>
             <a:r>
-              <a:rPr lang="en-US" sz="2400" dirty="0">
-                <a:latin typeface="Times New Roman" panose="02020603050405020304" pitchFamily="18" charset="0"/>
-                <a:cs typeface="Times New Roman" panose="02020603050405020304" pitchFamily="18" charset="0"/>
-              </a:rPr>
-              <a:t> </a:t>
-            </a:r>
-            <a:r>
-              <a:rPr lang="en-US" sz="2400" dirty="0" err="1">
+              <a:rPr lang="en-US" dirty="0">
+                <a:latin typeface="Times New Roman" panose="02020603050405020304" pitchFamily="18" charset="0"/>
+                <a:cs typeface="Times New Roman" panose="02020603050405020304" pitchFamily="18" charset="0"/>
+              </a:rPr>
+              <a:t> </a:t>
+            </a:r>
+            <a:r>
+              <a:rPr lang="en-US" dirty="0" err="1">
                 <a:latin typeface="Times New Roman" panose="02020603050405020304" pitchFamily="18" charset="0"/>
                 <a:cs typeface="Times New Roman" panose="02020603050405020304" pitchFamily="18" charset="0"/>
               </a:rPr>
               <a:t>và</a:t>
             </a:r>
             <a:r>
-              <a:rPr lang="en-US" sz="2400" dirty="0">
-                <a:latin typeface="Times New Roman" panose="02020603050405020304" pitchFamily="18" charset="0"/>
-                <a:cs typeface="Times New Roman" panose="02020603050405020304" pitchFamily="18" charset="0"/>
-              </a:rPr>
-              <a:t> </a:t>
-            </a:r>
-            <a:r>
-              <a:rPr lang="en-US" sz="2400" dirty="0" err="1">
+              <a:rPr lang="en-US" dirty="0">
+                <a:latin typeface="Times New Roman" panose="02020603050405020304" pitchFamily="18" charset="0"/>
+                <a:cs typeface="Times New Roman" panose="02020603050405020304" pitchFamily="18" charset="0"/>
+              </a:rPr>
+              <a:t> </a:t>
+            </a:r>
+            <a:r>
+              <a:rPr lang="en-US" dirty="0" err="1">
                 <a:latin typeface="Times New Roman" panose="02020603050405020304" pitchFamily="18" charset="0"/>
                 <a:cs typeface="Times New Roman" panose="02020603050405020304" pitchFamily="18" charset="0"/>
               </a:rPr>
               <a:t>nhiều</a:t>
             </a:r>
             <a:r>
-              <a:rPr lang="en-US" sz="2400" dirty="0">
-                <a:latin typeface="Times New Roman" panose="02020603050405020304" pitchFamily="18" charset="0"/>
-                <a:cs typeface="Times New Roman" panose="02020603050405020304" pitchFamily="18" charset="0"/>
-              </a:rPr>
-              <a:t> </a:t>
-            </a:r>
-            <a:r>
-              <a:rPr lang="en-US" sz="2400" dirty="0" err="1">
+              <a:rPr lang="en-US" dirty="0">
+                <a:latin typeface="Times New Roman" panose="02020603050405020304" pitchFamily="18" charset="0"/>
+                <a:cs typeface="Times New Roman" panose="02020603050405020304" pitchFamily="18" charset="0"/>
+              </a:rPr>
+              <a:t> </a:t>
+            </a:r>
+            <a:r>
+              <a:rPr lang="en-US" dirty="0" err="1">
                 <a:latin typeface="Times New Roman" panose="02020603050405020304" pitchFamily="18" charset="0"/>
                 <a:cs typeface="Times New Roman" panose="02020603050405020304" pitchFamily="18" charset="0"/>
               </a:rPr>
               <a:t>ngôn</a:t>
             </a:r>
             <a:r>
-              <a:rPr lang="en-US" sz="2400" dirty="0">
-                <a:latin typeface="Times New Roman" panose="02020603050405020304" pitchFamily="18" charset="0"/>
-                <a:cs typeface="Times New Roman" panose="02020603050405020304" pitchFamily="18" charset="0"/>
-              </a:rPr>
-              <a:t> </a:t>
-            </a:r>
-            <a:r>
-              <a:rPr lang="en-US" sz="2400" dirty="0" err="1">
+              <a:rPr lang="en-US" dirty="0">
+                <a:latin typeface="Times New Roman" panose="02020603050405020304" pitchFamily="18" charset="0"/>
+                <a:cs typeface="Times New Roman" panose="02020603050405020304" pitchFamily="18" charset="0"/>
+              </a:rPr>
+              <a:t> </a:t>
+            </a:r>
+            <a:r>
+              <a:rPr lang="en-US" dirty="0" err="1">
                 <a:latin typeface="Times New Roman" panose="02020603050405020304" pitchFamily="18" charset="0"/>
                 <a:cs typeface="Times New Roman" panose="02020603050405020304" pitchFamily="18" charset="0"/>
               </a:rPr>
               <a:t>ngữ</a:t>
             </a:r>
             <a:r>
-              <a:rPr lang="en-US" sz="2400" dirty="0">
-                <a:latin typeface="Times New Roman" panose="02020603050405020304" pitchFamily="18" charset="0"/>
-                <a:cs typeface="Times New Roman" panose="02020603050405020304" pitchFamily="18" charset="0"/>
-              </a:rPr>
-              <a:t> </a:t>
-            </a:r>
-            <a:r>
-              <a:rPr lang="en-US" sz="2400" dirty="0" err="1">
+              <a:rPr lang="en-US" dirty="0">
+                <a:latin typeface="Times New Roman" panose="02020603050405020304" pitchFamily="18" charset="0"/>
+                <a:cs typeface="Times New Roman" panose="02020603050405020304" pitchFamily="18" charset="0"/>
+              </a:rPr>
+              <a:t> </a:t>
+            </a:r>
+            <a:r>
+              <a:rPr lang="en-US" dirty="0" err="1">
                 <a:latin typeface="Times New Roman" panose="02020603050405020304" pitchFamily="18" charset="0"/>
                 <a:cs typeface="Times New Roman" panose="02020603050405020304" pitchFamily="18" charset="0"/>
               </a:rPr>
               <a:t>sử</a:t>
             </a:r>
             <a:r>
-              <a:rPr lang="en-US" sz="2400" dirty="0">
-                <a:latin typeface="Times New Roman" panose="02020603050405020304" pitchFamily="18" charset="0"/>
-                <a:cs typeface="Times New Roman" panose="02020603050405020304" pitchFamily="18" charset="0"/>
-              </a:rPr>
-              <a:t> </a:t>
-            </a:r>
-            <a:r>
-              <a:rPr lang="en-US" sz="2400" dirty="0" err="1">
+              <a:rPr lang="en-US" dirty="0">
+                <a:latin typeface="Times New Roman" panose="02020603050405020304" pitchFamily="18" charset="0"/>
+                <a:cs typeface="Times New Roman" panose="02020603050405020304" pitchFamily="18" charset="0"/>
+              </a:rPr>
+              <a:t> </a:t>
+            </a:r>
+            <a:r>
+              <a:rPr lang="en-US" dirty="0" err="1">
                 <a:latin typeface="Times New Roman" panose="02020603050405020304" pitchFamily="18" charset="0"/>
                 <a:cs typeface="Times New Roman" panose="02020603050405020304" pitchFamily="18" charset="0"/>
               </a:rPr>
               <a:t>dụng</a:t>
             </a:r>
             <a:r>
-              <a:rPr lang="en-US" sz="2400" dirty="0">
-                <a:latin typeface="Times New Roman" panose="02020603050405020304" pitchFamily="18" charset="0"/>
-                <a:cs typeface="Times New Roman" panose="02020603050405020304" pitchFamily="18" charset="0"/>
-              </a:rPr>
-              <a:t> </a:t>
-            </a:r>
-            <a:r>
-              <a:rPr lang="en-US" sz="2400" dirty="0" err="1">
-                <a:latin typeface="Times New Roman" panose="02020603050405020304" pitchFamily="18" charset="0"/>
-                <a:cs typeface="Times New Roman" panose="02020603050405020304" pitchFamily="18" charset="0"/>
-              </a:rPr>
-              <a:t>khoảng</a:t>
-            </a:r>
-            <a:r>
-              <a:rPr lang="en-US" sz="2400" dirty="0">
-                <a:latin typeface="Times New Roman" panose="02020603050405020304" pitchFamily="18" charset="0"/>
-                <a:cs typeface="Times New Roman" panose="02020603050405020304" pitchFamily="18" charset="0"/>
-              </a:rPr>
-              <a:t> </a:t>
-            </a:r>
-            <a:r>
-              <a:rPr lang="en-US" sz="2400" dirty="0" err="1">
-                <a:latin typeface="Times New Roman" panose="02020603050405020304" pitchFamily="18" charset="0"/>
-                <a:cs typeface="Times New Roman" panose="02020603050405020304" pitchFamily="18" charset="0"/>
-              </a:rPr>
-              <a:t>trắng</a:t>
-            </a:r>
-            <a:r>
-              <a:rPr lang="en-US" sz="2400" dirty="0">
-                <a:latin typeface="Times New Roman" panose="02020603050405020304" pitchFamily="18" charset="0"/>
-                <a:cs typeface="Times New Roman" panose="02020603050405020304" pitchFamily="18" charset="0"/>
-              </a:rPr>
-              <a:t> </a:t>
-            </a:r>
-            <a:r>
-              <a:rPr lang="en-US" sz="2400" dirty="0" err="1">
+              <a:rPr lang="en-US" dirty="0">
+                <a:latin typeface="Times New Roman" panose="02020603050405020304" pitchFamily="18" charset="0"/>
+                <a:cs typeface="Times New Roman" panose="02020603050405020304" pitchFamily="18" charset="0"/>
+              </a:rPr>
+              <a:t> </a:t>
+            </a:r>
+            <a:r>
+              <a:rPr lang="en-US" dirty="0" err="1">
+                <a:latin typeface="Times New Roman" panose="02020603050405020304" pitchFamily="18" charset="0"/>
+                <a:cs typeface="Times New Roman" panose="02020603050405020304" pitchFamily="18" charset="0"/>
+              </a:rPr>
+              <a:t>dấu</a:t>
+            </a:r>
+            <a:r>
+              <a:rPr lang="en-US" dirty="0">
+                <a:latin typeface="Times New Roman" panose="02020603050405020304" pitchFamily="18" charset="0"/>
+                <a:cs typeface="Times New Roman" panose="02020603050405020304" pitchFamily="18" charset="0"/>
+              </a:rPr>
+              <a:t> </a:t>
+            </a:r>
+            <a:r>
+              <a:rPr lang="en-US" dirty="0" err="1">
+                <a:latin typeface="Times New Roman" panose="02020603050405020304" pitchFamily="18" charset="0"/>
+                <a:cs typeface="Times New Roman" panose="02020603050405020304" pitchFamily="18" charset="0"/>
+              </a:rPr>
+              <a:t>chấm</a:t>
+            </a:r>
+            <a:r>
+              <a:rPr lang="en-US" dirty="0">
+                <a:latin typeface="Times New Roman" panose="02020603050405020304" pitchFamily="18" charset="0"/>
+                <a:cs typeface="Times New Roman" panose="02020603050405020304" pitchFamily="18" charset="0"/>
+              </a:rPr>
+              <a:t> </a:t>
+            </a:r>
+            <a:r>
+              <a:rPr lang="en-US" dirty="0" err="1">
+                <a:latin typeface="Times New Roman" panose="02020603050405020304" pitchFamily="18" charset="0"/>
+                <a:cs typeface="Times New Roman" panose="02020603050405020304" pitchFamily="18" charset="0"/>
+              </a:rPr>
+              <a:t>câu</a:t>
+            </a:r>
+            <a:r>
+              <a:rPr lang="en-US" dirty="0">
+                <a:latin typeface="Times New Roman" panose="02020603050405020304" pitchFamily="18" charset="0"/>
+                <a:cs typeface="Times New Roman" panose="02020603050405020304" pitchFamily="18" charset="0"/>
+              </a:rPr>
+              <a:t> </a:t>
+            </a:r>
+            <a:r>
+              <a:rPr lang="en-US" dirty="0" err="1">
                 <a:latin typeface="Times New Roman" panose="02020603050405020304" pitchFamily="18" charset="0"/>
                 <a:cs typeface="Times New Roman" panose="02020603050405020304" pitchFamily="18" charset="0"/>
               </a:rPr>
               <a:t>để</a:t>
             </a:r>
             <a:r>
-              <a:rPr lang="en-US" sz="2400" dirty="0">
-                <a:latin typeface="Times New Roman" panose="02020603050405020304" pitchFamily="18" charset="0"/>
-                <a:cs typeface="Times New Roman" panose="02020603050405020304" pitchFamily="18" charset="0"/>
-              </a:rPr>
-              <a:t> </a:t>
-            </a:r>
-            <a:r>
-              <a:rPr lang="en-US" sz="2400" dirty="0" err="1">
+              <a:rPr lang="en-US" dirty="0">
+                <a:latin typeface="Times New Roman" panose="02020603050405020304" pitchFamily="18" charset="0"/>
+                <a:cs typeface="Times New Roman" panose="02020603050405020304" pitchFamily="18" charset="0"/>
+              </a:rPr>
+              <a:t> </a:t>
+            </a:r>
+            <a:r>
+              <a:rPr lang="en-US" dirty="0" err="1">
                 <a:latin typeface="Times New Roman" panose="02020603050405020304" pitchFamily="18" charset="0"/>
                 <a:cs typeface="Times New Roman" panose="02020603050405020304" pitchFamily="18" charset="0"/>
               </a:rPr>
               <a:t>phân</a:t>
             </a:r>
             <a:r>
-              <a:rPr lang="en-US" sz="2400" dirty="0">
-                <a:latin typeface="Times New Roman" panose="02020603050405020304" pitchFamily="18" charset="0"/>
-                <a:cs typeface="Times New Roman" panose="02020603050405020304" pitchFamily="18" charset="0"/>
-              </a:rPr>
-              <a:t> </a:t>
-            </a:r>
-            <a:r>
-              <a:rPr lang="en-US" sz="2400" dirty="0" err="1">
+              <a:rPr lang="en-US" dirty="0">
+                <a:latin typeface="Times New Roman" panose="02020603050405020304" pitchFamily="18" charset="0"/>
+                <a:cs typeface="Times New Roman" panose="02020603050405020304" pitchFamily="18" charset="0"/>
+              </a:rPr>
+              <a:t> </a:t>
+            </a:r>
+            <a:r>
+              <a:rPr lang="en-US" dirty="0" err="1">
                 <a:latin typeface="Times New Roman" panose="02020603050405020304" pitchFamily="18" charset="0"/>
                 <a:cs typeface="Times New Roman" panose="02020603050405020304" pitchFamily="18" charset="0"/>
               </a:rPr>
               <a:t>cách</a:t>
             </a:r>
             <a:r>
-              <a:rPr lang="en-US" sz="2400" dirty="0">
-                <a:latin typeface="Times New Roman" panose="02020603050405020304" pitchFamily="18" charset="0"/>
-                <a:cs typeface="Times New Roman" panose="02020603050405020304" pitchFamily="18" charset="0"/>
-              </a:rPr>
-              <a:t> </a:t>
-            </a:r>
-            <a:r>
-              <a:rPr lang="en-US" sz="2400" dirty="0" err="1">
-                <a:latin typeface="Times New Roman" panose="02020603050405020304" pitchFamily="18" charset="0"/>
-                <a:cs typeface="Times New Roman" panose="02020603050405020304" pitchFamily="18" charset="0"/>
-              </a:rPr>
-              <a:t>từ</a:t>
-            </a:r>
-            <a:r>
-              <a:rPr lang="en-US" sz="2400" dirty="0">
+              <a:rPr lang="en-US" dirty="0">
+                <a:latin typeface="Times New Roman" panose="02020603050405020304" pitchFamily="18" charset="0"/>
+                <a:cs typeface="Times New Roman" panose="02020603050405020304" pitchFamily="18" charset="0"/>
+              </a:rPr>
+              <a:t> </a:t>
+            </a:r>
+            <a:r>
+              <a:rPr lang="en-US" dirty="0" err="1">
+                <a:latin typeface="Times New Roman" panose="02020603050405020304" pitchFamily="18" charset="0"/>
+                <a:cs typeface="Times New Roman" panose="02020603050405020304" pitchFamily="18" charset="0"/>
+              </a:rPr>
+              <a:t>câu</a:t>
+            </a:r>
+            <a:r>
+              <a:rPr lang="en-US" dirty="0">
                 <a:latin typeface="Times New Roman" panose="02020603050405020304" pitchFamily="18" charset="0"/>
                 <a:cs typeface="Times New Roman" panose="02020603050405020304" pitchFamily="18" charset="0"/>
               </a:rPr>
               <a:t>. </a:t>
             </a:r>
             <a:r>
-              <a:rPr lang="en-US" sz="2400" dirty="0" err="1">
+              <a:rPr lang="en-US" dirty="0" err="1">
                 <a:latin typeface="Times New Roman" panose="02020603050405020304" pitchFamily="18" charset="0"/>
                 <a:cs typeface="Times New Roman" panose="02020603050405020304" pitchFamily="18" charset="0"/>
               </a:rPr>
               <a:t>Một</a:t>
             </a:r>
             <a:r>
-              <a:rPr lang="en-US" sz="2400" dirty="0">
-                <a:latin typeface="Times New Roman" panose="02020603050405020304" pitchFamily="18" charset="0"/>
-                <a:cs typeface="Times New Roman" panose="02020603050405020304" pitchFamily="18" charset="0"/>
-              </a:rPr>
-              <a:t> </a:t>
-            </a:r>
-            <a:r>
-              <a:rPr lang="en-US" sz="2400" dirty="0" err="1">
+              <a:rPr lang="en-US" dirty="0">
+                <a:latin typeface="Times New Roman" panose="02020603050405020304" pitchFamily="18" charset="0"/>
+                <a:cs typeface="Times New Roman" panose="02020603050405020304" pitchFamily="18" charset="0"/>
+              </a:rPr>
+              <a:t> </a:t>
+            </a:r>
+            <a:r>
+              <a:rPr lang="en-US" dirty="0" err="1">
                 <a:latin typeface="Times New Roman" panose="02020603050405020304" pitchFamily="18" charset="0"/>
                 <a:cs typeface="Times New Roman" panose="02020603050405020304" pitchFamily="18" charset="0"/>
               </a:rPr>
               <a:t>số</a:t>
             </a:r>
             <a:r>
-              <a:rPr lang="en-US" sz="2400" dirty="0">
-                <a:latin typeface="Times New Roman" panose="02020603050405020304" pitchFamily="18" charset="0"/>
-                <a:cs typeface="Times New Roman" panose="02020603050405020304" pitchFamily="18" charset="0"/>
-              </a:rPr>
-              <a:t> </a:t>
-            </a:r>
-            <a:r>
-              <a:rPr lang="en-US" sz="2400" dirty="0" err="1">
+              <a:rPr lang="en-US" dirty="0">
+                <a:latin typeface="Times New Roman" panose="02020603050405020304" pitchFamily="18" charset="0"/>
+                <a:cs typeface="Times New Roman" panose="02020603050405020304" pitchFamily="18" charset="0"/>
+              </a:rPr>
+              <a:t> </a:t>
+            </a:r>
+            <a:r>
+              <a:rPr lang="en-US" dirty="0" err="1">
                 <a:latin typeface="Times New Roman" panose="02020603050405020304" pitchFamily="18" charset="0"/>
                 <a:cs typeface="Times New Roman" panose="02020603050405020304" pitchFamily="18" charset="0"/>
               </a:rPr>
               <a:t>ngôn</a:t>
             </a:r>
             <a:r>
-              <a:rPr lang="en-US" sz="2400" dirty="0">
-                <a:latin typeface="Times New Roman" panose="02020603050405020304" pitchFamily="18" charset="0"/>
-                <a:cs typeface="Times New Roman" panose="02020603050405020304" pitchFamily="18" charset="0"/>
-              </a:rPr>
-              <a:t> </a:t>
-            </a:r>
-            <a:r>
-              <a:rPr lang="en-US" sz="2400" dirty="0" err="1">
+              <a:rPr lang="en-US" dirty="0">
+                <a:latin typeface="Times New Roman" panose="02020603050405020304" pitchFamily="18" charset="0"/>
+                <a:cs typeface="Times New Roman" panose="02020603050405020304" pitchFamily="18" charset="0"/>
+              </a:rPr>
+              <a:t> </a:t>
+            </a:r>
+            <a:r>
+              <a:rPr lang="en-US" dirty="0" err="1">
                 <a:latin typeface="Times New Roman" panose="02020603050405020304" pitchFamily="18" charset="0"/>
                 <a:cs typeface="Times New Roman" panose="02020603050405020304" pitchFamily="18" charset="0"/>
               </a:rPr>
               <a:t>ngữ</a:t>
             </a:r>
             <a:r>
-              <a:rPr lang="en-US" sz="2400" dirty="0">
-                <a:latin typeface="Times New Roman" panose="02020603050405020304" pitchFamily="18" charset="0"/>
-                <a:cs typeface="Times New Roman" panose="02020603050405020304" pitchFamily="18" charset="0"/>
-              </a:rPr>
-              <a:t> </a:t>
-            </a:r>
-            <a:r>
-              <a:rPr lang="en-US" sz="2400" dirty="0" err="1">
+              <a:rPr lang="en-US" dirty="0">
+                <a:latin typeface="Times New Roman" panose="02020603050405020304" pitchFamily="18" charset="0"/>
+                <a:cs typeface="Times New Roman" panose="02020603050405020304" pitchFamily="18" charset="0"/>
+              </a:rPr>
+              <a:t> </a:t>
+            </a:r>
+            <a:r>
+              <a:rPr lang="en-US" dirty="0" err="1">
                 <a:latin typeface="Times New Roman" panose="02020603050405020304" pitchFamily="18" charset="0"/>
                 <a:cs typeface="Times New Roman" panose="02020603050405020304" pitchFamily="18" charset="0"/>
               </a:rPr>
               <a:t>khác</a:t>
             </a:r>
             <a:r>
-              <a:rPr lang="en-US" sz="2400" dirty="0">
-                <a:latin typeface="Times New Roman" panose="02020603050405020304" pitchFamily="18" charset="0"/>
-                <a:cs typeface="Times New Roman" panose="02020603050405020304" pitchFamily="18" charset="0"/>
-              </a:rPr>
-              <a:t> </a:t>
-            </a:r>
-            <a:r>
-              <a:rPr lang="en-US" sz="2400" dirty="0" err="1">
-                <a:latin typeface="Times New Roman" panose="02020603050405020304" pitchFamily="18" charset="0"/>
-                <a:cs typeface="Times New Roman" panose="02020603050405020304" pitchFamily="18" charset="0"/>
-              </a:rPr>
-              <a:t>nh</a:t>
-            </a:r>
-            <a:r>
-              <a:rPr lang="vi-VN" sz="2400" dirty="0">
-                <a:latin typeface="Times New Roman" panose="02020603050405020304" pitchFamily="18" charset="0"/>
-                <a:cs typeface="Times New Roman" panose="02020603050405020304" pitchFamily="18" charset="0"/>
-              </a:rPr>
-              <a:t>ư</a:t>
-            </a:r>
-            <a:r>
-              <a:rPr lang="en-US" sz="2400" dirty="0">
-                <a:latin typeface="Times New Roman" panose="02020603050405020304" pitchFamily="18" charset="0"/>
-                <a:cs typeface="Times New Roman" panose="02020603050405020304" pitchFamily="18" charset="0"/>
-              </a:rPr>
-              <a:t> </a:t>
-            </a:r>
-            <a:r>
-              <a:rPr lang="en-US" sz="2400" dirty="0" err="1">
-                <a:latin typeface="Times New Roman" panose="02020603050405020304" pitchFamily="18" charset="0"/>
-                <a:cs typeface="Times New Roman" panose="02020603050405020304" pitchFamily="18" charset="0"/>
-              </a:rPr>
-              <a:t>Nhật</a:t>
-            </a:r>
-            <a:r>
-              <a:rPr lang="en-US" sz="2400" dirty="0">
-                <a:latin typeface="Times New Roman" panose="02020603050405020304" pitchFamily="18" charset="0"/>
-                <a:cs typeface="Times New Roman" panose="02020603050405020304" pitchFamily="18" charset="0"/>
-              </a:rPr>
-              <a:t>, </a:t>
-            </a:r>
-            <a:r>
-              <a:rPr lang="en-US" sz="2400" dirty="0" err="1">
-                <a:latin typeface="Times New Roman" panose="02020603050405020304" pitchFamily="18" charset="0"/>
-                <a:cs typeface="Times New Roman" panose="02020603050405020304" pitchFamily="18" charset="0"/>
-              </a:rPr>
-              <a:t>Trung</a:t>
-            </a:r>
-            <a:r>
-              <a:rPr lang="en-US" sz="2400" dirty="0">
-                <a:latin typeface="Times New Roman" panose="02020603050405020304" pitchFamily="18" charset="0"/>
-                <a:cs typeface="Times New Roman" panose="02020603050405020304" pitchFamily="18" charset="0"/>
-              </a:rPr>
-              <a:t> </a:t>
-            </a:r>
-            <a:r>
-              <a:rPr lang="en-US" sz="2400" dirty="0" err="1">
-                <a:latin typeface="Times New Roman" panose="02020603050405020304" pitchFamily="18" charset="0"/>
-                <a:cs typeface="Times New Roman" panose="02020603050405020304" pitchFamily="18" charset="0"/>
-              </a:rPr>
-              <a:t>Quốc</a:t>
-            </a:r>
-            <a:r>
-              <a:rPr lang="en-US" sz="2400" dirty="0">
-                <a:latin typeface="Times New Roman" panose="02020603050405020304" pitchFamily="18" charset="0"/>
-                <a:cs typeface="Times New Roman" panose="02020603050405020304" pitchFamily="18" charset="0"/>
-              </a:rPr>
-              <a:t>,… </a:t>
-            </a:r>
-            <a:r>
-              <a:rPr lang="en-US" sz="2400" dirty="0" err="1">
+              <a:rPr lang="en-US" dirty="0">
+                <a:latin typeface="Times New Roman" panose="02020603050405020304" pitchFamily="18" charset="0"/>
+                <a:cs typeface="Times New Roman" panose="02020603050405020304" pitchFamily="18" charset="0"/>
+              </a:rPr>
+              <a:t> </a:t>
+            </a:r>
+            <a:r>
+              <a:rPr lang="en-US" dirty="0" err="1">
                 <a:latin typeface="Times New Roman" panose="02020603050405020304" pitchFamily="18" charset="0"/>
                 <a:cs typeface="Times New Roman" panose="02020603050405020304" pitchFamily="18" charset="0"/>
               </a:rPr>
               <a:t>thì</a:t>
             </a:r>
             <a:r>
-              <a:rPr lang="en-US" sz="2400" dirty="0">
-                <a:latin typeface="Times New Roman" panose="02020603050405020304" pitchFamily="18" charset="0"/>
-                <a:cs typeface="Times New Roman" panose="02020603050405020304" pitchFamily="18" charset="0"/>
-              </a:rPr>
-              <a:t> </a:t>
-            </a:r>
-            <a:r>
-              <a:rPr lang="en-US" sz="2400" dirty="0" err="1">
+              <a:rPr lang="en-US" dirty="0">
+                <a:latin typeface="Times New Roman" panose="02020603050405020304" pitchFamily="18" charset="0"/>
+                <a:cs typeface="Times New Roman" panose="02020603050405020304" pitchFamily="18" charset="0"/>
+              </a:rPr>
+              <a:t> </a:t>
+            </a:r>
+            <a:r>
+              <a:rPr lang="en-US" dirty="0" err="1">
                 <a:latin typeface="Times New Roman" panose="02020603050405020304" pitchFamily="18" charset="0"/>
                 <a:cs typeface="Times New Roman" panose="02020603050405020304" pitchFamily="18" charset="0"/>
               </a:rPr>
               <a:t>không</a:t>
             </a:r>
             <a:r>
-              <a:rPr lang="en-US" sz="2400" dirty="0">
-                <a:latin typeface="Times New Roman" panose="02020603050405020304" pitchFamily="18" charset="0"/>
-                <a:cs typeface="Times New Roman" panose="02020603050405020304" pitchFamily="18" charset="0"/>
-              </a:rPr>
-              <a:t> </a:t>
-            </a:r>
-            <a:r>
-              <a:rPr lang="en-US" sz="2400" dirty="0" err="1">
+              <a:rPr lang="en-US" dirty="0">
+                <a:latin typeface="Times New Roman" panose="02020603050405020304" pitchFamily="18" charset="0"/>
+                <a:cs typeface="Times New Roman" panose="02020603050405020304" pitchFamily="18" charset="0"/>
+              </a:rPr>
+              <a:t> </a:t>
+            </a:r>
+            <a:r>
+              <a:rPr lang="en-US" dirty="0" err="1">
                 <a:latin typeface="Times New Roman" panose="02020603050405020304" pitchFamily="18" charset="0"/>
                 <a:cs typeface="Times New Roman" panose="02020603050405020304" pitchFamily="18" charset="0"/>
               </a:rPr>
               <a:t>có</a:t>
             </a:r>
             <a:r>
-              <a:rPr lang="en-US" sz="2400" dirty="0">
-                <a:latin typeface="Times New Roman" panose="02020603050405020304" pitchFamily="18" charset="0"/>
-                <a:cs typeface="Times New Roman" panose="02020603050405020304" pitchFamily="18" charset="0"/>
-              </a:rPr>
-              <a:t> </a:t>
-            </a:r>
-            <a:r>
-              <a:rPr lang="en-US" sz="2400" dirty="0">
+              <a:rPr lang="en-US" dirty="0">
+                <a:latin typeface="Times New Roman" panose="02020603050405020304" pitchFamily="18" charset="0"/>
+                <a:cs typeface="Times New Roman" panose="02020603050405020304" pitchFamily="18" charset="0"/>
+              </a:rPr>
+              <a:t> </a:t>
+            </a:r>
+            <a:r>
+              <a:rPr lang="en-US" dirty="0" err="1">
+                <a:latin typeface="Times New Roman" panose="02020603050405020304" pitchFamily="18" charset="0"/>
+                <a:cs typeface="Times New Roman" panose="02020603050405020304" pitchFamily="18" charset="0"/>
+              </a:rPr>
+              <a:t>hoặc</a:t>
+            </a:r>
+            <a:r>
+              <a:rPr lang="en-US" dirty="0">
+                <a:latin typeface="Times New Roman" panose="02020603050405020304" pitchFamily="18" charset="0"/>
+                <a:cs typeface="Times New Roman" panose="02020603050405020304" pitchFamily="18" charset="0"/>
+              </a:rPr>
+              <a:t> </a:t>
+            </a:r>
+            <a:r>
+              <a:rPr lang="en-US" dirty="0" err="1">
+                <a:latin typeface="Times New Roman" panose="02020603050405020304" pitchFamily="18" charset="0"/>
+                <a:cs typeface="Times New Roman" panose="02020603050405020304" pitchFamily="18" charset="0"/>
+              </a:rPr>
+              <a:t>khác</a:t>
+            </a:r>
+            <a:r>
+              <a:rPr lang="en-US" dirty="0">
+                <a:latin typeface="Times New Roman" panose="02020603050405020304" pitchFamily="18" charset="0"/>
+                <a:cs typeface="Times New Roman" panose="02020603050405020304" pitchFamily="18" charset="0"/>
+              </a:rPr>
+              <a:t> </a:t>
+            </a:r>
+            <a:r>
+              <a:rPr lang="en-US" dirty="0">
                 <a:latin typeface="Times New Roman" panose="02020603050405020304" pitchFamily="18" charset="0"/>
                 <a:cs typeface="Times New Roman" panose="02020603050405020304" pitchFamily="18" charset="0"/>
                 <a:sym typeface="Wingdings" panose="05000000000000000000" pitchFamily="2" charset="2"/>
@@ -10759,7 +10731,7 @@
               <a:t> </a:t>
             </a:r>
             <a:r>
-              <a:rPr lang="en-US" sz="2400" dirty="0" err="1">
+              <a:rPr lang="en-US" dirty="0" err="1">
                 <a:latin typeface="Times New Roman" panose="02020603050405020304" pitchFamily="18" charset="0"/>
                 <a:cs typeface="Times New Roman" panose="02020603050405020304" pitchFamily="18" charset="0"/>
                 <a:sym typeface="Wingdings" panose="05000000000000000000" pitchFamily="2" charset="2"/>
@@ -10767,7 +10739,7 @@
               <a:t>Khó</a:t>
             </a:r>
             <a:r>
-              <a:rPr lang="en-US" sz="2400" dirty="0">
+              <a:rPr lang="en-US" dirty="0">
                 <a:latin typeface="Times New Roman" panose="02020603050405020304" pitchFamily="18" charset="0"/>
                 <a:cs typeface="Times New Roman" panose="02020603050405020304" pitchFamily="18" charset="0"/>
                 <a:sym typeface="Wingdings" panose="05000000000000000000" pitchFamily="2" charset="2"/>
@@ -10775,7 +10747,7 @@
               <a:t> </a:t>
             </a:r>
             <a:r>
-              <a:rPr lang="en-US" sz="2400" dirty="0" err="1">
+              <a:rPr lang="en-US" dirty="0" err="1">
                 <a:latin typeface="Times New Roman" panose="02020603050405020304" pitchFamily="18" charset="0"/>
                 <a:cs typeface="Times New Roman" panose="02020603050405020304" pitchFamily="18" charset="0"/>
                 <a:sym typeface="Wingdings" panose="05000000000000000000" pitchFamily="2" charset="2"/>
@@ -10783,151 +10755,486 @@
               <a:t>khăn</a:t>
             </a:r>
             <a:r>
-              <a:rPr lang="en-US" sz="2400" dirty="0">
+              <a:rPr lang="en-US" dirty="0">
                 <a:latin typeface="Times New Roman" panose="02020603050405020304" pitchFamily="18" charset="0"/>
                 <a:cs typeface="Times New Roman" panose="02020603050405020304" pitchFamily="18" charset="0"/>
                 <a:sym typeface="Wingdings" panose="05000000000000000000" pitchFamily="2" charset="2"/>
               </a:rPr>
-              <a:t> t</a:t>
-            </a:r>
-            <a:r>
-              <a:rPr lang="en-US" sz="2400" dirty="0">
-                <a:latin typeface="Times New Roman" panose="02020603050405020304" pitchFamily="18" charset="0"/>
-                <a:cs typeface="Times New Roman" panose="02020603050405020304" pitchFamily="18" charset="0"/>
-              </a:rPr>
-              <a:t>okenization: </a:t>
-            </a:r>
-            <a:endParaRPr lang="en-US" sz="2400" dirty="0">
-              <a:latin typeface="Times New Roman" panose="02020603050405020304" pitchFamily="18" charset="0"/>
-              <a:cs typeface="Times New Roman" panose="02020603050405020304" pitchFamily="18" charset="0"/>
-              <a:sym typeface="Wingdings" panose="05000000000000000000" pitchFamily="2" charset="2"/>
-            </a:endParaRPr>
-          </a:p>
-          <a:p>
-            <a:pPr lvl="1">
-              <a:buFont typeface="Arial" panose="020B0604020202020204" pitchFamily="34" charset="0"/>
-              <a:buChar char="•"/>
-            </a:pPr>
-            <a:r>
-              <a:rPr lang="en-US" sz="2400" dirty="0" err="1">
-                <a:latin typeface="Times New Roman" panose="02020603050405020304" pitchFamily="18" charset="0"/>
-                <a:cs typeface="Times New Roman" panose="02020603050405020304" pitchFamily="18" charset="0"/>
-                <a:sym typeface="Wingdings" panose="05000000000000000000" pitchFamily="2" charset="2"/>
-              </a:rPr>
-              <a:t>Ví</a:t>
-            </a:r>
-            <a:r>
-              <a:rPr lang="en-US" sz="2400" dirty="0">
-                <a:latin typeface="Times New Roman" panose="02020603050405020304" pitchFamily="18" charset="0"/>
-                <a:cs typeface="Times New Roman" panose="02020603050405020304" pitchFamily="18" charset="0"/>
-                <a:sym typeface="Wingdings" panose="05000000000000000000" pitchFamily="2" charset="2"/>
-              </a:rPr>
-              <a:t> </a:t>
-            </a:r>
-            <a:r>
-              <a:rPr lang="en-US" sz="2400" dirty="0" err="1">
-                <a:latin typeface="Times New Roman" panose="02020603050405020304" pitchFamily="18" charset="0"/>
-                <a:cs typeface="Times New Roman" panose="02020603050405020304" pitchFamily="18" charset="0"/>
-                <a:sym typeface="Wingdings" panose="05000000000000000000" pitchFamily="2" charset="2"/>
-              </a:rPr>
-              <a:t>dụ</a:t>
-            </a:r>
-            <a:r>
-              <a:rPr lang="en-US" sz="2400" dirty="0">
-                <a:latin typeface="Times New Roman" panose="02020603050405020304" pitchFamily="18" charset="0"/>
-                <a:cs typeface="Times New Roman" panose="02020603050405020304" pitchFamily="18" charset="0"/>
-                <a:sym typeface="Wingdings" panose="05000000000000000000" pitchFamily="2" charset="2"/>
-              </a:rPr>
-              <a:t>: </a:t>
-            </a:r>
-          </a:p>
-          <a:p>
-            <a:pPr marL="0" indent="0">
-              <a:buNone/>
-            </a:pPr>
-            <a:r>
-              <a:rPr lang="en-US" dirty="0">
-                <a:latin typeface="Times New Roman" panose="02020603050405020304" pitchFamily="18" charset="0"/>
-                <a:cs typeface="Times New Roman" panose="02020603050405020304" pitchFamily="18" charset="0"/>
-                <a:sym typeface="Wingdings" panose="05000000000000000000" pitchFamily="2" charset="2"/>
-              </a:rPr>
-              <a:t>		</a:t>
-            </a:r>
-            <a:r>
-              <a:rPr lang="en-US" dirty="0" err="1">
-                <a:latin typeface="Times New Roman" panose="02020603050405020304" pitchFamily="18" charset="0"/>
-                <a:cs typeface="Times New Roman" panose="02020603050405020304" pitchFamily="18" charset="0"/>
-                <a:sym typeface="Wingdings" panose="05000000000000000000" pitchFamily="2" charset="2"/>
-              </a:rPr>
-              <a:t>Tiếng</a:t>
-            </a:r>
-            <a:r>
-              <a:rPr lang="en-US" dirty="0">
-                <a:latin typeface="Times New Roman" panose="02020603050405020304" pitchFamily="18" charset="0"/>
-                <a:cs typeface="Times New Roman" panose="02020603050405020304" pitchFamily="18" charset="0"/>
-                <a:sym typeface="Wingdings" panose="05000000000000000000" pitchFamily="2" charset="2"/>
-              </a:rPr>
-              <a:t> Anh: This is a cat</a:t>
-            </a:r>
-          </a:p>
-          <a:p>
-            <a:pPr marL="0" indent="0">
-              <a:buNone/>
-            </a:pPr>
-            <a:r>
-              <a:rPr lang="en-US" dirty="0">
-                <a:latin typeface="Times New Roman" panose="02020603050405020304" pitchFamily="18" charset="0"/>
-                <a:cs typeface="Times New Roman" panose="02020603050405020304" pitchFamily="18" charset="0"/>
-                <a:sym typeface="Wingdings" panose="05000000000000000000" pitchFamily="2" charset="2"/>
-              </a:rPr>
-              <a:t>		</a:t>
-            </a:r>
-            <a:r>
-              <a:rPr lang="en-US" dirty="0" err="1">
-                <a:latin typeface="Times New Roman" panose="02020603050405020304" pitchFamily="18" charset="0"/>
-                <a:cs typeface="Times New Roman" panose="02020603050405020304" pitchFamily="18" charset="0"/>
-                <a:sym typeface="Wingdings" panose="05000000000000000000" pitchFamily="2" charset="2"/>
-              </a:rPr>
-              <a:t>Tiếng</a:t>
-            </a:r>
-            <a:r>
-              <a:rPr lang="en-US" dirty="0">
-                <a:latin typeface="Times New Roman" panose="02020603050405020304" pitchFamily="18" charset="0"/>
-                <a:cs typeface="Times New Roman" panose="02020603050405020304" pitchFamily="18" charset="0"/>
-                <a:sym typeface="Wingdings" panose="05000000000000000000" pitchFamily="2" charset="2"/>
-              </a:rPr>
-              <a:t> </a:t>
-            </a:r>
-            <a:r>
-              <a:rPr lang="en-US" dirty="0" err="1">
-                <a:latin typeface="Times New Roman" panose="02020603050405020304" pitchFamily="18" charset="0"/>
-                <a:cs typeface="Times New Roman" panose="02020603050405020304" pitchFamily="18" charset="0"/>
-                <a:sym typeface="Wingdings" panose="05000000000000000000" pitchFamily="2" charset="2"/>
-              </a:rPr>
-              <a:t>Nhật</a:t>
-            </a:r>
-            <a:r>
-              <a:rPr lang="en-US" dirty="0">
-                <a:latin typeface="Times New Roman" panose="02020603050405020304" pitchFamily="18" charset="0"/>
-                <a:cs typeface="Times New Roman" panose="02020603050405020304" pitchFamily="18" charset="0"/>
-                <a:sym typeface="Wingdings" panose="05000000000000000000" pitchFamily="2" charset="2"/>
-              </a:rPr>
-              <a:t>: </a:t>
-            </a:r>
-            <a:r>
-              <a:rPr lang="ja-JP" altLang="en-US" dirty="0">
-                <a:latin typeface="Times New Roman" panose="02020603050405020304" pitchFamily="18" charset="0"/>
-                <a:cs typeface="Times New Roman" panose="02020603050405020304" pitchFamily="18" charset="0"/>
-                <a:sym typeface="Wingdings" panose="05000000000000000000" pitchFamily="2" charset="2"/>
-              </a:rPr>
-              <a:t>これは犬です</a:t>
-            </a:r>
-          </a:p>
-          <a:p>
+              <a:t> sentence segmentation</a:t>
+            </a:r>
             <a:endParaRPr lang="en-US" dirty="0">
               <a:latin typeface="Times New Roman" panose="02020603050405020304" pitchFamily="18" charset="0"/>
               <a:cs typeface="Times New Roman" panose="02020603050405020304" pitchFamily="18" charset="0"/>
             </a:endParaRPr>
+          </a:p>
+          <a:p>
+            <a:pPr marL="0" indent="0">
+              <a:buNone/>
+            </a:pPr>
+            <a:r>
+              <a:rPr lang="en-US" dirty="0">
+                <a:latin typeface="Times New Roman" panose="02020603050405020304" pitchFamily="18" charset="0"/>
+                <a:cs typeface="Times New Roman" panose="02020603050405020304" pitchFamily="18" charset="0"/>
+              </a:rPr>
+              <a:t>	</a:t>
+            </a:r>
+            <a:r>
+              <a:rPr lang="en-US" dirty="0" err="1">
+                <a:latin typeface="Times New Roman" panose="02020603050405020304" pitchFamily="18" charset="0"/>
+                <a:cs typeface="Times New Roman" panose="02020603050405020304" pitchFamily="18" charset="0"/>
+              </a:rPr>
+              <a:t>Ví</a:t>
+            </a:r>
+            <a:r>
+              <a:rPr lang="en-US" dirty="0">
+                <a:latin typeface="Times New Roman" panose="02020603050405020304" pitchFamily="18" charset="0"/>
+                <a:cs typeface="Times New Roman" panose="02020603050405020304" pitchFamily="18" charset="0"/>
+              </a:rPr>
+              <a:t> </a:t>
+            </a:r>
+            <a:r>
+              <a:rPr lang="en-US" dirty="0" err="1">
+                <a:latin typeface="Times New Roman" panose="02020603050405020304" pitchFamily="18" charset="0"/>
+                <a:cs typeface="Times New Roman" panose="02020603050405020304" pitchFamily="18" charset="0"/>
+              </a:rPr>
+              <a:t>dụ</a:t>
+            </a:r>
+            <a:r>
+              <a:rPr lang="en-US" dirty="0">
+                <a:latin typeface="Times New Roman" panose="02020603050405020304" pitchFamily="18" charset="0"/>
+                <a:cs typeface="Times New Roman" panose="02020603050405020304" pitchFamily="18" charset="0"/>
+              </a:rPr>
+              <a:t>: </a:t>
+            </a:r>
+            <a:r>
+              <a:rPr lang="en-US" dirty="0" err="1">
+                <a:latin typeface="Times New Roman" panose="02020603050405020304" pitchFamily="18" charset="0"/>
+                <a:cs typeface="Times New Roman" panose="02020603050405020304" pitchFamily="18" charset="0"/>
+              </a:rPr>
+              <a:t>Tiếng</a:t>
+            </a:r>
+            <a:r>
+              <a:rPr lang="en-US" dirty="0">
+                <a:latin typeface="Times New Roman" panose="02020603050405020304" pitchFamily="18" charset="0"/>
+                <a:cs typeface="Times New Roman" panose="02020603050405020304" pitchFamily="18" charset="0"/>
+              </a:rPr>
+              <a:t> Anh: where is the manager?</a:t>
+            </a:r>
+          </a:p>
+          <a:p>
+            <a:pPr marL="0" indent="0">
+              <a:buNone/>
+            </a:pPr>
+            <a:r>
+              <a:rPr lang="en-US" dirty="0">
+                <a:latin typeface="Times New Roman" panose="02020603050405020304" pitchFamily="18" charset="0"/>
+                <a:cs typeface="Times New Roman" panose="02020603050405020304" pitchFamily="18" charset="0"/>
+              </a:rPr>
+              <a:t>			</a:t>
+            </a:r>
+            <a:r>
+              <a:rPr lang="en-US" dirty="0" err="1">
+                <a:latin typeface="Times New Roman" panose="02020603050405020304" pitchFamily="18" charset="0"/>
+                <a:cs typeface="Times New Roman" panose="02020603050405020304" pitchFamily="18" charset="0"/>
+              </a:rPr>
+              <a:t>Tiếng</a:t>
+            </a:r>
+            <a:r>
+              <a:rPr lang="en-US" dirty="0">
+                <a:latin typeface="Times New Roman" panose="02020603050405020304" pitchFamily="18" charset="0"/>
+                <a:cs typeface="Times New Roman" panose="02020603050405020304" pitchFamily="18" charset="0"/>
+              </a:rPr>
+              <a:t> Ả </a:t>
+            </a:r>
+            <a:r>
+              <a:rPr lang="en-US" dirty="0" err="1">
+                <a:latin typeface="Times New Roman" panose="02020603050405020304" pitchFamily="18" charset="0"/>
+                <a:cs typeface="Times New Roman" panose="02020603050405020304" pitchFamily="18" charset="0"/>
+              </a:rPr>
+              <a:t>Rập</a:t>
+            </a:r>
+            <a:r>
+              <a:rPr lang="en-US" dirty="0">
+                <a:latin typeface="Times New Roman" panose="02020603050405020304" pitchFamily="18" charset="0"/>
+                <a:cs typeface="Times New Roman" panose="02020603050405020304" pitchFamily="18" charset="0"/>
+              </a:rPr>
+              <a:t>: </a:t>
+            </a:r>
+            <a:r>
+              <a:rPr lang="ar-AE" dirty="0"/>
+              <a:t>أين المدير؟</a:t>
+            </a:r>
+            <a:endParaRPr lang="en-US" dirty="0">
+              <a:latin typeface="Times New Roman" panose="02020603050405020304" pitchFamily="18" charset="0"/>
+              <a:cs typeface="Times New Roman" panose="02020603050405020304" pitchFamily="18" charset="0"/>
+            </a:endParaRPr>
+          </a:p>
+          <a:p>
+            <a:r>
+              <a:rPr lang="en-US" dirty="0" err="1">
+                <a:latin typeface="Times New Roman" panose="02020603050405020304" pitchFamily="18" charset="0"/>
+                <a:cs typeface="Times New Roman" panose="02020603050405020304" pitchFamily="18" charset="0"/>
+              </a:rPr>
+              <a:t>Trong</a:t>
+            </a:r>
+            <a:r>
+              <a:rPr lang="en-US" dirty="0">
+                <a:latin typeface="Times New Roman" panose="02020603050405020304" pitchFamily="18" charset="0"/>
+                <a:cs typeface="Times New Roman" panose="02020603050405020304" pitchFamily="18" charset="0"/>
+              </a:rPr>
+              <a:t> </a:t>
+            </a:r>
+            <a:r>
+              <a:rPr lang="en-US" dirty="0" err="1">
+                <a:latin typeface="Times New Roman" panose="02020603050405020304" pitchFamily="18" charset="0"/>
+                <a:cs typeface="Times New Roman" panose="02020603050405020304" pitchFamily="18" charset="0"/>
+              </a:rPr>
+              <a:t>tiếng</a:t>
+            </a:r>
+            <a:r>
+              <a:rPr lang="en-US" dirty="0">
+                <a:latin typeface="Times New Roman" panose="02020603050405020304" pitchFamily="18" charset="0"/>
+                <a:cs typeface="Times New Roman" panose="02020603050405020304" pitchFamily="18" charset="0"/>
+              </a:rPr>
+              <a:t> Anh, </a:t>
+            </a:r>
+            <a:r>
+              <a:rPr lang="en-US" dirty="0" err="1">
+                <a:latin typeface="Times New Roman" panose="02020603050405020304" pitchFamily="18" charset="0"/>
+                <a:cs typeface="Times New Roman" panose="02020603050405020304" pitchFamily="18" charset="0"/>
+              </a:rPr>
+              <a:t>đôi</a:t>
+            </a:r>
+            <a:r>
+              <a:rPr lang="en-US" dirty="0">
+                <a:latin typeface="Times New Roman" panose="02020603050405020304" pitchFamily="18" charset="0"/>
+                <a:cs typeface="Times New Roman" panose="02020603050405020304" pitchFamily="18" charset="0"/>
+              </a:rPr>
+              <a:t> </a:t>
+            </a:r>
+            <a:r>
+              <a:rPr lang="en-US" dirty="0" err="1">
+                <a:latin typeface="Times New Roman" panose="02020603050405020304" pitchFamily="18" charset="0"/>
+                <a:cs typeface="Times New Roman" panose="02020603050405020304" pitchFamily="18" charset="0"/>
+              </a:rPr>
+              <a:t>khi</a:t>
+            </a:r>
+            <a:r>
+              <a:rPr lang="en-US" dirty="0">
+                <a:latin typeface="Times New Roman" panose="02020603050405020304" pitchFamily="18" charset="0"/>
+                <a:cs typeface="Times New Roman" panose="02020603050405020304" pitchFamily="18" charset="0"/>
+              </a:rPr>
+              <a:t> </a:t>
+            </a:r>
+            <a:r>
+              <a:rPr lang="en-US" dirty="0" err="1">
+                <a:latin typeface="Times New Roman" panose="02020603050405020304" pitchFamily="18" charset="0"/>
+                <a:cs typeface="Times New Roman" panose="02020603050405020304" pitchFamily="18" charset="0"/>
+              </a:rPr>
+              <a:t>dấu</a:t>
+            </a:r>
+            <a:r>
+              <a:rPr lang="en-US" dirty="0">
+                <a:latin typeface="Times New Roman" panose="02020603050405020304" pitchFamily="18" charset="0"/>
+                <a:cs typeface="Times New Roman" panose="02020603050405020304" pitchFamily="18" charset="0"/>
+              </a:rPr>
+              <a:t> </a:t>
+            </a:r>
+            <a:r>
+              <a:rPr lang="en-US" dirty="0" err="1">
+                <a:latin typeface="Times New Roman" panose="02020603050405020304" pitchFamily="18" charset="0"/>
+                <a:cs typeface="Times New Roman" panose="02020603050405020304" pitchFamily="18" charset="0"/>
+              </a:rPr>
+              <a:t>chấm</a:t>
+            </a:r>
+            <a:r>
+              <a:rPr lang="en-US" dirty="0">
+                <a:latin typeface="Times New Roman" panose="02020603050405020304" pitchFamily="18" charset="0"/>
+                <a:cs typeface="Times New Roman" panose="02020603050405020304" pitchFamily="18" charset="0"/>
+              </a:rPr>
+              <a:t> đ</a:t>
+            </a:r>
+            <a:r>
+              <a:rPr lang="vi-VN" dirty="0">
+                <a:latin typeface="Times New Roman" panose="02020603050405020304" pitchFamily="18" charset="0"/>
+                <a:cs typeface="Times New Roman" panose="02020603050405020304" pitchFamily="18" charset="0"/>
+              </a:rPr>
+              <a:t>ư</a:t>
+            </a:r>
+            <a:r>
+              <a:rPr lang="en-US" dirty="0" err="1">
+                <a:latin typeface="Times New Roman" panose="02020603050405020304" pitchFamily="18" charset="0"/>
+                <a:cs typeface="Times New Roman" panose="02020603050405020304" pitchFamily="18" charset="0"/>
+              </a:rPr>
+              <a:t>ợc</a:t>
+            </a:r>
+            <a:r>
+              <a:rPr lang="en-US" dirty="0">
+                <a:latin typeface="Times New Roman" panose="02020603050405020304" pitchFamily="18" charset="0"/>
+                <a:cs typeface="Times New Roman" panose="02020603050405020304" pitchFamily="18" charset="0"/>
+              </a:rPr>
+              <a:t> </a:t>
+            </a:r>
+            <a:r>
+              <a:rPr lang="en-US" dirty="0" err="1">
+                <a:latin typeface="Times New Roman" panose="02020603050405020304" pitchFamily="18" charset="0"/>
+                <a:cs typeface="Times New Roman" panose="02020603050405020304" pitchFamily="18" charset="0"/>
+              </a:rPr>
+              <a:t>sử</a:t>
+            </a:r>
+            <a:r>
+              <a:rPr lang="en-US" dirty="0">
+                <a:latin typeface="Times New Roman" panose="02020603050405020304" pitchFamily="18" charset="0"/>
+                <a:cs typeface="Times New Roman" panose="02020603050405020304" pitchFamily="18" charset="0"/>
+              </a:rPr>
+              <a:t> </a:t>
+            </a:r>
+            <a:r>
+              <a:rPr lang="en-US" dirty="0" err="1">
+                <a:latin typeface="Times New Roman" panose="02020603050405020304" pitchFamily="18" charset="0"/>
+                <a:cs typeface="Times New Roman" panose="02020603050405020304" pitchFamily="18" charset="0"/>
+              </a:rPr>
+              <a:t>dụng</a:t>
+            </a:r>
+            <a:r>
+              <a:rPr lang="en-US" dirty="0">
+                <a:latin typeface="Times New Roman" panose="02020603050405020304" pitchFamily="18" charset="0"/>
+                <a:cs typeface="Times New Roman" panose="02020603050405020304" pitchFamily="18" charset="0"/>
+              </a:rPr>
+              <a:t> </a:t>
+            </a:r>
+            <a:r>
+              <a:rPr lang="en-US" dirty="0" err="1">
+                <a:latin typeface="Times New Roman" panose="02020603050405020304" pitchFamily="18" charset="0"/>
+                <a:cs typeface="Times New Roman" panose="02020603050405020304" pitchFamily="18" charset="0"/>
+              </a:rPr>
+              <a:t>với</a:t>
+            </a:r>
+            <a:r>
+              <a:rPr lang="en-US" dirty="0">
+                <a:latin typeface="Times New Roman" panose="02020603050405020304" pitchFamily="18" charset="0"/>
+                <a:cs typeface="Times New Roman" panose="02020603050405020304" pitchFamily="18" charset="0"/>
+              </a:rPr>
+              <a:t> </a:t>
+            </a:r>
+            <a:r>
+              <a:rPr lang="en-US" dirty="0" err="1">
+                <a:latin typeface="Times New Roman" panose="02020603050405020304" pitchFamily="18" charset="0"/>
+                <a:cs typeface="Times New Roman" panose="02020603050405020304" pitchFamily="18" charset="0"/>
+              </a:rPr>
+              <a:t>mục</a:t>
+            </a:r>
+            <a:r>
+              <a:rPr lang="en-US" dirty="0">
+                <a:latin typeface="Times New Roman" panose="02020603050405020304" pitchFamily="18" charset="0"/>
+                <a:cs typeface="Times New Roman" panose="02020603050405020304" pitchFamily="18" charset="0"/>
+              </a:rPr>
+              <a:t> </a:t>
+            </a:r>
+            <a:r>
+              <a:rPr lang="en-US" dirty="0" err="1">
+                <a:latin typeface="Times New Roman" panose="02020603050405020304" pitchFamily="18" charset="0"/>
+                <a:cs typeface="Times New Roman" panose="02020603050405020304" pitchFamily="18" charset="0"/>
+              </a:rPr>
+              <a:t>đích</a:t>
+            </a:r>
+            <a:r>
+              <a:rPr lang="en-US" dirty="0">
+                <a:latin typeface="Times New Roman" panose="02020603050405020304" pitchFamily="18" charset="0"/>
+                <a:cs typeface="Times New Roman" panose="02020603050405020304" pitchFamily="18" charset="0"/>
+              </a:rPr>
+              <a:t> </a:t>
+            </a:r>
+            <a:r>
+              <a:rPr lang="en-US" dirty="0" err="1">
+                <a:latin typeface="Times New Roman" panose="02020603050405020304" pitchFamily="18" charset="0"/>
+                <a:cs typeface="Times New Roman" panose="02020603050405020304" pitchFamily="18" charset="0"/>
+              </a:rPr>
+              <a:t>khác</a:t>
+            </a:r>
+            <a:r>
+              <a:rPr lang="en-US" dirty="0">
+                <a:latin typeface="Times New Roman" panose="02020603050405020304" pitchFamily="18" charset="0"/>
+                <a:cs typeface="Times New Roman" panose="02020603050405020304" pitchFamily="18" charset="0"/>
+              </a:rPr>
+              <a:t> </a:t>
+            </a:r>
+            <a:r>
+              <a:rPr lang="en-US" dirty="0" err="1">
+                <a:latin typeface="Times New Roman" panose="02020603050405020304" pitchFamily="18" charset="0"/>
+                <a:cs typeface="Times New Roman" panose="02020603050405020304" pitchFamily="18" charset="0"/>
+              </a:rPr>
+              <a:t>như</a:t>
+            </a:r>
+            <a:r>
+              <a:rPr lang="en-US" dirty="0">
+                <a:latin typeface="Times New Roman" panose="02020603050405020304" pitchFamily="18" charset="0"/>
+                <a:cs typeface="Times New Roman" panose="02020603050405020304" pitchFamily="18" charset="0"/>
+              </a:rPr>
+              <a:t> </a:t>
+            </a:r>
+            <a:r>
+              <a:rPr lang="en-US" dirty="0" err="1">
+                <a:latin typeface="Times New Roman" panose="02020603050405020304" pitchFamily="18" charset="0"/>
+                <a:cs typeface="Times New Roman" panose="02020603050405020304" pitchFamily="18" charset="0"/>
+              </a:rPr>
+              <a:t>từ</a:t>
+            </a:r>
+            <a:r>
+              <a:rPr lang="en-US" dirty="0">
+                <a:latin typeface="Times New Roman" panose="02020603050405020304" pitchFamily="18" charset="0"/>
+                <a:cs typeface="Times New Roman" panose="02020603050405020304" pitchFamily="18" charset="0"/>
+              </a:rPr>
+              <a:t> </a:t>
+            </a:r>
+            <a:r>
+              <a:rPr lang="en-US" dirty="0" err="1">
+                <a:latin typeface="Times New Roman" panose="02020603050405020304" pitchFamily="18" charset="0"/>
+                <a:cs typeface="Times New Roman" panose="02020603050405020304" pitchFamily="18" charset="0"/>
+              </a:rPr>
+              <a:t>viết</a:t>
+            </a:r>
+            <a:r>
+              <a:rPr lang="en-US" dirty="0">
+                <a:latin typeface="Times New Roman" panose="02020603050405020304" pitchFamily="18" charset="0"/>
+                <a:cs typeface="Times New Roman" panose="02020603050405020304" pitchFamily="18" charset="0"/>
+              </a:rPr>
+              <a:t> </a:t>
+            </a:r>
+            <a:r>
+              <a:rPr lang="en-US" dirty="0" err="1">
+                <a:latin typeface="Times New Roman" panose="02020603050405020304" pitchFamily="18" charset="0"/>
+                <a:cs typeface="Times New Roman" panose="02020603050405020304" pitchFamily="18" charset="0"/>
+              </a:rPr>
+              <a:t>tắt</a:t>
+            </a:r>
+            <a:r>
+              <a:rPr lang="en-US" dirty="0">
+                <a:latin typeface="Times New Roman" panose="02020603050405020304" pitchFamily="18" charset="0"/>
+                <a:cs typeface="Times New Roman" panose="02020603050405020304" pitchFamily="18" charset="0"/>
+              </a:rPr>
+              <a:t>, </a:t>
+            </a:r>
+            <a:r>
+              <a:rPr lang="en-US" dirty="0" err="1">
+                <a:latin typeface="Times New Roman" panose="02020603050405020304" pitchFamily="18" charset="0"/>
+                <a:cs typeface="Times New Roman" panose="02020603050405020304" pitchFamily="18" charset="0"/>
+              </a:rPr>
+              <a:t>số</a:t>
+            </a:r>
+            <a:r>
+              <a:rPr lang="en-US" dirty="0">
+                <a:latin typeface="Times New Roman" panose="02020603050405020304" pitchFamily="18" charset="0"/>
+                <a:cs typeface="Times New Roman" panose="02020603050405020304" pitchFamily="18" charset="0"/>
+              </a:rPr>
+              <a:t> </a:t>
+            </a:r>
+            <a:r>
+              <a:rPr lang="en-US" dirty="0" err="1">
+                <a:latin typeface="Times New Roman" panose="02020603050405020304" pitchFamily="18" charset="0"/>
+                <a:cs typeface="Times New Roman" panose="02020603050405020304" pitchFamily="18" charset="0"/>
+              </a:rPr>
+              <a:t>phẩy</a:t>
+            </a:r>
+            <a:r>
+              <a:rPr lang="en-US" dirty="0">
+                <a:latin typeface="Times New Roman" panose="02020603050405020304" pitchFamily="18" charset="0"/>
+                <a:cs typeface="Times New Roman" panose="02020603050405020304" pitchFamily="18" charset="0"/>
+              </a:rPr>
+              <a:t>… </a:t>
+            </a:r>
+            <a:r>
+              <a:rPr lang="en-US" dirty="0">
+                <a:latin typeface="Times New Roman" panose="02020603050405020304" pitchFamily="18" charset="0"/>
+                <a:cs typeface="Times New Roman" panose="02020603050405020304" pitchFamily="18" charset="0"/>
+                <a:sym typeface="Wingdings" panose="05000000000000000000" pitchFamily="2" charset="2"/>
+              </a:rPr>
+              <a:t> </a:t>
+            </a:r>
+            <a:r>
+              <a:rPr lang="en-US" dirty="0" err="1">
+                <a:latin typeface="Times New Roman" panose="02020603050405020304" pitchFamily="18" charset="0"/>
+                <a:cs typeface="Times New Roman" panose="02020603050405020304" pitchFamily="18" charset="0"/>
+                <a:sym typeface="Wingdings" panose="05000000000000000000" pitchFamily="2" charset="2"/>
+              </a:rPr>
+              <a:t>Khó</a:t>
+            </a:r>
+            <a:r>
+              <a:rPr lang="en-US" dirty="0">
+                <a:latin typeface="Times New Roman" panose="02020603050405020304" pitchFamily="18" charset="0"/>
+                <a:cs typeface="Times New Roman" panose="02020603050405020304" pitchFamily="18" charset="0"/>
+                <a:sym typeface="Wingdings" panose="05000000000000000000" pitchFamily="2" charset="2"/>
+              </a:rPr>
+              <a:t> </a:t>
+            </a:r>
+            <a:r>
+              <a:rPr lang="en-US" dirty="0" err="1">
+                <a:latin typeface="Times New Roman" panose="02020603050405020304" pitchFamily="18" charset="0"/>
+                <a:cs typeface="Times New Roman" panose="02020603050405020304" pitchFamily="18" charset="0"/>
+                <a:sym typeface="Wingdings" panose="05000000000000000000" pitchFamily="2" charset="2"/>
+              </a:rPr>
+              <a:t>khăn</a:t>
+            </a:r>
+            <a:r>
+              <a:rPr lang="en-US" dirty="0">
+                <a:latin typeface="Times New Roman" panose="02020603050405020304" pitchFamily="18" charset="0"/>
+                <a:cs typeface="Times New Roman" panose="02020603050405020304" pitchFamily="18" charset="0"/>
+                <a:sym typeface="Wingdings" panose="05000000000000000000" pitchFamily="2" charset="2"/>
+              </a:rPr>
+              <a:t> sentence segmentation</a:t>
+            </a:r>
+          </a:p>
+          <a:p>
+            <a:pPr marL="0" indent="0">
+              <a:buNone/>
+            </a:pPr>
+            <a:r>
+              <a:rPr lang="en-US" dirty="0">
+                <a:latin typeface="Times New Roman" panose="02020603050405020304" pitchFamily="18" charset="0"/>
+                <a:cs typeface="Times New Roman" panose="02020603050405020304" pitchFamily="18" charset="0"/>
+                <a:sym typeface="Wingdings" panose="05000000000000000000" pitchFamily="2" charset="2"/>
+              </a:rPr>
+              <a:t>			</a:t>
+            </a:r>
+            <a:r>
+              <a:rPr lang="en-US" dirty="0" err="1">
+                <a:latin typeface="Times New Roman" panose="02020603050405020304" pitchFamily="18" charset="0"/>
+                <a:cs typeface="Times New Roman" panose="02020603050405020304" pitchFamily="18" charset="0"/>
+                <a:sym typeface="Wingdings" panose="05000000000000000000" pitchFamily="2" charset="2"/>
+              </a:rPr>
+              <a:t>Ví</a:t>
+            </a:r>
+            <a:r>
+              <a:rPr lang="en-US" dirty="0">
+                <a:latin typeface="Times New Roman" panose="02020603050405020304" pitchFamily="18" charset="0"/>
+                <a:cs typeface="Times New Roman" panose="02020603050405020304" pitchFamily="18" charset="0"/>
+                <a:sym typeface="Wingdings" panose="05000000000000000000" pitchFamily="2" charset="2"/>
+              </a:rPr>
+              <a:t> </a:t>
+            </a:r>
+            <a:r>
+              <a:rPr lang="en-US" dirty="0" err="1">
+                <a:latin typeface="Times New Roman" panose="02020603050405020304" pitchFamily="18" charset="0"/>
+                <a:cs typeface="Times New Roman" panose="02020603050405020304" pitchFamily="18" charset="0"/>
+                <a:sym typeface="Wingdings" panose="05000000000000000000" pitchFamily="2" charset="2"/>
+              </a:rPr>
+              <a:t>dụ</a:t>
+            </a:r>
+            <a:r>
+              <a:rPr lang="en-US" dirty="0">
+                <a:latin typeface="Times New Roman" panose="02020603050405020304" pitchFamily="18" charset="0"/>
+                <a:cs typeface="Times New Roman" panose="02020603050405020304" pitchFamily="18" charset="0"/>
+                <a:sym typeface="Wingdings" panose="05000000000000000000" pitchFamily="2" charset="2"/>
+              </a:rPr>
+              <a:t>: Mr. Lam	HVN Corp.	1.2</a:t>
+            </a:r>
+            <a:endParaRPr lang="en-US" dirty="0">
+              <a:latin typeface="Times New Roman" panose="02020603050405020304" pitchFamily="18" charset="0"/>
+              <a:cs typeface="Times New Roman" panose="02020603050405020304" pitchFamily="18" charset="0"/>
+            </a:endParaRPr>
+          </a:p>
+          <a:p>
+            <a:endParaRPr lang="en-US" dirty="0"/>
           </a:p>
         </p:txBody>
       </p:sp>
@@ -10936,7 +11243,7 @@
           <p:cNvPr id="4" name="Title 1">
             <a:extLst>
               <a:ext uri="{FF2B5EF4-FFF2-40B4-BE49-F238E27FC236}">
-                <a16:creationId xmlns:a16="http://schemas.microsoft.com/office/drawing/2014/main" id="{AF1CA3CF-B47B-4E45-BDAB-6D8E8590E04C}"/>
+                <a16:creationId xmlns:a16="http://schemas.microsoft.com/office/drawing/2014/main" id="{01A58B5A-1ACB-486F-A6E0-8F446AC6748B}"/>
               </a:ext>
             </a:extLst>
           </p:cNvPr>
@@ -10947,7 +11254,12 @@
             <p:ph type="title"/>
           </p:nvPr>
         </p:nvSpPr>
-        <p:spPr/>
+        <p:spPr>
+          <a:xfrm>
+            <a:off x="1484311" y="685800"/>
+            <a:ext cx="10018713" cy="1752599"/>
+          </a:xfrm>
+        </p:spPr>
         <p:txBody>
           <a:bodyPr/>
           <a:lstStyle/>
@@ -10969,7 +11281,7 @@
     </p:spTree>
     <p:extLst>
       <p:ext uri="{BB962C8B-B14F-4D97-AF65-F5344CB8AC3E}">
-        <p14:creationId xmlns:p14="http://schemas.microsoft.com/office/powerpoint/2010/main" val="3983537852"/>
+        <p14:creationId xmlns:p14="http://schemas.microsoft.com/office/powerpoint/2010/main" val="1734089245"/>
       </p:ext>
     </p:extLst>
   </p:cSld>
@@ -11001,7 +11313,7 @@
           <p:cNvPr id="3" name="Content Placeholder 2">
             <a:extLst>
               <a:ext uri="{FF2B5EF4-FFF2-40B4-BE49-F238E27FC236}">
-                <a16:creationId xmlns:a16="http://schemas.microsoft.com/office/drawing/2014/main" id="{46319F7C-AEAD-471F-947F-60F56F29266F}"/>
+                <a16:creationId xmlns:a16="http://schemas.microsoft.com/office/drawing/2014/main" id="{5C85A5BA-7BED-4930-8B2C-A643527BD467}"/>
               </a:ext>
             </a:extLst>
           </p:cNvPr>
@@ -11012,15 +11324,10 @@
             <p:ph idx="1"/>
           </p:nvPr>
         </p:nvSpPr>
-        <p:spPr>
-          <a:xfrm>
-            <a:off x="1280161" y="2438399"/>
-            <a:ext cx="10222863" cy="3352801"/>
-          </a:xfrm>
-        </p:spPr>
+        <p:spPr/>
         <p:txBody>
           <a:bodyPr>
-            <a:normAutofit/>
+            <a:noAutofit/>
           </a:bodyPr>
           <a:lstStyle/>
           <a:p>
@@ -11029,91 +11336,7 @@
                 <a:latin typeface="Times New Roman" panose="02020603050405020304" pitchFamily="18" charset="0"/>
                 <a:cs typeface="Times New Roman" panose="02020603050405020304" pitchFamily="18" charset="0"/>
               </a:rPr>
-              <a:t>Tiếng</a:t>
-            </a:r>
-            <a:r>
-              <a:rPr lang="en-US" dirty="0">
-                <a:latin typeface="Times New Roman" panose="02020603050405020304" pitchFamily="18" charset="0"/>
-                <a:cs typeface="Times New Roman" panose="02020603050405020304" pitchFamily="18" charset="0"/>
-              </a:rPr>
-              <a:t> Anh </a:t>
-            </a:r>
-            <a:r>
-              <a:rPr lang="en-US" dirty="0" err="1">
-                <a:latin typeface="Times New Roman" panose="02020603050405020304" pitchFamily="18" charset="0"/>
-                <a:cs typeface="Times New Roman" panose="02020603050405020304" pitchFamily="18" charset="0"/>
-              </a:rPr>
-              <a:t>sử</a:t>
-            </a:r>
-            <a:r>
-              <a:rPr lang="en-US" dirty="0">
-                <a:latin typeface="Times New Roman" panose="02020603050405020304" pitchFamily="18" charset="0"/>
-                <a:cs typeface="Times New Roman" panose="02020603050405020304" pitchFamily="18" charset="0"/>
-              </a:rPr>
-              <a:t> </a:t>
-            </a:r>
-            <a:r>
-              <a:rPr lang="en-US" dirty="0" err="1">
-                <a:latin typeface="Times New Roman" panose="02020603050405020304" pitchFamily="18" charset="0"/>
-                <a:cs typeface="Times New Roman" panose="02020603050405020304" pitchFamily="18" charset="0"/>
-              </a:rPr>
-              <a:t>và</a:t>
-            </a:r>
-            <a:r>
-              <a:rPr lang="en-US" dirty="0">
-                <a:latin typeface="Times New Roman" panose="02020603050405020304" pitchFamily="18" charset="0"/>
-                <a:cs typeface="Times New Roman" panose="02020603050405020304" pitchFamily="18" charset="0"/>
-              </a:rPr>
-              <a:t> </a:t>
-            </a:r>
-            <a:r>
-              <a:rPr lang="en-US" dirty="0" err="1">
-                <a:latin typeface="Times New Roman" panose="02020603050405020304" pitchFamily="18" charset="0"/>
-                <a:cs typeface="Times New Roman" panose="02020603050405020304" pitchFamily="18" charset="0"/>
-              </a:rPr>
-              <a:t>nhiều</a:t>
-            </a:r>
-            <a:r>
-              <a:rPr lang="en-US" dirty="0">
-                <a:latin typeface="Times New Roman" panose="02020603050405020304" pitchFamily="18" charset="0"/>
-                <a:cs typeface="Times New Roman" panose="02020603050405020304" pitchFamily="18" charset="0"/>
-              </a:rPr>
-              <a:t> </a:t>
-            </a:r>
-            <a:r>
-              <a:rPr lang="en-US" dirty="0" err="1">
-                <a:latin typeface="Times New Roman" panose="02020603050405020304" pitchFamily="18" charset="0"/>
-                <a:cs typeface="Times New Roman" panose="02020603050405020304" pitchFamily="18" charset="0"/>
-              </a:rPr>
-              <a:t>ngôn</a:t>
-            </a:r>
-            <a:r>
-              <a:rPr lang="en-US" dirty="0">
-                <a:latin typeface="Times New Roman" panose="02020603050405020304" pitchFamily="18" charset="0"/>
-                <a:cs typeface="Times New Roman" panose="02020603050405020304" pitchFamily="18" charset="0"/>
-              </a:rPr>
-              <a:t> </a:t>
-            </a:r>
-            <a:r>
-              <a:rPr lang="en-US" dirty="0" err="1">
-                <a:latin typeface="Times New Roman" panose="02020603050405020304" pitchFamily="18" charset="0"/>
-                <a:cs typeface="Times New Roman" panose="02020603050405020304" pitchFamily="18" charset="0"/>
-              </a:rPr>
-              <a:t>ngữ</a:t>
-            </a:r>
-            <a:r>
-              <a:rPr lang="en-US" dirty="0">
-                <a:latin typeface="Times New Roman" panose="02020603050405020304" pitchFamily="18" charset="0"/>
-                <a:cs typeface="Times New Roman" panose="02020603050405020304" pitchFamily="18" charset="0"/>
-              </a:rPr>
-              <a:t> </a:t>
-            </a:r>
-            <a:r>
-              <a:rPr lang="en-US" dirty="0" err="1">
-                <a:latin typeface="Times New Roman" panose="02020603050405020304" pitchFamily="18" charset="0"/>
-                <a:cs typeface="Times New Roman" panose="02020603050405020304" pitchFamily="18" charset="0"/>
-              </a:rPr>
-              <a:t>sử</a:t>
+              <a:t>Sử</a:t>
             </a:r>
             <a:r>
               <a:rPr lang="en-US" dirty="0">
@@ -11134,42 +11357,201 @@
                 <a:latin typeface="Times New Roman" panose="02020603050405020304" pitchFamily="18" charset="0"/>
                 <a:cs typeface="Times New Roman" panose="02020603050405020304" pitchFamily="18" charset="0"/>
               </a:rPr>
-              <a:t> </a:t>
-            </a:r>
-            <a:r>
-              <a:rPr lang="en-US" dirty="0" err="1">
-                <a:latin typeface="Times New Roman" panose="02020603050405020304" pitchFamily="18" charset="0"/>
-                <a:cs typeface="Times New Roman" panose="02020603050405020304" pitchFamily="18" charset="0"/>
-              </a:rPr>
-              <a:t>dấu</a:t>
-            </a:r>
-            <a:r>
-              <a:rPr lang="en-US" dirty="0">
-                <a:latin typeface="Times New Roman" panose="02020603050405020304" pitchFamily="18" charset="0"/>
-                <a:cs typeface="Times New Roman" panose="02020603050405020304" pitchFamily="18" charset="0"/>
-              </a:rPr>
-              <a:t> </a:t>
-            </a:r>
-            <a:r>
-              <a:rPr lang="en-US" dirty="0" err="1">
-                <a:latin typeface="Times New Roman" panose="02020603050405020304" pitchFamily="18" charset="0"/>
-                <a:cs typeface="Times New Roman" panose="02020603050405020304" pitchFamily="18" charset="0"/>
-              </a:rPr>
-              <a:t>chấm</a:t>
-            </a:r>
-            <a:r>
-              <a:rPr lang="en-US" dirty="0">
-                <a:latin typeface="Times New Roman" panose="02020603050405020304" pitchFamily="18" charset="0"/>
-                <a:cs typeface="Times New Roman" panose="02020603050405020304" pitchFamily="18" charset="0"/>
-              </a:rPr>
-              <a:t> </a:t>
-            </a:r>
-            <a:r>
-              <a:rPr lang="en-US" dirty="0" err="1">
-                <a:latin typeface="Times New Roman" panose="02020603050405020304" pitchFamily="18" charset="0"/>
-                <a:cs typeface="Times New Roman" panose="02020603050405020304" pitchFamily="18" charset="0"/>
-              </a:rPr>
-              <a:t>câu</a:t>
+              <a:t> class </a:t>
+            </a:r>
+            <a:r>
+              <a:rPr lang="en-US" dirty="0" err="1">
+                <a:latin typeface="Times New Roman" panose="02020603050405020304" pitchFamily="18" charset="0"/>
+                <a:cs typeface="Times New Roman" panose="02020603050405020304" pitchFamily="18" charset="0"/>
+              </a:rPr>
+              <a:t>PTBTokenizer</a:t>
+            </a:r>
+            <a:r>
+              <a:rPr lang="en-US" dirty="0">
+                <a:latin typeface="Times New Roman" panose="02020603050405020304" pitchFamily="18" charset="0"/>
+                <a:cs typeface="Times New Roman" panose="02020603050405020304" pitchFamily="18" charset="0"/>
+              </a:rPr>
+              <a:t> </a:t>
+            </a:r>
+          </a:p>
+          <a:p>
+            <a:r>
+              <a:rPr lang="en-US" dirty="0" err="1">
+                <a:latin typeface="Times New Roman" panose="02020603050405020304" pitchFamily="18" charset="0"/>
+                <a:cs typeface="Times New Roman" panose="02020603050405020304" pitchFamily="18" charset="0"/>
+              </a:rPr>
+              <a:t>Các</a:t>
+            </a:r>
+            <a:r>
+              <a:rPr lang="en-US" dirty="0">
+                <a:latin typeface="Times New Roman" panose="02020603050405020304" pitchFamily="18" charset="0"/>
+                <a:cs typeface="Times New Roman" panose="02020603050405020304" pitchFamily="18" charset="0"/>
+              </a:rPr>
+              <a:t> b</a:t>
+            </a:r>
+            <a:r>
+              <a:rPr lang="vi-VN" dirty="0">
+                <a:latin typeface="Times New Roman" panose="02020603050405020304" pitchFamily="18" charset="0"/>
+                <a:cs typeface="Times New Roman" panose="02020603050405020304" pitchFamily="18" charset="0"/>
+              </a:rPr>
+              <a:t>ư</a:t>
+            </a:r>
+            <a:r>
+              <a:rPr lang="en-US" dirty="0" err="1">
+                <a:latin typeface="Times New Roman" panose="02020603050405020304" pitchFamily="18" charset="0"/>
+                <a:cs typeface="Times New Roman" panose="02020603050405020304" pitchFamily="18" charset="0"/>
+              </a:rPr>
+              <a:t>ớc</a:t>
+            </a:r>
+            <a:r>
+              <a:rPr lang="en-US" dirty="0">
+                <a:latin typeface="Times New Roman" panose="02020603050405020304" pitchFamily="18" charset="0"/>
+                <a:cs typeface="Times New Roman" panose="02020603050405020304" pitchFamily="18" charset="0"/>
+              </a:rPr>
+              <a:t> </a:t>
+            </a:r>
+            <a:r>
+              <a:rPr lang="en-US" dirty="0" err="1">
+                <a:latin typeface="Times New Roman" panose="02020603050405020304" pitchFamily="18" charset="0"/>
+                <a:cs typeface="Times New Roman" panose="02020603050405020304" pitchFamily="18" charset="0"/>
+              </a:rPr>
+              <a:t>thực</a:t>
+            </a:r>
+            <a:r>
+              <a:rPr lang="en-US" dirty="0">
+                <a:latin typeface="Times New Roman" panose="02020603050405020304" pitchFamily="18" charset="0"/>
+                <a:cs typeface="Times New Roman" panose="02020603050405020304" pitchFamily="18" charset="0"/>
+              </a:rPr>
+              <a:t> </a:t>
+            </a:r>
+            <a:r>
+              <a:rPr lang="en-US" dirty="0" err="1">
+                <a:latin typeface="Times New Roman" panose="02020603050405020304" pitchFamily="18" charset="0"/>
+                <a:cs typeface="Times New Roman" panose="02020603050405020304" pitchFamily="18" charset="0"/>
+              </a:rPr>
+              <a:t>hiện</a:t>
+            </a:r>
+            <a:r>
+              <a:rPr lang="en-US" dirty="0">
+                <a:latin typeface="Times New Roman" panose="02020603050405020304" pitchFamily="18" charset="0"/>
+                <a:cs typeface="Times New Roman" panose="02020603050405020304" pitchFamily="18" charset="0"/>
+              </a:rPr>
+              <a:t>: </a:t>
+            </a:r>
+          </a:p>
+          <a:p>
+            <a:pPr lvl="1"/>
+            <a:r>
+              <a:rPr lang="en-US" sz="2400" dirty="0" err="1">
+                <a:latin typeface="Times New Roman" panose="02020603050405020304" pitchFamily="18" charset="0"/>
+                <a:cs typeface="Times New Roman" panose="02020603050405020304" pitchFamily="18" charset="0"/>
+              </a:rPr>
+              <a:t>Chuyển</a:t>
+            </a:r>
+            <a:r>
+              <a:rPr lang="en-US" sz="2400" dirty="0">
+                <a:latin typeface="Times New Roman" panose="02020603050405020304" pitchFamily="18" charset="0"/>
+                <a:cs typeface="Times New Roman" panose="02020603050405020304" pitchFamily="18" charset="0"/>
+              </a:rPr>
+              <a:t> </a:t>
+            </a:r>
+            <a:r>
+              <a:rPr lang="en-US" sz="2400" dirty="0" err="1">
+                <a:latin typeface="Times New Roman" panose="02020603050405020304" pitchFamily="18" charset="0"/>
+                <a:cs typeface="Times New Roman" panose="02020603050405020304" pitchFamily="18" charset="0"/>
+              </a:rPr>
+              <a:t>văn</a:t>
+            </a:r>
+            <a:r>
+              <a:rPr lang="en-US" sz="2400" dirty="0">
+                <a:latin typeface="Times New Roman" panose="02020603050405020304" pitchFamily="18" charset="0"/>
+                <a:cs typeface="Times New Roman" panose="02020603050405020304" pitchFamily="18" charset="0"/>
+              </a:rPr>
+              <a:t> </a:t>
+            </a:r>
+            <a:r>
+              <a:rPr lang="en-US" sz="2400" dirty="0" err="1">
+                <a:latin typeface="Times New Roman" panose="02020603050405020304" pitchFamily="18" charset="0"/>
+                <a:cs typeface="Times New Roman" panose="02020603050405020304" pitchFamily="18" charset="0"/>
+              </a:rPr>
+              <a:t>bản</a:t>
+            </a:r>
+            <a:r>
+              <a:rPr lang="en-US" sz="2400" dirty="0">
+                <a:latin typeface="Times New Roman" panose="02020603050405020304" pitchFamily="18" charset="0"/>
+                <a:cs typeface="Times New Roman" panose="02020603050405020304" pitchFamily="18" charset="0"/>
+              </a:rPr>
+              <a:t> string </a:t>
+            </a:r>
+            <a:r>
+              <a:rPr lang="en-US" sz="2400" dirty="0" err="1">
+                <a:latin typeface="Times New Roman" panose="02020603050405020304" pitchFamily="18" charset="0"/>
+                <a:cs typeface="Times New Roman" panose="02020603050405020304" pitchFamily="18" charset="0"/>
+              </a:rPr>
+              <a:t>thành</a:t>
+            </a:r>
+            <a:r>
+              <a:rPr lang="en-US" sz="2400" dirty="0">
+                <a:latin typeface="Times New Roman" panose="02020603050405020304" pitchFamily="18" charset="0"/>
+                <a:cs typeface="Times New Roman" panose="02020603050405020304" pitchFamily="18" charset="0"/>
+              </a:rPr>
+              <a:t> </a:t>
+            </a:r>
+            <a:r>
+              <a:rPr lang="en-US" sz="2400" dirty="0" err="1">
+                <a:latin typeface="Times New Roman" panose="02020603050405020304" pitchFamily="18" charset="0"/>
+                <a:cs typeface="Times New Roman" panose="02020603050405020304" pitchFamily="18" charset="0"/>
+              </a:rPr>
+              <a:t>StringReader</a:t>
+            </a:r>
+            <a:endParaRPr lang="en-US" sz="2400" dirty="0">
+              <a:latin typeface="Times New Roman" panose="02020603050405020304" pitchFamily="18" charset="0"/>
+              <a:cs typeface="Times New Roman" panose="02020603050405020304" pitchFamily="18" charset="0"/>
+            </a:endParaRPr>
+          </a:p>
+          <a:p>
+            <a:pPr lvl="1"/>
+            <a:endParaRPr lang="en-US" sz="2400" dirty="0">
+              <a:latin typeface="Times New Roman" panose="02020603050405020304" pitchFamily="18" charset="0"/>
+              <a:cs typeface="Times New Roman" panose="02020603050405020304" pitchFamily="18" charset="0"/>
+            </a:endParaRPr>
+          </a:p>
+          <a:p>
+            <a:pPr lvl="1"/>
+            <a:r>
+              <a:rPr lang="en-US" sz="2400" dirty="0" err="1">
+                <a:latin typeface="Times New Roman" panose="02020603050405020304" pitchFamily="18" charset="0"/>
+                <a:cs typeface="Times New Roman" panose="02020603050405020304" pitchFamily="18" charset="0"/>
+              </a:rPr>
+              <a:t>Sử</a:t>
+            </a:r>
+            <a:r>
+              <a:rPr lang="en-US" sz="2400" dirty="0">
+                <a:latin typeface="Times New Roman" panose="02020603050405020304" pitchFamily="18" charset="0"/>
+                <a:cs typeface="Times New Roman" panose="02020603050405020304" pitchFamily="18" charset="0"/>
+              </a:rPr>
+              <a:t> </a:t>
+            </a:r>
+            <a:r>
+              <a:rPr lang="en-US" dirty="0" err="1">
+                <a:latin typeface="Times New Roman" panose="02020603050405020304" pitchFamily="18" charset="0"/>
+                <a:cs typeface="Times New Roman" panose="02020603050405020304" pitchFamily="18" charset="0"/>
+              </a:rPr>
+              <a:t>dụng</a:t>
+            </a:r>
+            <a:r>
+              <a:rPr lang="en-US" dirty="0">
+                <a:latin typeface="Times New Roman" panose="02020603050405020304" pitchFamily="18" charset="0"/>
+                <a:cs typeface="Times New Roman" panose="02020603050405020304" pitchFamily="18" charset="0"/>
+              </a:rPr>
+              <a:t> class </a:t>
+            </a:r>
+            <a:r>
+              <a:rPr lang="en-US" dirty="0" err="1">
+                <a:latin typeface="Times New Roman" panose="02020603050405020304" pitchFamily="18" charset="0"/>
+                <a:cs typeface="Times New Roman" panose="02020603050405020304" pitchFamily="18" charset="0"/>
+              </a:rPr>
+              <a:t>PTBTokenizer</a:t>
             </a:r>
             <a:r>
               <a:rPr lang="en-US" dirty="0">
@@ -11211,209 +11593,34 @@
                 <a:latin typeface="Times New Roman" panose="02020603050405020304" pitchFamily="18" charset="0"/>
                 <a:cs typeface="Times New Roman" panose="02020603050405020304" pitchFamily="18" charset="0"/>
               </a:rPr>
-              <a:t>cách</a:t>
-            </a:r>
-            <a:r>
-              <a:rPr lang="en-US" dirty="0">
-                <a:latin typeface="Times New Roman" panose="02020603050405020304" pitchFamily="18" charset="0"/>
-                <a:cs typeface="Times New Roman" panose="02020603050405020304" pitchFamily="18" charset="0"/>
-              </a:rPr>
-              <a:t> </a:t>
-            </a:r>
-            <a:r>
-              <a:rPr lang="en-US" dirty="0" err="1">
-                <a:latin typeface="Times New Roman" panose="02020603050405020304" pitchFamily="18" charset="0"/>
-                <a:cs typeface="Times New Roman" panose="02020603050405020304" pitchFamily="18" charset="0"/>
-              </a:rPr>
-              <a:t>câu</a:t>
-            </a:r>
-            <a:r>
-              <a:rPr lang="en-US" dirty="0">
-                <a:latin typeface="Times New Roman" panose="02020603050405020304" pitchFamily="18" charset="0"/>
-                <a:cs typeface="Times New Roman" panose="02020603050405020304" pitchFamily="18" charset="0"/>
-              </a:rPr>
-              <a:t>. </a:t>
-            </a:r>
-            <a:r>
-              <a:rPr lang="en-US" dirty="0" err="1">
-                <a:latin typeface="Times New Roman" panose="02020603050405020304" pitchFamily="18" charset="0"/>
-                <a:cs typeface="Times New Roman" panose="02020603050405020304" pitchFamily="18" charset="0"/>
-              </a:rPr>
-              <a:t>Một</a:t>
-            </a:r>
-            <a:r>
-              <a:rPr lang="en-US" dirty="0">
-                <a:latin typeface="Times New Roman" panose="02020603050405020304" pitchFamily="18" charset="0"/>
-                <a:cs typeface="Times New Roman" panose="02020603050405020304" pitchFamily="18" charset="0"/>
-              </a:rPr>
-              <a:t> </a:t>
-            </a:r>
-            <a:r>
-              <a:rPr lang="en-US" dirty="0" err="1">
-                <a:latin typeface="Times New Roman" panose="02020603050405020304" pitchFamily="18" charset="0"/>
-                <a:cs typeface="Times New Roman" panose="02020603050405020304" pitchFamily="18" charset="0"/>
-              </a:rPr>
-              <a:t>số</a:t>
-            </a:r>
-            <a:r>
-              <a:rPr lang="en-US" dirty="0">
-                <a:latin typeface="Times New Roman" panose="02020603050405020304" pitchFamily="18" charset="0"/>
-                <a:cs typeface="Times New Roman" panose="02020603050405020304" pitchFamily="18" charset="0"/>
-              </a:rPr>
-              <a:t> </a:t>
-            </a:r>
-            <a:r>
-              <a:rPr lang="en-US" dirty="0" err="1">
-                <a:latin typeface="Times New Roman" panose="02020603050405020304" pitchFamily="18" charset="0"/>
-                <a:cs typeface="Times New Roman" panose="02020603050405020304" pitchFamily="18" charset="0"/>
-              </a:rPr>
-              <a:t>ngôn</a:t>
-            </a:r>
-            <a:r>
-              <a:rPr lang="en-US" dirty="0">
-                <a:latin typeface="Times New Roman" panose="02020603050405020304" pitchFamily="18" charset="0"/>
-                <a:cs typeface="Times New Roman" panose="02020603050405020304" pitchFamily="18" charset="0"/>
-              </a:rPr>
-              <a:t> </a:t>
-            </a:r>
-            <a:r>
-              <a:rPr lang="en-US" dirty="0" err="1">
-                <a:latin typeface="Times New Roman" panose="02020603050405020304" pitchFamily="18" charset="0"/>
-                <a:cs typeface="Times New Roman" panose="02020603050405020304" pitchFamily="18" charset="0"/>
-              </a:rPr>
-              <a:t>ngữ</a:t>
-            </a:r>
-            <a:r>
-              <a:rPr lang="en-US" dirty="0">
-                <a:latin typeface="Times New Roman" panose="02020603050405020304" pitchFamily="18" charset="0"/>
-                <a:cs typeface="Times New Roman" panose="02020603050405020304" pitchFamily="18" charset="0"/>
-              </a:rPr>
-              <a:t> </a:t>
-            </a:r>
-            <a:r>
-              <a:rPr lang="en-US" dirty="0" err="1">
-                <a:latin typeface="Times New Roman" panose="02020603050405020304" pitchFamily="18" charset="0"/>
-                <a:cs typeface="Times New Roman" panose="02020603050405020304" pitchFamily="18" charset="0"/>
-              </a:rPr>
-              <a:t>khác</a:t>
-            </a:r>
-            <a:r>
-              <a:rPr lang="en-US" dirty="0">
-                <a:latin typeface="Times New Roman" panose="02020603050405020304" pitchFamily="18" charset="0"/>
-                <a:cs typeface="Times New Roman" panose="02020603050405020304" pitchFamily="18" charset="0"/>
-              </a:rPr>
-              <a:t> </a:t>
-            </a:r>
-            <a:r>
-              <a:rPr lang="en-US" dirty="0" err="1">
-                <a:latin typeface="Times New Roman" panose="02020603050405020304" pitchFamily="18" charset="0"/>
-                <a:cs typeface="Times New Roman" panose="02020603050405020304" pitchFamily="18" charset="0"/>
-              </a:rPr>
-              <a:t>thì</a:t>
-            </a:r>
-            <a:r>
-              <a:rPr lang="en-US" dirty="0">
-                <a:latin typeface="Times New Roman" panose="02020603050405020304" pitchFamily="18" charset="0"/>
-                <a:cs typeface="Times New Roman" panose="02020603050405020304" pitchFamily="18" charset="0"/>
-              </a:rPr>
-              <a:t> </a:t>
-            </a:r>
-            <a:r>
-              <a:rPr lang="en-US" dirty="0" err="1">
-                <a:latin typeface="Times New Roman" panose="02020603050405020304" pitchFamily="18" charset="0"/>
-                <a:cs typeface="Times New Roman" panose="02020603050405020304" pitchFamily="18" charset="0"/>
-              </a:rPr>
-              <a:t>không</a:t>
-            </a:r>
-            <a:r>
-              <a:rPr lang="en-US" dirty="0">
-                <a:latin typeface="Times New Roman" panose="02020603050405020304" pitchFamily="18" charset="0"/>
-                <a:cs typeface="Times New Roman" panose="02020603050405020304" pitchFamily="18" charset="0"/>
-              </a:rPr>
-              <a:t> </a:t>
-            </a:r>
-            <a:r>
-              <a:rPr lang="en-US" dirty="0" err="1">
-                <a:latin typeface="Times New Roman" panose="02020603050405020304" pitchFamily="18" charset="0"/>
-                <a:cs typeface="Times New Roman" panose="02020603050405020304" pitchFamily="18" charset="0"/>
-              </a:rPr>
-              <a:t>có</a:t>
-            </a:r>
-            <a:r>
-              <a:rPr lang="en-US" dirty="0">
-                <a:latin typeface="Times New Roman" panose="02020603050405020304" pitchFamily="18" charset="0"/>
-                <a:cs typeface="Times New Roman" panose="02020603050405020304" pitchFamily="18" charset="0"/>
-              </a:rPr>
-              <a:t> </a:t>
-            </a:r>
-            <a:r>
-              <a:rPr lang="en-US" dirty="0" err="1">
-                <a:latin typeface="Times New Roman" panose="02020603050405020304" pitchFamily="18" charset="0"/>
-                <a:cs typeface="Times New Roman" panose="02020603050405020304" pitchFamily="18" charset="0"/>
-              </a:rPr>
-              <a:t>hoặc</a:t>
-            </a:r>
-            <a:r>
-              <a:rPr lang="en-US" dirty="0">
-                <a:latin typeface="Times New Roman" panose="02020603050405020304" pitchFamily="18" charset="0"/>
-                <a:cs typeface="Times New Roman" panose="02020603050405020304" pitchFamily="18" charset="0"/>
-              </a:rPr>
-              <a:t> </a:t>
-            </a:r>
-            <a:r>
-              <a:rPr lang="en-US" dirty="0" err="1">
-                <a:latin typeface="Times New Roman" panose="02020603050405020304" pitchFamily="18" charset="0"/>
-                <a:cs typeface="Times New Roman" panose="02020603050405020304" pitchFamily="18" charset="0"/>
-              </a:rPr>
-              <a:t>khác</a:t>
-            </a:r>
-            <a:r>
-              <a:rPr lang="en-US" dirty="0">
-                <a:latin typeface="Times New Roman" panose="02020603050405020304" pitchFamily="18" charset="0"/>
-                <a:cs typeface="Times New Roman" panose="02020603050405020304" pitchFamily="18" charset="0"/>
-              </a:rPr>
-              <a:t> </a:t>
-            </a:r>
-            <a:r>
-              <a:rPr lang="en-US" dirty="0">
-                <a:latin typeface="Times New Roman" panose="02020603050405020304" pitchFamily="18" charset="0"/>
-                <a:cs typeface="Times New Roman" panose="02020603050405020304" pitchFamily="18" charset="0"/>
-                <a:sym typeface="Wingdings" panose="05000000000000000000" pitchFamily="2" charset="2"/>
-              </a:rPr>
-              <a:t> </a:t>
-            </a:r>
-            <a:r>
-              <a:rPr lang="en-US" dirty="0" err="1">
-                <a:latin typeface="Times New Roman" panose="02020603050405020304" pitchFamily="18" charset="0"/>
-                <a:cs typeface="Times New Roman" panose="02020603050405020304" pitchFamily="18" charset="0"/>
-                <a:sym typeface="Wingdings" panose="05000000000000000000" pitchFamily="2" charset="2"/>
-              </a:rPr>
-              <a:t>Khó</a:t>
-            </a:r>
-            <a:r>
-              <a:rPr lang="en-US" dirty="0">
-                <a:latin typeface="Times New Roman" panose="02020603050405020304" pitchFamily="18" charset="0"/>
-                <a:cs typeface="Times New Roman" panose="02020603050405020304" pitchFamily="18" charset="0"/>
-                <a:sym typeface="Wingdings" panose="05000000000000000000" pitchFamily="2" charset="2"/>
-              </a:rPr>
-              <a:t> </a:t>
-            </a:r>
-            <a:r>
-              <a:rPr lang="en-US" dirty="0" err="1">
-                <a:latin typeface="Times New Roman" panose="02020603050405020304" pitchFamily="18" charset="0"/>
-                <a:cs typeface="Times New Roman" panose="02020603050405020304" pitchFamily="18" charset="0"/>
-                <a:sym typeface="Wingdings" panose="05000000000000000000" pitchFamily="2" charset="2"/>
-              </a:rPr>
-              <a:t>khăn</a:t>
-            </a:r>
-            <a:r>
-              <a:rPr lang="en-US" dirty="0">
-                <a:latin typeface="Times New Roman" panose="02020603050405020304" pitchFamily="18" charset="0"/>
-                <a:cs typeface="Times New Roman" panose="02020603050405020304" pitchFamily="18" charset="0"/>
-                <a:sym typeface="Wingdings" panose="05000000000000000000" pitchFamily="2" charset="2"/>
-              </a:rPr>
-              <a:t> sentence segmentation</a:t>
-            </a:r>
+              <a:t>đoạn</a:t>
+            </a:r>
+            <a:r>
+              <a:rPr lang="en-US" dirty="0">
+                <a:latin typeface="Times New Roman" panose="02020603050405020304" pitchFamily="18" charset="0"/>
+                <a:cs typeface="Times New Roman" panose="02020603050405020304" pitchFamily="18" charset="0"/>
+              </a:rPr>
+              <a:t> </a:t>
+            </a:r>
+            <a:r>
+              <a:rPr lang="en-US" dirty="0" err="1">
+                <a:latin typeface="Times New Roman" panose="02020603050405020304" pitchFamily="18" charset="0"/>
+                <a:cs typeface="Times New Roman" panose="02020603050405020304" pitchFamily="18" charset="0"/>
+              </a:rPr>
+              <a:t>từ</a:t>
+            </a:r>
+            <a:r>
+              <a:rPr lang="en-US" dirty="0">
+                <a:latin typeface="Times New Roman" panose="02020603050405020304" pitchFamily="18" charset="0"/>
+                <a:cs typeface="Times New Roman" panose="02020603050405020304" pitchFamily="18" charset="0"/>
+              </a:rPr>
+              <a:t>:</a:t>
+            </a:r>
+          </a:p>
+          <a:p>
+            <a:pPr marL="0" indent="0">
+              <a:buNone/>
+            </a:pPr>
             <a:endParaRPr lang="en-US" dirty="0">
               <a:latin typeface="Times New Roman" panose="02020603050405020304" pitchFamily="18" charset="0"/>
               <a:cs typeface="Times New Roman" panose="02020603050405020304" pitchFamily="18" charset="0"/>
@@ -11423,470 +11630,10 @@
             <a:pPr marL="0" indent="0">
               <a:buNone/>
             </a:pPr>
-            <a:r>
-              <a:rPr lang="en-US" dirty="0">
-                <a:latin typeface="Times New Roman" panose="02020603050405020304" pitchFamily="18" charset="0"/>
-                <a:cs typeface="Times New Roman" panose="02020603050405020304" pitchFamily="18" charset="0"/>
-              </a:rPr>
-              <a:t>	</a:t>
-            </a:r>
-            <a:r>
-              <a:rPr lang="en-US" dirty="0" err="1">
-                <a:latin typeface="Times New Roman" panose="02020603050405020304" pitchFamily="18" charset="0"/>
-                <a:cs typeface="Times New Roman" panose="02020603050405020304" pitchFamily="18" charset="0"/>
-              </a:rPr>
-              <a:t>Ví</a:t>
-            </a:r>
-            <a:r>
-              <a:rPr lang="en-US" dirty="0">
-                <a:latin typeface="Times New Roman" panose="02020603050405020304" pitchFamily="18" charset="0"/>
-                <a:cs typeface="Times New Roman" panose="02020603050405020304" pitchFamily="18" charset="0"/>
-              </a:rPr>
-              <a:t> </a:t>
-            </a:r>
-            <a:r>
-              <a:rPr lang="en-US" dirty="0" err="1">
-                <a:latin typeface="Times New Roman" panose="02020603050405020304" pitchFamily="18" charset="0"/>
-                <a:cs typeface="Times New Roman" panose="02020603050405020304" pitchFamily="18" charset="0"/>
-              </a:rPr>
-              <a:t>dụ</a:t>
-            </a:r>
-            <a:r>
-              <a:rPr lang="en-US" dirty="0">
-                <a:latin typeface="Times New Roman" panose="02020603050405020304" pitchFamily="18" charset="0"/>
-                <a:cs typeface="Times New Roman" panose="02020603050405020304" pitchFamily="18" charset="0"/>
-              </a:rPr>
-              <a:t>: </a:t>
-            </a:r>
-            <a:r>
-              <a:rPr lang="en-US" dirty="0" err="1">
-                <a:latin typeface="Times New Roman" panose="02020603050405020304" pitchFamily="18" charset="0"/>
-                <a:cs typeface="Times New Roman" panose="02020603050405020304" pitchFamily="18" charset="0"/>
-              </a:rPr>
-              <a:t>Tiếng</a:t>
-            </a:r>
-            <a:r>
-              <a:rPr lang="en-US" dirty="0">
-                <a:latin typeface="Times New Roman" panose="02020603050405020304" pitchFamily="18" charset="0"/>
-                <a:cs typeface="Times New Roman" panose="02020603050405020304" pitchFamily="18" charset="0"/>
-              </a:rPr>
-              <a:t> Anh: where is the manager?</a:t>
-            </a:r>
-          </a:p>
-          <a:p>
-            <a:pPr marL="0" indent="0">
-              <a:buNone/>
-            </a:pPr>
-            <a:r>
-              <a:rPr lang="en-US" dirty="0">
-                <a:latin typeface="Times New Roman" panose="02020603050405020304" pitchFamily="18" charset="0"/>
-                <a:cs typeface="Times New Roman" panose="02020603050405020304" pitchFamily="18" charset="0"/>
-              </a:rPr>
-              <a:t>			</a:t>
-            </a:r>
-            <a:r>
-              <a:rPr lang="en-US" dirty="0" err="1">
-                <a:latin typeface="Times New Roman" panose="02020603050405020304" pitchFamily="18" charset="0"/>
-                <a:cs typeface="Times New Roman" panose="02020603050405020304" pitchFamily="18" charset="0"/>
-              </a:rPr>
-              <a:t>Tiếng</a:t>
-            </a:r>
-            <a:r>
-              <a:rPr lang="en-US" dirty="0">
-                <a:latin typeface="Times New Roman" panose="02020603050405020304" pitchFamily="18" charset="0"/>
-                <a:cs typeface="Times New Roman" panose="02020603050405020304" pitchFamily="18" charset="0"/>
-              </a:rPr>
-              <a:t> Ả </a:t>
-            </a:r>
-            <a:r>
-              <a:rPr lang="en-US" dirty="0" err="1">
-                <a:latin typeface="Times New Roman" panose="02020603050405020304" pitchFamily="18" charset="0"/>
-                <a:cs typeface="Times New Roman" panose="02020603050405020304" pitchFamily="18" charset="0"/>
-              </a:rPr>
-              <a:t>Rập</a:t>
-            </a:r>
-            <a:r>
-              <a:rPr lang="en-US" dirty="0">
-                <a:latin typeface="Times New Roman" panose="02020603050405020304" pitchFamily="18" charset="0"/>
-                <a:cs typeface="Times New Roman" panose="02020603050405020304" pitchFamily="18" charset="0"/>
-              </a:rPr>
-              <a:t>: </a:t>
-            </a:r>
-            <a:r>
-              <a:rPr lang="ar-AE" dirty="0"/>
-              <a:t>أين المدير؟</a:t>
-            </a:r>
             <a:endParaRPr lang="en-US" dirty="0">
               <a:latin typeface="Times New Roman" panose="02020603050405020304" pitchFamily="18" charset="0"/>
               <a:cs typeface="Times New Roman" panose="02020603050405020304" pitchFamily="18" charset="0"/>
             </a:endParaRPr>
-          </a:p>
-          <a:p>
-            <a:r>
-              <a:rPr lang="en-US" dirty="0" err="1">
-                <a:latin typeface="Times New Roman" panose="02020603050405020304" pitchFamily="18" charset="0"/>
-                <a:cs typeface="Times New Roman" panose="02020603050405020304" pitchFamily="18" charset="0"/>
-              </a:rPr>
-              <a:t>Trong</a:t>
-            </a:r>
-            <a:r>
-              <a:rPr lang="en-US" dirty="0">
-                <a:latin typeface="Times New Roman" panose="02020603050405020304" pitchFamily="18" charset="0"/>
-                <a:cs typeface="Times New Roman" panose="02020603050405020304" pitchFamily="18" charset="0"/>
-              </a:rPr>
-              <a:t> </a:t>
-            </a:r>
-            <a:r>
-              <a:rPr lang="en-US" dirty="0" err="1">
-                <a:latin typeface="Times New Roman" panose="02020603050405020304" pitchFamily="18" charset="0"/>
-                <a:cs typeface="Times New Roman" panose="02020603050405020304" pitchFamily="18" charset="0"/>
-              </a:rPr>
-              <a:t>tiếng</a:t>
-            </a:r>
-            <a:r>
-              <a:rPr lang="en-US" dirty="0">
-                <a:latin typeface="Times New Roman" panose="02020603050405020304" pitchFamily="18" charset="0"/>
-                <a:cs typeface="Times New Roman" panose="02020603050405020304" pitchFamily="18" charset="0"/>
-              </a:rPr>
-              <a:t> Anh, </a:t>
-            </a:r>
-            <a:r>
-              <a:rPr lang="en-US" dirty="0" err="1">
-                <a:latin typeface="Times New Roman" panose="02020603050405020304" pitchFamily="18" charset="0"/>
-                <a:cs typeface="Times New Roman" panose="02020603050405020304" pitchFamily="18" charset="0"/>
-              </a:rPr>
-              <a:t>đôi</a:t>
-            </a:r>
-            <a:r>
-              <a:rPr lang="en-US" dirty="0">
-                <a:latin typeface="Times New Roman" panose="02020603050405020304" pitchFamily="18" charset="0"/>
-                <a:cs typeface="Times New Roman" panose="02020603050405020304" pitchFamily="18" charset="0"/>
-              </a:rPr>
-              <a:t> </a:t>
-            </a:r>
-            <a:r>
-              <a:rPr lang="en-US" dirty="0" err="1">
-                <a:latin typeface="Times New Roman" panose="02020603050405020304" pitchFamily="18" charset="0"/>
-                <a:cs typeface="Times New Roman" panose="02020603050405020304" pitchFamily="18" charset="0"/>
-              </a:rPr>
-              <a:t>khi</a:t>
-            </a:r>
-            <a:r>
-              <a:rPr lang="en-US" dirty="0">
-                <a:latin typeface="Times New Roman" panose="02020603050405020304" pitchFamily="18" charset="0"/>
-                <a:cs typeface="Times New Roman" panose="02020603050405020304" pitchFamily="18" charset="0"/>
-              </a:rPr>
-              <a:t> </a:t>
-            </a:r>
-            <a:r>
-              <a:rPr lang="en-US" dirty="0" err="1">
-                <a:latin typeface="Times New Roman" panose="02020603050405020304" pitchFamily="18" charset="0"/>
-                <a:cs typeface="Times New Roman" panose="02020603050405020304" pitchFamily="18" charset="0"/>
-              </a:rPr>
-              <a:t>dấu</a:t>
-            </a:r>
-            <a:r>
-              <a:rPr lang="en-US" dirty="0">
-                <a:latin typeface="Times New Roman" panose="02020603050405020304" pitchFamily="18" charset="0"/>
-                <a:cs typeface="Times New Roman" panose="02020603050405020304" pitchFamily="18" charset="0"/>
-              </a:rPr>
-              <a:t> </a:t>
-            </a:r>
-            <a:r>
-              <a:rPr lang="en-US" dirty="0" err="1">
-                <a:latin typeface="Times New Roman" panose="02020603050405020304" pitchFamily="18" charset="0"/>
-                <a:cs typeface="Times New Roman" panose="02020603050405020304" pitchFamily="18" charset="0"/>
-              </a:rPr>
-              <a:t>chấm</a:t>
-            </a:r>
-            <a:r>
-              <a:rPr lang="en-US" dirty="0">
-                <a:latin typeface="Times New Roman" panose="02020603050405020304" pitchFamily="18" charset="0"/>
-                <a:cs typeface="Times New Roman" panose="02020603050405020304" pitchFamily="18" charset="0"/>
-              </a:rPr>
-              <a:t> đ</a:t>
-            </a:r>
-            <a:r>
-              <a:rPr lang="vi-VN" dirty="0">
-                <a:latin typeface="Times New Roman" panose="02020603050405020304" pitchFamily="18" charset="0"/>
-                <a:cs typeface="Times New Roman" panose="02020603050405020304" pitchFamily="18" charset="0"/>
-              </a:rPr>
-              <a:t>ư</a:t>
-            </a:r>
-            <a:r>
-              <a:rPr lang="en-US" dirty="0" err="1">
-                <a:latin typeface="Times New Roman" panose="02020603050405020304" pitchFamily="18" charset="0"/>
-                <a:cs typeface="Times New Roman" panose="02020603050405020304" pitchFamily="18" charset="0"/>
-              </a:rPr>
-              <a:t>ợc</a:t>
-            </a:r>
-            <a:r>
-              <a:rPr lang="en-US" dirty="0">
-                <a:latin typeface="Times New Roman" panose="02020603050405020304" pitchFamily="18" charset="0"/>
-                <a:cs typeface="Times New Roman" panose="02020603050405020304" pitchFamily="18" charset="0"/>
-              </a:rPr>
-              <a:t> </a:t>
-            </a:r>
-            <a:r>
-              <a:rPr lang="en-US" dirty="0" err="1">
-                <a:latin typeface="Times New Roman" panose="02020603050405020304" pitchFamily="18" charset="0"/>
-                <a:cs typeface="Times New Roman" panose="02020603050405020304" pitchFamily="18" charset="0"/>
-              </a:rPr>
-              <a:t>sử</a:t>
-            </a:r>
-            <a:r>
-              <a:rPr lang="en-US" dirty="0">
-                <a:latin typeface="Times New Roman" panose="02020603050405020304" pitchFamily="18" charset="0"/>
-                <a:cs typeface="Times New Roman" panose="02020603050405020304" pitchFamily="18" charset="0"/>
-              </a:rPr>
-              <a:t> </a:t>
-            </a:r>
-            <a:r>
-              <a:rPr lang="en-US" dirty="0" err="1">
-                <a:latin typeface="Times New Roman" panose="02020603050405020304" pitchFamily="18" charset="0"/>
-                <a:cs typeface="Times New Roman" panose="02020603050405020304" pitchFamily="18" charset="0"/>
-              </a:rPr>
-              <a:t>dụng</a:t>
-            </a:r>
-            <a:r>
-              <a:rPr lang="en-US" dirty="0">
-                <a:latin typeface="Times New Roman" panose="02020603050405020304" pitchFamily="18" charset="0"/>
-                <a:cs typeface="Times New Roman" panose="02020603050405020304" pitchFamily="18" charset="0"/>
-              </a:rPr>
-              <a:t> </a:t>
-            </a:r>
-            <a:r>
-              <a:rPr lang="en-US" dirty="0" err="1">
-                <a:latin typeface="Times New Roman" panose="02020603050405020304" pitchFamily="18" charset="0"/>
-                <a:cs typeface="Times New Roman" panose="02020603050405020304" pitchFamily="18" charset="0"/>
-              </a:rPr>
-              <a:t>với</a:t>
-            </a:r>
-            <a:r>
-              <a:rPr lang="en-US" dirty="0">
-                <a:latin typeface="Times New Roman" panose="02020603050405020304" pitchFamily="18" charset="0"/>
-                <a:cs typeface="Times New Roman" panose="02020603050405020304" pitchFamily="18" charset="0"/>
-              </a:rPr>
-              <a:t> </a:t>
-            </a:r>
-            <a:r>
-              <a:rPr lang="en-US" dirty="0" err="1">
-                <a:latin typeface="Times New Roman" panose="02020603050405020304" pitchFamily="18" charset="0"/>
-                <a:cs typeface="Times New Roman" panose="02020603050405020304" pitchFamily="18" charset="0"/>
-              </a:rPr>
-              <a:t>mục</a:t>
-            </a:r>
-            <a:r>
-              <a:rPr lang="en-US" dirty="0">
-                <a:latin typeface="Times New Roman" panose="02020603050405020304" pitchFamily="18" charset="0"/>
-                <a:cs typeface="Times New Roman" panose="02020603050405020304" pitchFamily="18" charset="0"/>
-              </a:rPr>
-              <a:t> </a:t>
-            </a:r>
-            <a:r>
-              <a:rPr lang="en-US" dirty="0" err="1">
-                <a:latin typeface="Times New Roman" panose="02020603050405020304" pitchFamily="18" charset="0"/>
-                <a:cs typeface="Times New Roman" panose="02020603050405020304" pitchFamily="18" charset="0"/>
-              </a:rPr>
-              <a:t>đích</a:t>
-            </a:r>
-            <a:r>
-              <a:rPr lang="en-US" dirty="0">
-                <a:latin typeface="Times New Roman" panose="02020603050405020304" pitchFamily="18" charset="0"/>
-                <a:cs typeface="Times New Roman" panose="02020603050405020304" pitchFamily="18" charset="0"/>
-              </a:rPr>
-              <a:t> </a:t>
-            </a:r>
-            <a:r>
-              <a:rPr lang="en-US" dirty="0" err="1">
-                <a:latin typeface="Times New Roman" panose="02020603050405020304" pitchFamily="18" charset="0"/>
-                <a:cs typeface="Times New Roman" panose="02020603050405020304" pitchFamily="18" charset="0"/>
-              </a:rPr>
-              <a:t>khác</a:t>
-            </a:r>
-            <a:r>
-              <a:rPr lang="en-US" dirty="0">
-                <a:latin typeface="Times New Roman" panose="02020603050405020304" pitchFamily="18" charset="0"/>
-                <a:cs typeface="Times New Roman" panose="02020603050405020304" pitchFamily="18" charset="0"/>
-              </a:rPr>
-              <a:t> </a:t>
-            </a:r>
-            <a:r>
-              <a:rPr lang="en-US" dirty="0" err="1">
-                <a:latin typeface="Times New Roman" panose="02020603050405020304" pitchFamily="18" charset="0"/>
-                <a:cs typeface="Times New Roman" panose="02020603050405020304" pitchFamily="18" charset="0"/>
-              </a:rPr>
-              <a:t>như</a:t>
-            </a:r>
-            <a:r>
-              <a:rPr lang="en-US" dirty="0">
-                <a:latin typeface="Times New Roman" panose="02020603050405020304" pitchFamily="18" charset="0"/>
-                <a:cs typeface="Times New Roman" panose="02020603050405020304" pitchFamily="18" charset="0"/>
-              </a:rPr>
-              <a:t> </a:t>
-            </a:r>
-            <a:r>
-              <a:rPr lang="en-US" dirty="0" err="1">
-                <a:latin typeface="Times New Roman" panose="02020603050405020304" pitchFamily="18" charset="0"/>
-                <a:cs typeface="Times New Roman" panose="02020603050405020304" pitchFamily="18" charset="0"/>
-              </a:rPr>
-              <a:t>từ</a:t>
-            </a:r>
-            <a:r>
-              <a:rPr lang="en-US" dirty="0">
-                <a:latin typeface="Times New Roman" panose="02020603050405020304" pitchFamily="18" charset="0"/>
-                <a:cs typeface="Times New Roman" panose="02020603050405020304" pitchFamily="18" charset="0"/>
-              </a:rPr>
-              <a:t> </a:t>
-            </a:r>
-            <a:r>
-              <a:rPr lang="en-US" dirty="0" err="1">
-                <a:latin typeface="Times New Roman" panose="02020603050405020304" pitchFamily="18" charset="0"/>
-                <a:cs typeface="Times New Roman" panose="02020603050405020304" pitchFamily="18" charset="0"/>
-              </a:rPr>
-              <a:t>viết</a:t>
-            </a:r>
-            <a:r>
-              <a:rPr lang="en-US" dirty="0">
-                <a:latin typeface="Times New Roman" panose="02020603050405020304" pitchFamily="18" charset="0"/>
-                <a:cs typeface="Times New Roman" panose="02020603050405020304" pitchFamily="18" charset="0"/>
-              </a:rPr>
-              <a:t> </a:t>
-            </a:r>
-            <a:r>
-              <a:rPr lang="en-US" dirty="0" err="1">
-                <a:latin typeface="Times New Roman" panose="02020603050405020304" pitchFamily="18" charset="0"/>
-                <a:cs typeface="Times New Roman" panose="02020603050405020304" pitchFamily="18" charset="0"/>
-              </a:rPr>
-              <a:t>tắt</a:t>
-            </a:r>
-            <a:r>
-              <a:rPr lang="en-US" dirty="0">
-                <a:latin typeface="Times New Roman" panose="02020603050405020304" pitchFamily="18" charset="0"/>
-                <a:cs typeface="Times New Roman" panose="02020603050405020304" pitchFamily="18" charset="0"/>
-              </a:rPr>
-              <a:t>, </a:t>
-            </a:r>
-            <a:r>
-              <a:rPr lang="en-US" dirty="0" err="1">
-                <a:latin typeface="Times New Roman" panose="02020603050405020304" pitchFamily="18" charset="0"/>
-                <a:cs typeface="Times New Roman" panose="02020603050405020304" pitchFamily="18" charset="0"/>
-              </a:rPr>
-              <a:t>số</a:t>
-            </a:r>
-            <a:r>
-              <a:rPr lang="en-US" dirty="0">
-                <a:latin typeface="Times New Roman" panose="02020603050405020304" pitchFamily="18" charset="0"/>
-                <a:cs typeface="Times New Roman" panose="02020603050405020304" pitchFamily="18" charset="0"/>
-              </a:rPr>
-              <a:t> </a:t>
-            </a:r>
-            <a:r>
-              <a:rPr lang="en-US" dirty="0" err="1">
-                <a:latin typeface="Times New Roman" panose="02020603050405020304" pitchFamily="18" charset="0"/>
-                <a:cs typeface="Times New Roman" panose="02020603050405020304" pitchFamily="18" charset="0"/>
-              </a:rPr>
-              <a:t>phẩy</a:t>
-            </a:r>
-            <a:r>
-              <a:rPr lang="en-US" dirty="0">
-                <a:latin typeface="Times New Roman" panose="02020603050405020304" pitchFamily="18" charset="0"/>
-                <a:cs typeface="Times New Roman" panose="02020603050405020304" pitchFamily="18" charset="0"/>
-              </a:rPr>
-              <a:t>… </a:t>
-            </a:r>
-            <a:r>
-              <a:rPr lang="en-US" dirty="0">
-                <a:latin typeface="Times New Roman" panose="02020603050405020304" pitchFamily="18" charset="0"/>
-                <a:cs typeface="Times New Roman" panose="02020603050405020304" pitchFamily="18" charset="0"/>
-                <a:sym typeface="Wingdings" panose="05000000000000000000" pitchFamily="2" charset="2"/>
-              </a:rPr>
-              <a:t> </a:t>
-            </a:r>
-            <a:r>
-              <a:rPr lang="en-US" dirty="0" err="1">
-                <a:latin typeface="Times New Roman" panose="02020603050405020304" pitchFamily="18" charset="0"/>
-                <a:cs typeface="Times New Roman" panose="02020603050405020304" pitchFamily="18" charset="0"/>
-                <a:sym typeface="Wingdings" panose="05000000000000000000" pitchFamily="2" charset="2"/>
-              </a:rPr>
-              <a:t>Khó</a:t>
-            </a:r>
-            <a:r>
-              <a:rPr lang="en-US" dirty="0">
-                <a:latin typeface="Times New Roman" panose="02020603050405020304" pitchFamily="18" charset="0"/>
-                <a:cs typeface="Times New Roman" panose="02020603050405020304" pitchFamily="18" charset="0"/>
-                <a:sym typeface="Wingdings" panose="05000000000000000000" pitchFamily="2" charset="2"/>
-              </a:rPr>
-              <a:t> </a:t>
-            </a:r>
-            <a:r>
-              <a:rPr lang="en-US" dirty="0" err="1">
-                <a:latin typeface="Times New Roman" panose="02020603050405020304" pitchFamily="18" charset="0"/>
-                <a:cs typeface="Times New Roman" panose="02020603050405020304" pitchFamily="18" charset="0"/>
-                <a:sym typeface="Wingdings" panose="05000000000000000000" pitchFamily="2" charset="2"/>
-              </a:rPr>
-              <a:t>khăn</a:t>
-            </a:r>
-            <a:r>
-              <a:rPr lang="en-US" dirty="0">
-                <a:latin typeface="Times New Roman" panose="02020603050405020304" pitchFamily="18" charset="0"/>
-                <a:cs typeface="Times New Roman" panose="02020603050405020304" pitchFamily="18" charset="0"/>
-                <a:sym typeface="Wingdings" panose="05000000000000000000" pitchFamily="2" charset="2"/>
-              </a:rPr>
-              <a:t> sentence segmentation</a:t>
-            </a:r>
-          </a:p>
-          <a:p>
-            <a:pPr marL="0" indent="0">
-              <a:buNone/>
-            </a:pPr>
-            <a:r>
-              <a:rPr lang="en-US" dirty="0">
-                <a:latin typeface="Times New Roman" panose="02020603050405020304" pitchFamily="18" charset="0"/>
-                <a:cs typeface="Times New Roman" panose="02020603050405020304" pitchFamily="18" charset="0"/>
-                <a:sym typeface="Wingdings" panose="05000000000000000000" pitchFamily="2" charset="2"/>
-              </a:rPr>
-              <a:t>			</a:t>
-            </a:r>
-            <a:r>
-              <a:rPr lang="en-US" dirty="0" err="1">
-                <a:latin typeface="Times New Roman" panose="02020603050405020304" pitchFamily="18" charset="0"/>
-                <a:cs typeface="Times New Roman" panose="02020603050405020304" pitchFamily="18" charset="0"/>
-                <a:sym typeface="Wingdings" panose="05000000000000000000" pitchFamily="2" charset="2"/>
-              </a:rPr>
-              <a:t>Ví</a:t>
-            </a:r>
-            <a:r>
-              <a:rPr lang="en-US" dirty="0">
-                <a:latin typeface="Times New Roman" panose="02020603050405020304" pitchFamily="18" charset="0"/>
-                <a:cs typeface="Times New Roman" panose="02020603050405020304" pitchFamily="18" charset="0"/>
-                <a:sym typeface="Wingdings" panose="05000000000000000000" pitchFamily="2" charset="2"/>
-              </a:rPr>
-              <a:t> </a:t>
-            </a:r>
-            <a:r>
-              <a:rPr lang="en-US" dirty="0" err="1">
-                <a:latin typeface="Times New Roman" panose="02020603050405020304" pitchFamily="18" charset="0"/>
-                <a:cs typeface="Times New Roman" panose="02020603050405020304" pitchFamily="18" charset="0"/>
-                <a:sym typeface="Wingdings" panose="05000000000000000000" pitchFamily="2" charset="2"/>
-              </a:rPr>
-              <a:t>dụ</a:t>
-            </a:r>
-            <a:r>
-              <a:rPr lang="en-US" dirty="0">
-                <a:latin typeface="Times New Roman" panose="02020603050405020304" pitchFamily="18" charset="0"/>
-                <a:cs typeface="Times New Roman" panose="02020603050405020304" pitchFamily="18" charset="0"/>
-                <a:sym typeface="Wingdings" panose="05000000000000000000" pitchFamily="2" charset="2"/>
-              </a:rPr>
-              <a:t>: Mr. Lam	HVN Corp.	1.2</a:t>
-            </a:r>
-            <a:endParaRPr lang="en-US" dirty="0">
-              <a:latin typeface="Times New Roman" panose="02020603050405020304" pitchFamily="18" charset="0"/>
-              <a:cs typeface="Times New Roman" panose="02020603050405020304" pitchFamily="18" charset="0"/>
-            </a:endParaRPr>
-          </a:p>
-          <a:p>
-            <a:endParaRPr lang="en-US" dirty="0"/>
           </a:p>
         </p:txBody>
       </p:sp>
@@ -11895,7 +11642,7 @@
           <p:cNvPr id="4" name="Title 1">
             <a:extLst>
               <a:ext uri="{FF2B5EF4-FFF2-40B4-BE49-F238E27FC236}">
-                <a16:creationId xmlns:a16="http://schemas.microsoft.com/office/drawing/2014/main" id="{01A58B5A-1ACB-486F-A6E0-8F446AC6748B}"/>
+                <a16:creationId xmlns:a16="http://schemas.microsoft.com/office/drawing/2014/main" id="{37FD9831-7629-4B16-9A02-900B2E49212C}"/>
               </a:ext>
             </a:extLst>
           </p:cNvPr>
@@ -11909,7 +11656,7 @@
         <p:spPr>
           <a:xfrm>
             <a:off x="1484311" y="685800"/>
-            <a:ext cx="10018713" cy="1752599"/>
+            <a:ext cx="10018713" cy="1094761"/>
           </a:xfrm>
         </p:spPr>
         <p:txBody>
@@ -11925,15 +11672,112 @@
                 <a:latin typeface="Times New Roman" panose="02020603050405020304" pitchFamily="18" charset="0"/>
                 <a:cs typeface="Times New Roman" panose="02020603050405020304" pitchFamily="18" charset="0"/>
               </a:rPr>
-              <a:t>Tokenization/ Sentence Segmentation</a:t>
-            </a:r>
+              <a:t>Tokenizer </a:t>
+            </a:r>
+            <a:r>
+              <a:rPr lang="en-US" b="1" dirty="0" err="1">
+                <a:solidFill>
+                  <a:srgbClr val="0000FF"/>
+                </a:solidFill>
+                <a:latin typeface="Times New Roman" panose="02020603050405020304" pitchFamily="18" charset="0"/>
+                <a:cs typeface="Times New Roman" panose="02020603050405020304" pitchFamily="18" charset="0"/>
+              </a:rPr>
+              <a:t>trong</a:t>
+            </a:r>
+            <a:r>
+              <a:rPr lang="en-US" b="1" dirty="0">
+                <a:solidFill>
+                  <a:srgbClr val="0000FF"/>
+                </a:solidFill>
+                <a:latin typeface="Times New Roman" panose="02020603050405020304" pitchFamily="18" charset="0"/>
+                <a:cs typeface="Times New Roman" panose="02020603050405020304" pitchFamily="18" charset="0"/>
+              </a:rPr>
+              <a:t> Stanford </a:t>
+            </a:r>
+            <a:r>
+              <a:rPr lang="en-US" b="1" dirty="0" err="1">
+                <a:solidFill>
+                  <a:srgbClr val="0000FF"/>
+                </a:solidFill>
+                <a:latin typeface="Times New Roman" panose="02020603050405020304" pitchFamily="18" charset="0"/>
+                <a:cs typeface="Times New Roman" panose="02020603050405020304" pitchFamily="18" charset="0"/>
+              </a:rPr>
+              <a:t>CoreNLP</a:t>
+            </a:r>
+            <a:endParaRPr lang="en-US" b="1" dirty="0">
+              <a:solidFill>
+                <a:srgbClr val="0000FF"/>
+              </a:solidFill>
+              <a:latin typeface="Times New Roman" panose="02020603050405020304" pitchFamily="18" charset="0"/>
+              <a:cs typeface="Times New Roman" panose="02020603050405020304" pitchFamily="18" charset="0"/>
+            </a:endParaRPr>
           </a:p>
         </p:txBody>
       </p:sp>
+      <p:pic>
+        <p:nvPicPr>
+          <p:cNvPr id="6" name="Picture 5">
+            <a:extLst>
+              <a:ext uri="{FF2B5EF4-FFF2-40B4-BE49-F238E27FC236}">
+                <a16:creationId xmlns:a16="http://schemas.microsoft.com/office/drawing/2014/main" id="{AD36B0C7-F61A-43EF-AB1A-3AB1387AB815}"/>
+              </a:ext>
+            </a:extLst>
+          </p:cNvPr>
+          <p:cNvPicPr>
+            <a:picLocks noChangeAspect="1"/>
+          </p:cNvPicPr>
+          <p:nvPr/>
+        </p:nvPicPr>
+        <p:blipFill>
+          <a:blip r:embed="rId2"/>
+          <a:stretch>
+            <a:fillRect/>
+          </a:stretch>
+        </p:blipFill>
+        <p:spPr>
+          <a:xfrm>
+            <a:off x="1785529" y="5007594"/>
+            <a:ext cx="10149490" cy="417331"/>
+          </a:xfrm>
+          <a:prstGeom prst="rect">
+            <a:avLst/>
+          </a:prstGeom>
+        </p:spPr>
+      </p:pic>
+      <p:pic>
+        <p:nvPicPr>
+          <p:cNvPr id="7" name="Picture 6">
+            <a:extLst>
+              <a:ext uri="{FF2B5EF4-FFF2-40B4-BE49-F238E27FC236}">
+                <a16:creationId xmlns:a16="http://schemas.microsoft.com/office/drawing/2014/main" id="{665C67BF-F6C8-4869-916A-359C99F723FD}"/>
+              </a:ext>
+            </a:extLst>
+          </p:cNvPr>
+          <p:cNvPicPr>
+            <a:picLocks noChangeAspect="1"/>
+          </p:cNvPicPr>
+          <p:nvPr/>
+        </p:nvPicPr>
+        <p:blipFill>
+          <a:blip r:embed="rId3"/>
+          <a:stretch>
+            <a:fillRect/>
+          </a:stretch>
+        </p:blipFill>
+        <p:spPr>
+          <a:xfrm>
+            <a:off x="1785529" y="3985800"/>
+            <a:ext cx="5178281" cy="486048"/>
+          </a:xfrm>
+          <a:prstGeom prst="rect">
+            <a:avLst/>
+          </a:prstGeom>
+        </p:spPr>
+      </p:pic>
     </p:spTree>
     <p:extLst>
       <p:ext uri="{BB962C8B-B14F-4D97-AF65-F5344CB8AC3E}">
-        <p14:creationId xmlns:p14="http://schemas.microsoft.com/office/powerpoint/2010/main" val="1734089245"/>
+        <p14:creationId xmlns:p14="http://schemas.microsoft.com/office/powerpoint/2010/main" val="2676974974"/>
       </p:ext>
     </p:extLst>
   </p:cSld>
@@ -11944,6 +11788,368 @@
 </file>
 
 <file path=ppt/slides/slide12.xml><?xml version="1.0" encoding="utf-8"?>
+<p:sld xmlns:a="http://schemas.openxmlformats.org/drawingml/2006/main" xmlns:r="http://schemas.openxmlformats.org/officeDocument/2006/relationships" xmlns:p="http://schemas.openxmlformats.org/presentationml/2006/main">
+  <p:cSld>
+    <p:spTree>
+      <p:nvGrpSpPr>
+        <p:cNvPr id="1" name=""/>
+        <p:cNvGrpSpPr/>
+        <p:nvPr/>
+      </p:nvGrpSpPr>
+      <p:grpSpPr>
+        <a:xfrm>
+          <a:off x="0" y="0"/>
+          <a:ext cx="0" cy="0"/>
+          <a:chOff x="0" y="0"/>
+          <a:chExt cx="0" cy="0"/>
+        </a:xfrm>
+      </p:grpSpPr>
+      <p:sp>
+        <p:nvSpPr>
+          <p:cNvPr id="3" name="Content Placeholder 2">
+            <a:extLst>
+              <a:ext uri="{FF2B5EF4-FFF2-40B4-BE49-F238E27FC236}">
+                <a16:creationId xmlns:a16="http://schemas.microsoft.com/office/drawing/2014/main" id="{5C85A5BA-7BED-4930-8B2C-A643527BD467}"/>
+              </a:ext>
+            </a:extLst>
+          </p:cNvPr>
+          <p:cNvSpPr>
+            <a:spLocks noGrp="1"/>
+          </p:cNvSpPr>
+          <p:nvPr>
+            <p:ph idx="1"/>
+          </p:nvPr>
+        </p:nvSpPr>
+        <p:spPr/>
+        <p:txBody>
+          <a:bodyPr>
+            <a:noAutofit/>
+          </a:bodyPr>
+          <a:lstStyle/>
+          <a:p>
+            <a:pPr marL="0" indent="0">
+              <a:buNone/>
+            </a:pPr>
+            <a:endParaRPr lang="en-US" dirty="0">
+              <a:latin typeface="Times New Roman" panose="02020603050405020304" pitchFamily="18" charset="0"/>
+              <a:cs typeface="Times New Roman" panose="02020603050405020304" pitchFamily="18" charset="0"/>
+            </a:endParaRPr>
+          </a:p>
+          <a:p>
+            <a:r>
+              <a:rPr lang="en-US" dirty="0">
+                <a:latin typeface="Times New Roman" panose="02020603050405020304" pitchFamily="18" charset="0"/>
+                <a:cs typeface="Times New Roman" panose="02020603050405020304" pitchFamily="18" charset="0"/>
+              </a:rPr>
+              <a:t>In </a:t>
+            </a:r>
+            <a:r>
+              <a:rPr lang="en-US" dirty="0" err="1">
+                <a:latin typeface="Times New Roman" panose="02020603050405020304" pitchFamily="18" charset="0"/>
+                <a:cs typeface="Times New Roman" panose="02020603050405020304" pitchFamily="18" charset="0"/>
+              </a:rPr>
+              <a:t>kết</a:t>
+            </a:r>
+            <a:r>
+              <a:rPr lang="en-US" dirty="0">
+                <a:latin typeface="Times New Roman" panose="02020603050405020304" pitchFamily="18" charset="0"/>
+                <a:cs typeface="Times New Roman" panose="02020603050405020304" pitchFamily="18" charset="0"/>
+              </a:rPr>
+              <a:t> </a:t>
+            </a:r>
+            <a:r>
+              <a:rPr lang="en-US" dirty="0" err="1">
+                <a:latin typeface="Times New Roman" panose="02020603050405020304" pitchFamily="18" charset="0"/>
+                <a:cs typeface="Times New Roman" panose="02020603050405020304" pitchFamily="18" charset="0"/>
+              </a:rPr>
+              <a:t>quả</a:t>
+            </a:r>
+            <a:r>
+              <a:rPr lang="en-US" dirty="0">
+                <a:latin typeface="Times New Roman" panose="02020603050405020304" pitchFamily="18" charset="0"/>
+                <a:cs typeface="Times New Roman" panose="02020603050405020304" pitchFamily="18" charset="0"/>
+              </a:rPr>
+              <a:t> </a:t>
+            </a:r>
+            <a:r>
+              <a:rPr lang="en-US" dirty="0" err="1">
+                <a:latin typeface="Times New Roman" panose="02020603050405020304" pitchFamily="18" charset="0"/>
+                <a:cs typeface="Times New Roman" panose="02020603050405020304" pitchFamily="18" charset="0"/>
+              </a:rPr>
+              <a:t>ra</a:t>
+            </a:r>
+            <a:r>
+              <a:rPr lang="en-US" dirty="0">
+                <a:latin typeface="Times New Roman" panose="02020603050405020304" pitchFamily="18" charset="0"/>
+                <a:cs typeface="Times New Roman" panose="02020603050405020304" pitchFamily="18" charset="0"/>
+              </a:rPr>
+              <a:t> </a:t>
+            </a:r>
+            <a:r>
+              <a:rPr lang="en-US" dirty="0" err="1">
+                <a:latin typeface="Times New Roman" panose="02020603050405020304" pitchFamily="18" charset="0"/>
+                <a:cs typeface="Times New Roman" panose="02020603050405020304" pitchFamily="18" charset="0"/>
+              </a:rPr>
+              <a:t>màn</a:t>
+            </a:r>
+            <a:r>
+              <a:rPr lang="en-US" dirty="0">
+                <a:latin typeface="Times New Roman" panose="02020603050405020304" pitchFamily="18" charset="0"/>
+                <a:cs typeface="Times New Roman" panose="02020603050405020304" pitchFamily="18" charset="0"/>
+              </a:rPr>
+              <a:t> </a:t>
+            </a:r>
+            <a:r>
+              <a:rPr lang="en-US" dirty="0" err="1">
+                <a:latin typeface="Times New Roman" panose="02020603050405020304" pitchFamily="18" charset="0"/>
+                <a:cs typeface="Times New Roman" panose="02020603050405020304" pitchFamily="18" charset="0"/>
+              </a:rPr>
+              <a:t>hình</a:t>
+            </a:r>
+            <a:r>
+              <a:rPr lang="en-US" dirty="0">
+                <a:latin typeface="Times New Roman" panose="02020603050405020304" pitchFamily="18" charset="0"/>
+                <a:cs typeface="Times New Roman" panose="02020603050405020304" pitchFamily="18" charset="0"/>
+              </a:rPr>
+              <a:t>:</a:t>
+            </a:r>
+          </a:p>
+          <a:p>
+            <a:endParaRPr lang="en-US" dirty="0">
+              <a:latin typeface="Times New Roman" panose="02020603050405020304" pitchFamily="18" charset="0"/>
+              <a:cs typeface="Times New Roman" panose="02020603050405020304" pitchFamily="18" charset="0"/>
+            </a:endParaRPr>
+          </a:p>
+          <a:p>
+            <a:endParaRPr lang="en-US" dirty="0">
+              <a:latin typeface="Times New Roman" panose="02020603050405020304" pitchFamily="18" charset="0"/>
+              <a:cs typeface="Times New Roman" panose="02020603050405020304" pitchFamily="18" charset="0"/>
+            </a:endParaRPr>
+          </a:p>
+          <a:p>
+            <a:r>
+              <a:rPr lang="en-US" dirty="0" err="1">
+                <a:latin typeface="Times New Roman" panose="02020603050405020304" pitchFamily="18" charset="0"/>
+                <a:cs typeface="Times New Roman" panose="02020603050405020304" pitchFamily="18" charset="0"/>
+              </a:rPr>
+              <a:t>Ví</a:t>
+            </a:r>
+            <a:r>
+              <a:rPr lang="en-US" dirty="0">
+                <a:latin typeface="Times New Roman" panose="02020603050405020304" pitchFamily="18" charset="0"/>
+                <a:cs typeface="Times New Roman" panose="02020603050405020304" pitchFamily="18" charset="0"/>
+              </a:rPr>
+              <a:t> </a:t>
+            </a:r>
+            <a:r>
+              <a:rPr lang="en-US" dirty="0" err="1">
+                <a:latin typeface="Times New Roman" panose="02020603050405020304" pitchFamily="18" charset="0"/>
+                <a:cs typeface="Times New Roman" panose="02020603050405020304" pitchFamily="18" charset="0"/>
+              </a:rPr>
+              <a:t>dụ</a:t>
+            </a:r>
+            <a:r>
+              <a:rPr lang="en-US" dirty="0">
+                <a:latin typeface="Times New Roman" panose="02020603050405020304" pitchFamily="18" charset="0"/>
+                <a:cs typeface="Times New Roman" panose="02020603050405020304" pitchFamily="18" charset="0"/>
+              </a:rPr>
+              <a:t>:</a:t>
+            </a:r>
+          </a:p>
+          <a:p>
+            <a:pPr lvl="1"/>
+            <a:r>
+              <a:rPr lang="en-US" dirty="0">
+                <a:latin typeface="Times New Roman" panose="02020603050405020304" pitchFamily="18" charset="0"/>
+                <a:cs typeface="Times New Roman" panose="02020603050405020304" pitchFamily="18" charset="0"/>
+              </a:rPr>
+              <a:t>Input: She is a very nice person</a:t>
+            </a:r>
+          </a:p>
+          <a:p>
+            <a:pPr lvl="1"/>
+            <a:r>
+              <a:rPr lang="en-US" dirty="0">
+                <a:latin typeface="Times New Roman" panose="02020603050405020304" pitchFamily="18" charset="0"/>
+                <a:cs typeface="Times New Roman" panose="02020603050405020304" pitchFamily="18" charset="0"/>
+              </a:rPr>
+              <a:t>Output: </a:t>
+            </a:r>
+          </a:p>
+          <a:p>
+            <a:endParaRPr lang="en-US" dirty="0">
+              <a:latin typeface="Times New Roman" panose="02020603050405020304" pitchFamily="18" charset="0"/>
+              <a:cs typeface="Times New Roman" panose="02020603050405020304" pitchFamily="18" charset="0"/>
+            </a:endParaRPr>
+          </a:p>
+          <a:p>
+            <a:endParaRPr lang="en-US" dirty="0">
+              <a:latin typeface="Times New Roman" panose="02020603050405020304" pitchFamily="18" charset="0"/>
+              <a:cs typeface="Times New Roman" panose="02020603050405020304" pitchFamily="18" charset="0"/>
+            </a:endParaRPr>
+          </a:p>
+          <a:p>
+            <a:pPr marL="0" indent="0">
+              <a:buNone/>
+            </a:pPr>
+            <a:endParaRPr lang="en-US" dirty="0">
+              <a:latin typeface="Times New Roman" panose="02020603050405020304" pitchFamily="18" charset="0"/>
+              <a:cs typeface="Times New Roman" panose="02020603050405020304" pitchFamily="18" charset="0"/>
+            </a:endParaRPr>
+          </a:p>
+        </p:txBody>
+      </p:sp>
+      <p:sp>
+        <p:nvSpPr>
+          <p:cNvPr id="4" name="Title 1">
+            <a:extLst>
+              <a:ext uri="{FF2B5EF4-FFF2-40B4-BE49-F238E27FC236}">
+                <a16:creationId xmlns:a16="http://schemas.microsoft.com/office/drawing/2014/main" id="{37FD9831-7629-4B16-9A02-900B2E49212C}"/>
+              </a:ext>
+            </a:extLst>
+          </p:cNvPr>
+          <p:cNvSpPr>
+            <a:spLocks noGrp="1"/>
+          </p:cNvSpPr>
+          <p:nvPr>
+            <p:ph type="title"/>
+          </p:nvPr>
+        </p:nvSpPr>
+        <p:spPr>
+          <a:xfrm>
+            <a:off x="1484311" y="685800"/>
+            <a:ext cx="10018713" cy="1094761"/>
+          </a:xfrm>
+        </p:spPr>
+        <p:txBody>
+          <a:bodyPr/>
+          <a:lstStyle/>
+          <a:p>
+            <a:pPr algn="l"/>
+            <a:r>
+              <a:rPr lang="en-US" b="1" dirty="0">
+                <a:solidFill>
+                  <a:srgbClr val="0000FF"/>
+                </a:solidFill>
+                <a:latin typeface="Times New Roman" panose="02020603050405020304" pitchFamily="18" charset="0"/>
+                <a:cs typeface="Times New Roman" panose="02020603050405020304" pitchFamily="18" charset="0"/>
+              </a:rPr>
+              <a:t>Tokenizer </a:t>
+            </a:r>
+            <a:r>
+              <a:rPr lang="en-US" b="1" dirty="0" err="1">
+                <a:solidFill>
+                  <a:srgbClr val="0000FF"/>
+                </a:solidFill>
+                <a:latin typeface="Times New Roman" panose="02020603050405020304" pitchFamily="18" charset="0"/>
+                <a:cs typeface="Times New Roman" panose="02020603050405020304" pitchFamily="18" charset="0"/>
+              </a:rPr>
+              <a:t>trong</a:t>
+            </a:r>
+            <a:r>
+              <a:rPr lang="en-US" b="1" dirty="0">
+                <a:solidFill>
+                  <a:srgbClr val="0000FF"/>
+                </a:solidFill>
+                <a:latin typeface="Times New Roman" panose="02020603050405020304" pitchFamily="18" charset="0"/>
+                <a:cs typeface="Times New Roman" panose="02020603050405020304" pitchFamily="18" charset="0"/>
+              </a:rPr>
+              <a:t> Stanford </a:t>
+            </a:r>
+            <a:r>
+              <a:rPr lang="en-US" b="1" dirty="0" err="1">
+                <a:solidFill>
+                  <a:srgbClr val="0000FF"/>
+                </a:solidFill>
+                <a:latin typeface="Times New Roman" panose="02020603050405020304" pitchFamily="18" charset="0"/>
+                <a:cs typeface="Times New Roman" panose="02020603050405020304" pitchFamily="18" charset="0"/>
+              </a:rPr>
+              <a:t>CoreNLP</a:t>
+            </a:r>
+            <a:endParaRPr lang="en-US" b="1" dirty="0">
+              <a:solidFill>
+                <a:srgbClr val="0000FF"/>
+              </a:solidFill>
+              <a:latin typeface="Times New Roman" panose="02020603050405020304" pitchFamily="18" charset="0"/>
+              <a:cs typeface="Times New Roman" panose="02020603050405020304" pitchFamily="18" charset="0"/>
+            </a:endParaRPr>
+          </a:p>
+        </p:txBody>
+      </p:sp>
+      <p:pic>
+        <p:nvPicPr>
+          <p:cNvPr id="8" name="Picture 7">
+            <a:extLst>
+              <a:ext uri="{FF2B5EF4-FFF2-40B4-BE49-F238E27FC236}">
+                <a16:creationId xmlns:a16="http://schemas.microsoft.com/office/drawing/2014/main" id="{CAE7F65E-21DD-4FB9-B834-923C3FB75659}"/>
+              </a:ext>
+            </a:extLst>
+          </p:cNvPr>
+          <p:cNvPicPr>
+            <a:picLocks noChangeAspect="1"/>
+          </p:cNvPicPr>
+          <p:nvPr/>
+        </p:nvPicPr>
+        <p:blipFill>
+          <a:blip r:embed="rId2"/>
+          <a:stretch>
+            <a:fillRect/>
+          </a:stretch>
+        </p:blipFill>
+        <p:spPr>
+          <a:xfrm>
+            <a:off x="1484310" y="2758440"/>
+            <a:ext cx="10391651" cy="956855"/>
+          </a:xfrm>
+          <a:prstGeom prst="rect">
+            <a:avLst/>
+          </a:prstGeom>
+        </p:spPr>
+      </p:pic>
+      <p:pic>
+        <p:nvPicPr>
+          <p:cNvPr id="5" name="Picture 4">
+            <a:extLst>
+              <a:ext uri="{FF2B5EF4-FFF2-40B4-BE49-F238E27FC236}">
+                <a16:creationId xmlns:a16="http://schemas.microsoft.com/office/drawing/2014/main" id="{55484F90-24E8-4E4E-9170-23992AFD2A74}"/>
+              </a:ext>
+            </a:extLst>
+          </p:cNvPr>
+          <p:cNvPicPr>
+            <a:picLocks noChangeAspect="1"/>
+          </p:cNvPicPr>
+          <p:nvPr/>
+        </p:nvPicPr>
+        <p:blipFill>
+          <a:blip r:embed="rId3"/>
+          <a:stretch>
+            <a:fillRect/>
+          </a:stretch>
+        </p:blipFill>
+        <p:spPr>
+          <a:xfrm>
+            <a:off x="3180261" y="4693173"/>
+            <a:ext cx="5859236" cy="1621245"/>
+          </a:xfrm>
+          <a:prstGeom prst="rect">
+            <a:avLst/>
+          </a:prstGeom>
+        </p:spPr>
+      </p:pic>
+    </p:spTree>
+    <p:extLst>
+      <p:ext uri="{BB962C8B-B14F-4D97-AF65-F5344CB8AC3E}">
+        <p14:creationId xmlns:p14="http://schemas.microsoft.com/office/powerpoint/2010/main" val="2179122497"/>
+      </p:ext>
+    </p:extLst>
+  </p:cSld>
+  <p:clrMapOvr>
+    <a:masterClrMapping/>
+  </p:clrMapOvr>
+</p:sld>
+</file>
+
+<file path=ppt/slides/slide13.xml><?xml version="1.0" encoding="utf-8"?>
 <p:sld xmlns:a="http://schemas.openxmlformats.org/drawingml/2006/main" xmlns:r="http://schemas.openxmlformats.org/officeDocument/2006/relationships" xmlns:p="http://schemas.openxmlformats.org/presentationml/2006/main">
   <p:cSld>
     <p:spTree>
@@ -12923,7 +13129,7 @@
 </p:sld>
 </file>
 
-<file path=ppt/slides/slide13.xml><?xml version="1.0" encoding="utf-8"?>
+<file path=ppt/slides/slide14.xml><?xml version="1.0" encoding="utf-8"?>
 <p:sld xmlns:a="http://schemas.openxmlformats.org/drawingml/2006/main" xmlns:r="http://schemas.openxmlformats.org/officeDocument/2006/relationships" xmlns:p="http://schemas.openxmlformats.org/presentationml/2006/main">
   <p:cSld>
     <p:spTree>
@@ -13617,7 +13823,7 @@
 </p:sld>
 </file>
 
-<file path=ppt/slides/slide14.xml><?xml version="1.0" encoding="utf-8"?>
+<file path=ppt/slides/slide15.xml><?xml version="1.0" encoding="utf-8"?>
 <p:sld xmlns:a="http://schemas.openxmlformats.org/drawingml/2006/main" xmlns:r="http://schemas.openxmlformats.org/officeDocument/2006/relationships" xmlns:p="http://schemas.openxmlformats.org/presentationml/2006/main">
   <p:cSld>
     <p:spTree>
@@ -14120,7 +14326,7 @@
 </p:sld>
 </file>
 
-<file path=ppt/slides/slide15.xml><?xml version="1.0" encoding="utf-8"?>
+<file path=ppt/slides/slide16.xml><?xml version="1.0" encoding="utf-8"?>
 <p:sld xmlns:a="http://schemas.openxmlformats.org/drawingml/2006/main" xmlns:r="http://schemas.openxmlformats.org/officeDocument/2006/relationships" xmlns:p="http://schemas.openxmlformats.org/presentationml/2006/main">
   <p:cSld>
     <p:spTree>
@@ -14846,7 +15052,7 @@
 </p:sld>
 </file>
 
-<file path=ppt/slides/slide16.xml><?xml version="1.0" encoding="utf-8"?>
+<file path=ppt/slides/slide17.xml><?xml version="1.0" encoding="utf-8"?>
 <p:sld xmlns:a="http://schemas.openxmlformats.org/drawingml/2006/main" xmlns:r="http://schemas.openxmlformats.org/officeDocument/2006/relationships" xmlns:p="http://schemas.openxmlformats.org/presentationml/2006/main">
   <p:cSld>
     <p:spTree>
@@ -15068,7 +15274,7 @@
 </p:sld>
 </file>
 
-<file path=ppt/slides/slide17.xml><?xml version="1.0" encoding="utf-8"?>
+<file path=ppt/slides/slide18.xml><?xml version="1.0" encoding="utf-8"?>
 <p:sld xmlns:a="http://schemas.openxmlformats.org/drawingml/2006/main" xmlns:r="http://schemas.openxmlformats.org/officeDocument/2006/relationships" xmlns:p="http://schemas.openxmlformats.org/presentationml/2006/main">
   <p:cSld>
     <p:spTree>
@@ -15209,7 +15415,7 @@
 </p:sld>
 </file>
 
-<file path=ppt/slides/slide18.xml><?xml version="1.0" encoding="utf-8"?>
+<file path=ppt/slides/slide19.xml><?xml version="1.0" encoding="utf-8"?>
 <p:sld xmlns:a="http://schemas.openxmlformats.org/drawingml/2006/main" xmlns:r="http://schemas.openxmlformats.org/officeDocument/2006/relationships" xmlns:p="http://schemas.openxmlformats.org/presentationml/2006/main">
   <p:cSld>
     <p:spTree>
@@ -15432,7 +15638,184 @@
 </p:sld>
 </file>
 
-<file path=ppt/slides/slide19.xml><?xml version="1.0" encoding="utf-8"?>
+<file path=ppt/slides/slide2.xml><?xml version="1.0" encoding="utf-8"?>
+<p:sld xmlns:a="http://schemas.openxmlformats.org/drawingml/2006/main" xmlns:r="http://schemas.openxmlformats.org/officeDocument/2006/relationships" xmlns:p="http://schemas.openxmlformats.org/presentationml/2006/main">
+  <p:cSld>
+    <p:spTree>
+      <p:nvGrpSpPr>
+        <p:cNvPr id="1" name=""/>
+        <p:cNvGrpSpPr/>
+        <p:nvPr/>
+      </p:nvGrpSpPr>
+      <p:grpSpPr>
+        <a:xfrm>
+          <a:off x="0" y="0"/>
+          <a:ext cx="0" cy="0"/>
+          <a:chOff x="0" y="0"/>
+          <a:chExt cx="0" cy="0"/>
+        </a:xfrm>
+      </p:grpSpPr>
+      <p:sp>
+        <p:nvSpPr>
+          <p:cNvPr id="2" name="Title 1">
+            <a:extLst>
+              <a:ext uri="{FF2B5EF4-FFF2-40B4-BE49-F238E27FC236}">
+                <a16:creationId xmlns:a16="http://schemas.microsoft.com/office/drawing/2014/main" id="{11DE62A2-70BD-4054-8726-5F66199E19F1}"/>
+              </a:ext>
+            </a:extLst>
+          </p:cNvPr>
+          <p:cNvSpPr>
+            <a:spLocks noGrp="1"/>
+          </p:cNvSpPr>
+          <p:nvPr>
+            <p:ph type="title"/>
+          </p:nvPr>
+        </p:nvSpPr>
+        <p:spPr>
+          <a:xfrm>
+            <a:off x="1568245" y="251952"/>
+            <a:ext cx="4911213" cy="1128252"/>
+          </a:xfrm>
+        </p:spPr>
+        <p:txBody>
+          <a:bodyPr/>
+          <a:lstStyle/>
+          <a:p>
+            <a:pPr algn="l"/>
+            <a:r>
+              <a:rPr lang="en-US" b="1">
+                <a:solidFill>
+                  <a:srgbClr val="0000FF"/>
+                </a:solidFill>
+                <a:latin typeface="Times New Roman" panose="02020603050405020304" pitchFamily="18" charset="0"/>
+                <a:cs typeface="Times New Roman" panose="02020603050405020304" pitchFamily="18" charset="0"/>
+              </a:rPr>
+              <a:t>Thành viên nhóm</a:t>
+            </a:r>
+          </a:p>
+        </p:txBody>
+      </p:sp>
+      <p:sp>
+        <p:nvSpPr>
+          <p:cNvPr id="3" name="Content Placeholder 2">
+            <a:extLst>
+              <a:ext uri="{FF2B5EF4-FFF2-40B4-BE49-F238E27FC236}">
+                <a16:creationId xmlns:a16="http://schemas.microsoft.com/office/drawing/2014/main" id="{70BE8753-D59F-43F8-9425-932D86987DBD}"/>
+              </a:ext>
+            </a:extLst>
+          </p:cNvPr>
+          <p:cNvSpPr>
+            <a:spLocks noGrp="1"/>
+          </p:cNvSpPr>
+          <p:nvPr>
+            <p:ph idx="1"/>
+          </p:nvPr>
+        </p:nvSpPr>
+        <p:spPr>
+          <a:xfrm>
+            <a:off x="3308555" y="1763664"/>
+            <a:ext cx="6341806" cy="4961602"/>
+          </a:xfrm>
+        </p:spPr>
+        <p:txBody>
+          <a:bodyPr>
+            <a:normAutofit/>
+          </a:bodyPr>
+          <a:lstStyle/>
+          <a:p>
+            <a:pPr marL="0" indent="0">
+              <a:lnSpc>
+                <a:spcPct val="150000"/>
+              </a:lnSpc>
+              <a:buNone/>
+            </a:pPr>
+            <a:r>
+              <a:rPr lang="en-US" sz="2800">
+                <a:latin typeface="Times New Roman" panose="02020603050405020304" pitchFamily="18" charset="0"/>
+                <a:cs typeface="Times New Roman" panose="02020603050405020304" pitchFamily="18" charset="0"/>
+              </a:rPr>
+              <a:t>1412503 - Nguyễn Thị Thanh Thảo</a:t>
+            </a:r>
+          </a:p>
+          <a:p>
+            <a:pPr marL="0" indent="0">
+              <a:lnSpc>
+                <a:spcPct val="150000"/>
+              </a:lnSpc>
+              <a:buNone/>
+            </a:pPr>
+            <a:r>
+              <a:rPr lang="en-US" sz="2800">
+                <a:latin typeface="Times New Roman" panose="02020603050405020304" pitchFamily="18" charset="0"/>
+                <a:cs typeface="Times New Roman" panose="02020603050405020304" pitchFamily="18" charset="0"/>
+              </a:rPr>
+              <a:t>1412520 – Nguyễn Hoàng Thi </a:t>
+            </a:r>
+          </a:p>
+          <a:p>
+            <a:pPr marL="0" indent="0">
+              <a:lnSpc>
+                <a:spcPct val="150000"/>
+              </a:lnSpc>
+              <a:buNone/>
+            </a:pPr>
+            <a:r>
+              <a:rPr lang="en-US" sz="2800">
+                <a:latin typeface="Times New Roman" panose="02020603050405020304" pitchFamily="18" charset="0"/>
+                <a:cs typeface="Times New Roman" panose="02020603050405020304" pitchFamily="18" charset="0"/>
+              </a:rPr>
+              <a:t>1412542 - Nguyễn Hà Tiên</a:t>
+            </a:r>
+          </a:p>
+          <a:p>
+            <a:pPr marL="0" indent="0">
+              <a:lnSpc>
+                <a:spcPct val="150000"/>
+              </a:lnSpc>
+              <a:buNone/>
+            </a:pPr>
+            <a:r>
+              <a:rPr lang="en-US" sz="2800">
+                <a:latin typeface="Times New Roman" panose="02020603050405020304" pitchFamily="18" charset="0"/>
+                <a:cs typeface="Times New Roman" panose="02020603050405020304" pitchFamily="18" charset="0"/>
+              </a:rPr>
+              <a:t>1412543 - Nguyễn Thủy Tiên</a:t>
+            </a:r>
+          </a:p>
+          <a:p>
+            <a:pPr marL="0" indent="0">
+              <a:lnSpc>
+                <a:spcPct val="150000"/>
+              </a:lnSpc>
+              <a:buNone/>
+            </a:pPr>
+            <a:r>
+              <a:rPr lang="en-US" sz="2800">
+                <a:latin typeface="Times New Roman" panose="02020603050405020304" pitchFamily="18" charset="0"/>
+                <a:cs typeface="Times New Roman" panose="02020603050405020304" pitchFamily="18" charset="0"/>
+              </a:rPr>
+              <a:t>1412595 - Võ Thị Thanh Trúc</a:t>
+            </a:r>
+          </a:p>
+          <a:p>
+            <a:endParaRPr lang="en-US" sz="2800"/>
+          </a:p>
+        </p:txBody>
+      </p:sp>
+    </p:spTree>
+    <p:extLst>
+      <p:ext uri="{BB962C8B-B14F-4D97-AF65-F5344CB8AC3E}">
+        <p14:creationId xmlns:p14="http://schemas.microsoft.com/office/powerpoint/2010/main" val="1532792253"/>
+      </p:ext>
+    </p:extLst>
+  </p:cSld>
+  <p:clrMapOvr>
+    <a:masterClrMapping/>
+  </p:clrMapOvr>
+</p:sld>
+</file>
+
+<file path=ppt/slides/slide20.xml><?xml version="1.0" encoding="utf-8"?>
 <p:sld xmlns:a="http://schemas.openxmlformats.org/drawingml/2006/main" xmlns:r="http://schemas.openxmlformats.org/officeDocument/2006/relationships" xmlns:p="http://schemas.openxmlformats.org/presentationml/2006/main">
   <p:cSld>
     <p:spTree>
@@ -15694,184 +16077,7 @@
 </p:sld>
 </file>
 
-<file path=ppt/slides/slide2.xml><?xml version="1.0" encoding="utf-8"?>
-<p:sld xmlns:a="http://schemas.openxmlformats.org/drawingml/2006/main" xmlns:r="http://schemas.openxmlformats.org/officeDocument/2006/relationships" xmlns:p="http://schemas.openxmlformats.org/presentationml/2006/main">
-  <p:cSld>
-    <p:spTree>
-      <p:nvGrpSpPr>
-        <p:cNvPr id="1" name=""/>
-        <p:cNvGrpSpPr/>
-        <p:nvPr/>
-      </p:nvGrpSpPr>
-      <p:grpSpPr>
-        <a:xfrm>
-          <a:off x="0" y="0"/>
-          <a:ext cx="0" cy="0"/>
-          <a:chOff x="0" y="0"/>
-          <a:chExt cx="0" cy="0"/>
-        </a:xfrm>
-      </p:grpSpPr>
-      <p:sp>
-        <p:nvSpPr>
-          <p:cNvPr id="2" name="Title 1">
-            <a:extLst>
-              <a:ext uri="{FF2B5EF4-FFF2-40B4-BE49-F238E27FC236}">
-                <a16:creationId xmlns:a16="http://schemas.microsoft.com/office/drawing/2014/main" id="{11DE62A2-70BD-4054-8726-5F66199E19F1}"/>
-              </a:ext>
-            </a:extLst>
-          </p:cNvPr>
-          <p:cNvSpPr>
-            <a:spLocks noGrp="1"/>
-          </p:cNvSpPr>
-          <p:nvPr>
-            <p:ph type="title"/>
-          </p:nvPr>
-        </p:nvSpPr>
-        <p:spPr>
-          <a:xfrm>
-            <a:off x="1568245" y="251952"/>
-            <a:ext cx="4911213" cy="1128252"/>
-          </a:xfrm>
-        </p:spPr>
-        <p:txBody>
-          <a:bodyPr/>
-          <a:lstStyle/>
-          <a:p>
-            <a:pPr algn="l"/>
-            <a:r>
-              <a:rPr lang="en-US" b="1">
-                <a:solidFill>
-                  <a:srgbClr val="0000FF"/>
-                </a:solidFill>
-                <a:latin typeface="Times New Roman" panose="02020603050405020304" pitchFamily="18" charset="0"/>
-                <a:cs typeface="Times New Roman" panose="02020603050405020304" pitchFamily="18" charset="0"/>
-              </a:rPr>
-              <a:t>Thành viên nhóm</a:t>
-            </a:r>
-          </a:p>
-        </p:txBody>
-      </p:sp>
-      <p:sp>
-        <p:nvSpPr>
-          <p:cNvPr id="3" name="Content Placeholder 2">
-            <a:extLst>
-              <a:ext uri="{FF2B5EF4-FFF2-40B4-BE49-F238E27FC236}">
-                <a16:creationId xmlns:a16="http://schemas.microsoft.com/office/drawing/2014/main" id="{70BE8753-D59F-43F8-9425-932D86987DBD}"/>
-              </a:ext>
-            </a:extLst>
-          </p:cNvPr>
-          <p:cNvSpPr>
-            <a:spLocks noGrp="1"/>
-          </p:cNvSpPr>
-          <p:nvPr>
-            <p:ph idx="1"/>
-          </p:nvPr>
-        </p:nvSpPr>
-        <p:spPr>
-          <a:xfrm>
-            <a:off x="3308555" y="1763664"/>
-            <a:ext cx="6341806" cy="4961602"/>
-          </a:xfrm>
-        </p:spPr>
-        <p:txBody>
-          <a:bodyPr>
-            <a:normAutofit/>
-          </a:bodyPr>
-          <a:lstStyle/>
-          <a:p>
-            <a:pPr marL="0" indent="0">
-              <a:lnSpc>
-                <a:spcPct val="150000"/>
-              </a:lnSpc>
-              <a:buNone/>
-            </a:pPr>
-            <a:r>
-              <a:rPr lang="en-US" sz="2800">
-                <a:latin typeface="Times New Roman" panose="02020603050405020304" pitchFamily="18" charset="0"/>
-                <a:cs typeface="Times New Roman" panose="02020603050405020304" pitchFamily="18" charset="0"/>
-              </a:rPr>
-              <a:t>1412503 - Nguyễn Thị Thanh Thảo</a:t>
-            </a:r>
-          </a:p>
-          <a:p>
-            <a:pPr marL="0" indent="0">
-              <a:lnSpc>
-                <a:spcPct val="150000"/>
-              </a:lnSpc>
-              <a:buNone/>
-            </a:pPr>
-            <a:r>
-              <a:rPr lang="en-US" sz="2800">
-                <a:latin typeface="Times New Roman" panose="02020603050405020304" pitchFamily="18" charset="0"/>
-                <a:cs typeface="Times New Roman" panose="02020603050405020304" pitchFamily="18" charset="0"/>
-              </a:rPr>
-              <a:t>1412520 – Nguyễn Hoàng Thi </a:t>
-            </a:r>
-          </a:p>
-          <a:p>
-            <a:pPr marL="0" indent="0">
-              <a:lnSpc>
-                <a:spcPct val="150000"/>
-              </a:lnSpc>
-              <a:buNone/>
-            </a:pPr>
-            <a:r>
-              <a:rPr lang="en-US" sz="2800">
-                <a:latin typeface="Times New Roman" panose="02020603050405020304" pitchFamily="18" charset="0"/>
-                <a:cs typeface="Times New Roman" panose="02020603050405020304" pitchFamily="18" charset="0"/>
-              </a:rPr>
-              <a:t>1412542 - Nguyễn Hà Tiên</a:t>
-            </a:r>
-          </a:p>
-          <a:p>
-            <a:pPr marL="0" indent="0">
-              <a:lnSpc>
-                <a:spcPct val="150000"/>
-              </a:lnSpc>
-              <a:buNone/>
-            </a:pPr>
-            <a:r>
-              <a:rPr lang="en-US" sz="2800">
-                <a:latin typeface="Times New Roman" panose="02020603050405020304" pitchFamily="18" charset="0"/>
-                <a:cs typeface="Times New Roman" panose="02020603050405020304" pitchFamily="18" charset="0"/>
-              </a:rPr>
-              <a:t>1412543 - Nguyễn Thủy Tiên</a:t>
-            </a:r>
-          </a:p>
-          <a:p>
-            <a:pPr marL="0" indent="0">
-              <a:lnSpc>
-                <a:spcPct val="150000"/>
-              </a:lnSpc>
-              <a:buNone/>
-            </a:pPr>
-            <a:r>
-              <a:rPr lang="en-US" sz="2800">
-                <a:latin typeface="Times New Roman" panose="02020603050405020304" pitchFamily="18" charset="0"/>
-                <a:cs typeface="Times New Roman" panose="02020603050405020304" pitchFamily="18" charset="0"/>
-              </a:rPr>
-              <a:t>1412595 - Võ Thị Thanh Trúc</a:t>
-            </a:r>
-          </a:p>
-          <a:p>
-            <a:endParaRPr lang="en-US" sz="2800"/>
-          </a:p>
-        </p:txBody>
-      </p:sp>
-    </p:spTree>
-    <p:extLst>
-      <p:ext uri="{BB962C8B-B14F-4D97-AF65-F5344CB8AC3E}">
-        <p14:creationId xmlns:p14="http://schemas.microsoft.com/office/powerpoint/2010/main" val="1532792253"/>
-      </p:ext>
-    </p:extLst>
-  </p:cSld>
-  <p:clrMapOvr>
-    <a:masterClrMapping/>
-  </p:clrMapOvr>
-</p:sld>
-</file>
-
-<file path=ppt/slides/slide20.xml><?xml version="1.0" encoding="utf-8"?>
+<file path=ppt/slides/slide21.xml><?xml version="1.0" encoding="utf-8"?>
 <p:sld xmlns:a="http://schemas.openxmlformats.org/drawingml/2006/main" xmlns:r="http://schemas.openxmlformats.org/officeDocument/2006/relationships" xmlns:p="http://schemas.openxmlformats.org/presentationml/2006/main">
   <p:cSld>
     <p:spTree>
@@ -16114,7 +16320,7 @@
 </p:sld>
 </file>
 
-<file path=ppt/slides/slide21.xml><?xml version="1.0" encoding="utf-8"?>
+<file path=ppt/slides/slide22.xml><?xml version="1.0" encoding="utf-8"?>
 <p:sld xmlns:a="http://schemas.openxmlformats.org/drawingml/2006/main" xmlns:r="http://schemas.openxmlformats.org/officeDocument/2006/relationships" xmlns:p="http://schemas.openxmlformats.org/presentationml/2006/main">
   <p:cSld>
     <p:spTree>
@@ -16945,7 +17151,7 @@
 </p:sld>
 </file>
 
-<file path=ppt/slides/slide22.xml><?xml version="1.0" encoding="utf-8"?>
+<file path=ppt/slides/slide23.xml><?xml version="1.0" encoding="utf-8"?>
 <p:sld xmlns:a="http://schemas.openxmlformats.org/drawingml/2006/main" xmlns:r="http://schemas.openxmlformats.org/officeDocument/2006/relationships" xmlns:p="http://schemas.openxmlformats.org/presentationml/2006/main">
   <p:cSld>
     <p:spTree>
@@ -17656,7 +17862,7 @@
 </p:sld>
 </file>
 
-<file path=ppt/slides/slide23.xml><?xml version="1.0" encoding="utf-8"?>
+<file path=ppt/slides/slide24.xml><?xml version="1.0" encoding="utf-8"?>
 <p:sld xmlns:a="http://schemas.openxmlformats.org/drawingml/2006/main" xmlns:r="http://schemas.openxmlformats.org/officeDocument/2006/relationships" xmlns:p="http://schemas.openxmlformats.org/presentationml/2006/main">
   <p:cSld>
     <p:spTree>
@@ -18634,7 +18840,7 @@
 </p:sld>
 </file>
 
-<file path=ppt/slides/slide24.xml><?xml version="1.0" encoding="utf-8"?>
+<file path=ppt/slides/slide25.xml><?xml version="1.0" encoding="utf-8"?>
 <p:sld xmlns:a="http://schemas.openxmlformats.org/drawingml/2006/main" xmlns:r="http://schemas.openxmlformats.org/officeDocument/2006/relationships" xmlns:p="http://schemas.openxmlformats.org/presentationml/2006/main">
   <p:cSld>
     <p:spTree>
@@ -20197,7 +20403,7 @@
 </p:sld>
 </file>
 
-<file path=ppt/slides/slide25.xml><?xml version="1.0" encoding="utf-8"?>
+<file path=ppt/slides/slide26.xml><?xml version="1.0" encoding="utf-8"?>
 <p:sld xmlns:a="http://schemas.openxmlformats.org/drawingml/2006/main" xmlns:r="http://schemas.openxmlformats.org/officeDocument/2006/relationships" xmlns:p="http://schemas.openxmlformats.org/presentationml/2006/main">
   <p:cSld>
     <p:spTree>
@@ -20333,7 +20539,7 @@
         </p:spPr>
         <p:txBody>
           <a:bodyPr vert="horz" lIns="91440" tIns="45720" rIns="91440" bIns="45720" rtlCol="0" anchor="ctr">
-            <a:normAutofit lnSpcReduction="10000"/>
+            <a:normAutofit fontScale="92500"/>
           </a:bodyPr>
           <a:lstStyle>
             <a:lvl1pPr marL="285750" indent="-285750" algn="l" defTabSz="457200" rtl="0" eaLnBrk="1" latinLnBrk="0" hangingPunct="1">
@@ -20681,7 +20887,7 @@
         </p:spPr>
         <p:txBody>
           <a:bodyPr vert="horz" lIns="91440" tIns="45720" rIns="91440" bIns="45720" rtlCol="0" anchor="ctr">
-            <a:normAutofit lnSpcReduction="10000"/>
+            <a:normAutofit fontScale="92500"/>
           </a:bodyPr>
           <a:lstStyle>
             <a:lvl1pPr marL="285750" indent="-285750" algn="l" defTabSz="457200" rtl="0" eaLnBrk="1" latinLnBrk="0" hangingPunct="1">
@@ -21165,7 +21371,7 @@
 </p:sld>
 </file>
 
-<file path=ppt/slides/slide26.xml><?xml version="1.0" encoding="utf-8"?>
+<file path=ppt/slides/slide27.xml><?xml version="1.0" encoding="utf-8"?>
 <p:sld xmlns:a="http://schemas.openxmlformats.org/drawingml/2006/main" xmlns:r="http://schemas.openxmlformats.org/officeDocument/2006/relationships" xmlns:p="http://schemas.openxmlformats.org/presentationml/2006/main">
   <p:cSld>
     <p:spTree>
@@ -22113,7 +22319,7 @@
 </p:sld>
 </file>
 
-<file path=ppt/slides/slide27.xml><?xml version="1.0" encoding="utf-8"?>
+<file path=ppt/slides/slide28.xml><?xml version="1.0" encoding="utf-8"?>
 <p:sld xmlns:a="http://schemas.openxmlformats.org/drawingml/2006/main" xmlns:r="http://schemas.openxmlformats.org/officeDocument/2006/relationships" xmlns:p="http://schemas.openxmlformats.org/presentationml/2006/main">
   <p:cSld>
     <p:spTree>
@@ -25068,8 +25274,19 @@
                 <a:latin typeface="Times New Roman" panose="02020603050405020304" pitchFamily="18" charset="0"/>
                 <a:cs typeface="Times New Roman" panose="02020603050405020304" pitchFamily="18" charset="0"/>
               </a:rPr>
-              <a:t>).</a:t>
-            </a:r>
+              <a:t>). </a:t>
+            </a:r>
+            <a:r>
+              <a:rPr lang="vi-VN" dirty="0">
+                <a:latin typeface="Times New Roman" panose="02020603050405020304" pitchFamily="18" charset="0"/>
+                <a:cs typeface="Times New Roman" panose="02020603050405020304" pitchFamily="18" charset="0"/>
+              </a:rPr>
+              <a:t>Các đơn vị này sẽ là những đơn vị cơ bản sử dụng cho những bước xử lý sau này.</a:t>
+            </a:r>
+            <a:endParaRPr lang="en-US" dirty="0">
+              <a:latin typeface="Times New Roman" panose="02020603050405020304" pitchFamily="18" charset="0"/>
+              <a:cs typeface="Times New Roman" panose="02020603050405020304" pitchFamily="18" charset="0"/>
+            </a:endParaRPr>
           </a:p>
           <a:p>
             <a:r>

</xml_diff>